<commit_message>
updated ppt and python book
</commit_message>
<xml_diff>
--- a/LendingClubCaseStudy-Presentation.pptx
+++ b/LendingClubCaseStudy-Presentation.pptx
@@ -9,9 +9,21 @@
     <p:sldId id="260" r:id="rId6"/>
     <p:sldId id="259" r:id="rId7"/>
     <p:sldId id="261" r:id="rId8"/>
-    <p:sldId id="262" r:id="rId9"/>
-    <p:sldId id="263" r:id="rId10"/>
-    <p:sldId id="258" r:id="rId11"/>
+    <p:sldId id="277" r:id="rId9"/>
+    <p:sldId id="276" r:id="rId10"/>
+    <p:sldId id="278" r:id="rId11"/>
+    <p:sldId id="258" r:id="rId12"/>
+    <p:sldId id="263" r:id="rId13"/>
+    <p:sldId id="265" r:id="rId14"/>
+    <p:sldId id="274" r:id="rId15"/>
+    <p:sldId id="275" r:id="rId16"/>
+    <p:sldId id="273" r:id="rId17"/>
+    <p:sldId id="272" r:id="rId18"/>
+    <p:sldId id="271" r:id="rId19"/>
+    <p:sldId id="270" r:id="rId20"/>
+    <p:sldId id="269" r:id="rId21"/>
+    <p:sldId id="267" r:id="rId22"/>
+    <p:sldId id="266" r:id="rId23"/>
   </p:sldIdLst>
   <p:sldSz cx="12192000" cy="6858000"/>
   <p:notesSz cx="6858000" cy="9144000"/>
@@ -362,7 +374,7 @@
           <a:p>
             <a:fld id="{9184DA70-C731-4C70-880D-CCD4705E623C}" type="datetime1">
               <a:rPr lang="en-US" smtClean="0"/>
-              <a:t>5/19/2024</a:t>
+              <a:t>5/25/2024</a:t>
             </a:fld>
             <a:endParaRPr lang="en-US" dirty="0"/>
           </a:p>
@@ -550,7 +562,7 @@
           <a:p>
             <a:fld id="{B612A279-0833-481D-8C56-F67FD0AC6C50}" type="datetime1">
               <a:rPr lang="en-US" smtClean="0"/>
-              <a:t>5/19/2024</a:t>
+              <a:t>5/25/2024</a:t>
             </a:fld>
             <a:endParaRPr lang="en-US" dirty="0"/>
           </a:p>
@@ -792,7 +804,7 @@
           <a:p>
             <a:fld id="{6587DA83-5663-4C9C-B9AA-0B40A3DAFF81}" type="datetime1">
               <a:rPr lang="en-US" smtClean="0"/>
-              <a:t>5/19/2024</a:t>
+              <a:t>5/25/2024</a:t>
             </a:fld>
             <a:endParaRPr lang="en-US" dirty="0"/>
           </a:p>
@@ -980,7 +992,7 @@
           <a:p>
             <a:fld id="{4BE1D723-8F53-4F53-90B0-1982A396982E}" type="datetime1">
               <a:rPr lang="en-US" smtClean="0"/>
-              <a:t>5/19/2024</a:t>
+              <a:t>5/25/2024</a:t>
             </a:fld>
             <a:endParaRPr lang="en-US" dirty="0"/>
           </a:p>
@@ -1353,7 +1365,7 @@
           <a:p>
             <a:fld id="{97669AF7-7BEB-44E4-9852-375E34362B5B}" type="datetime1">
               <a:rPr lang="en-US" smtClean="0"/>
-              <a:t>5/19/2024</a:t>
+              <a:t>5/25/2024</a:t>
             </a:fld>
             <a:endParaRPr lang="en-US" dirty="0"/>
           </a:p>
@@ -1608,7 +1620,7 @@
           <a:p>
             <a:fld id="{BAAAC38D-0552-4C82-B593-E6124DFADBE2}" type="datetime1">
               <a:rPr lang="en-US" smtClean="0"/>
-              <a:t>5/19/2024</a:t>
+              <a:t>5/25/2024</a:t>
             </a:fld>
             <a:endParaRPr lang="en-US" dirty="0"/>
           </a:p>
@@ -2005,7 +2017,7 @@
           <a:p>
             <a:fld id="{D9DF0F1C-5577-4ACB-BB62-DF8F3C494C7E}" type="datetime1">
               <a:rPr lang="en-US" smtClean="0"/>
-              <a:t>5/19/2024</a:t>
+              <a:t>5/25/2024</a:t>
             </a:fld>
             <a:endParaRPr lang="en-US" dirty="0"/>
           </a:p>
@@ -2141,7 +2153,7 @@
           <a:p>
             <a:fld id="{1775B394-D9F9-4F0C-B15D-605F45CB9E9F}" type="datetime1">
               <a:rPr lang="en-US" smtClean="0"/>
-              <a:t>5/19/2024</a:t>
+              <a:t>5/25/2024</a:t>
             </a:fld>
             <a:endParaRPr lang="en-US" dirty="0"/>
           </a:p>
@@ -2298,7 +2310,7 @@
           <a:p>
             <a:fld id="{39667345-2558-425A-8533-9BFDBCE15005}" type="datetime1">
               <a:rPr lang="en-US" smtClean="0"/>
-              <a:t>5/19/2024</a:t>
+              <a:t>5/25/2024</a:t>
             </a:fld>
             <a:endParaRPr lang="en-US" dirty="0"/>
           </a:p>
@@ -2627,7 +2639,7 @@
           <a:p>
             <a:fld id="{92BEA474-078D-4E9B-9B14-09A87B19DC46}" type="datetime1">
               <a:rPr lang="en-US" smtClean="0"/>
-              <a:t>5/19/2024</a:t>
+              <a:t>5/25/2024</a:t>
             </a:fld>
             <a:endParaRPr lang="en-US" dirty="0"/>
           </a:p>
@@ -2977,7 +2989,7 @@
           <a:p>
             <a:fld id="{4907D986-8816-4272-A432-0437A28A9828}" type="datetime1">
               <a:rPr lang="en-US" smtClean="0"/>
-              <a:t>5/19/2024</a:t>
+              <a:t>5/25/2024</a:t>
             </a:fld>
             <a:endParaRPr lang="en-US" dirty="0"/>
           </a:p>
@@ -3238,7 +3250,7 @@
           <a:p>
             <a:fld id="{62D6E202-B606-4609-B914-27C9371A1F6D}" type="datetime1">
               <a:rPr lang="en-US" smtClean="0"/>
-              <a:t>5/19/2024</a:t>
+              <a:t>5/25/2024</a:t>
             </a:fld>
             <a:endParaRPr lang="en-US" dirty="0"/>
           </a:p>
@@ -4043,6 +4055,1577 @@
 </p:sld>
 </file>
 
+<file path=ppt/slides/slide10.xml><?xml version="1.0" encoding="utf-8"?>
+<p:sld xmlns:a="http://schemas.openxmlformats.org/drawingml/2006/main" xmlns:r="http://schemas.openxmlformats.org/officeDocument/2006/relationships" xmlns:p="http://schemas.openxmlformats.org/presentationml/2006/main">
+  <p:cSld>
+    <p:spTree>
+      <p:nvGrpSpPr>
+        <p:cNvPr id="1" name=""/>
+        <p:cNvGrpSpPr/>
+        <p:nvPr/>
+      </p:nvGrpSpPr>
+      <p:grpSpPr>
+        <a:xfrm>
+          <a:off x="0" y="0"/>
+          <a:ext cx="0" cy="0"/>
+          <a:chOff x="0" y="0"/>
+          <a:chExt cx="0" cy="0"/>
+        </a:xfrm>
+      </p:grpSpPr>
+      <p:sp>
+        <p:nvSpPr>
+          <p:cNvPr id="2" name="Title 1">
+            <a:extLst>
+              <a:ext uri="{FF2B5EF4-FFF2-40B4-BE49-F238E27FC236}">
+                <a16:creationId xmlns:a16="http://schemas.microsoft.com/office/drawing/2014/main" id="{52FDF0B9-B3AB-3A17-8FC7-F4892A7DB154}"/>
+              </a:ext>
+            </a:extLst>
+          </p:cNvPr>
+          <p:cNvSpPr>
+            <a:spLocks noGrp="1"/>
+          </p:cNvSpPr>
+          <p:nvPr>
+            <p:ph type="title"/>
+          </p:nvPr>
+        </p:nvSpPr>
+        <p:spPr>
+          <a:xfrm>
+            <a:off x="1097280" y="191472"/>
+            <a:ext cx="10058400" cy="748452"/>
+          </a:xfrm>
+        </p:spPr>
+        <p:txBody>
+          <a:bodyPr/>
+          <a:lstStyle/>
+          <a:p>
+            <a:r>
+              <a:rPr lang="en-US" dirty="0"/>
+              <a:t>Insight 1</a:t>
+            </a:r>
+            <a:endParaRPr lang="en-IN" dirty="0"/>
+          </a:p>
+        </p:txBody>
+      </p:sp>
+      <p:sp>
+        <p:nvSpPr>
+          <p:cNvPr id="3" name="Content Placeholder 2">
+            <a:extLst>
+              <a:ext uri="{FF2B5EF4-FFF2-40B4-BE49-F238E27FC236}">
+                <a16:creationId xmlns:a16="http://schemas.microsoft.com/office/drawing/2014/main" id="{D955C1A0-F490-B7A4-0AE9-871F3F7C9B5D}"/>
+              </a:ext>
+            </a:extLst>
+          </p:cNvPr>
+          <p:cNvSpPr>
+            <a:spLocks noGrp="1"/>
+          </p:cNvSpPr>
+          <p:nvPr>
+            <p:ph idx="1"/>
+          </p:nvPr>
+        </p:nvSpPr>
+        <p:spPr>
+          <a:xfrm>
+            <a:off x="1097280" y="1065321"/>
+            <a:ext cx="10058400" cy="4652846"/>
+          </a:xfrm>
+        </p:spPr>
+        <p:txBody>
+          <a:bodyPr/>
+          <a:lstStyle/>
+          <a:p>
+            <a:pPr>
+              <a:buFont typeface="Wingdings" panose="05000000000000000000" pitchFamily="2" charset="2"/>
+              <a:buChar char="v"/>
+            </a:pPr>
+            <a:r>
+              <a:rPr lang="en-US" dirty="0"/>
+              <a:t>At higher loan amounts the percent of charged off loans over total loans increased by 5 percentage points i.e. one in every five loans charged off</a:t>
+            </a:r>
+          </a:p>
+          <a:p>
+            <a:pPr>
+              <a:buFont typeface="Wingdings" panose="05000000000000000000" pitchFamily="2" charset="2"/>
+              <a:buChar char="v"/>
+            </a:pPr>
+            <a:endParaRPr lang="en-US" dirty="0"/>
+          </a:p>
+          <a:p>
+            <a:pPr>
+              <a:buFont typeface="Wingdings" panose="05000000000000000000" pitchFamily="2" charset="2"/>
+              <a:buChar char="v"/>
+            </a:pPr>
+            <a:endParaRPr lang="en-US" dirty="0"/>
+          </a:p>
+          <a:p>
+            <a:pPr>
+              <a:buFont typeface="Wingdings" panose="05000000000000000000" pitchFamily="2" charset="2"/>
+              <a:buChar char="v"/>
+            </a:pPr>
+            <a:endParaRPr lang="en-US" dirty="0"/>
+          </a:p>
+          <a:p>
+            <a:pPr>
+              <a:buFont typeface="Wingdings" panose="05000000000000000000" pitchFamily="2" charset="2"/>
+              <a:buChar char="v"/>
+            </a:pPr>
+            <a:endParaRPr lang="en-US" dirty="0"/>
+          </a:p>
+          <a:p>
+            <a:pPr>
+              <a:buFont typeface="Wingdings" panose="05000000000000000000" pitchFamily="2" charset="2"/>
+              <a:buChar char="v"/>
+            </a:pPr>
+            <a:endParaRPr lang="en-US" dirty="0"/>
+          </a:p>
+          <a:p>
+            <a:pPr>
+              <a:buFont typeface="Wingdings" panose="05000000000000000000" pitchFamily="2" charset="2"/>
+              <a:buChar char="v"/>
+            </a:pPr>
+            <a:endParaRPr lang="en-US" dirty="0"/>
+          </a:p>
+          <a:p>
+            <a:pPr lvl="1">
+              <a:buFont typeface="Wingdings" panose="05000000000000000000" pitchFamily="2" charset="2"/>
+              <a:buChar char="v"/>
+            </a:pPr>
+            <a:endParaRPr lang="en-IN" sz="1400" dirty="0"/>
+          </a:p>
+        </p:txBody>
+      </p:sp>
+    </p:spTree>
+    <p:extLst>
+      <p:ext uri="{BB962C8B-B14F-4D97-AF65-F5344CB8AC3E}">
+        <p14:creationId xmlns:p14="http://schemas.microsoft.com/office/powerpoint/2010/main" val="3011202115"/>
+      </p:ext>
+    </p:extLst>
+  </p:cSld>
+  <p:clrMapOvr>
+    <a:masterClrMapping/>
+  </p:clrMapOvr>
+</p:sld>
+</file>
+
+<file path=ppt/slides/slide11.xml><?xml version="1.0" encoding="utf-8"?>
+<p:sld xmlns:a="http://schemas.openxmlformats.org/drawingml/2006/main" xmlns:r="http://schemas.openxmlformats.org/officeDocument/2006/relationships" xmlns:p="http://schemas.openxmlformats.org/presentationml/2006/main">
+  <p:cSld>
+    <p:spTree>
+      <p:nvGrpSpPr>
+        <p:cNvPr id="1" name=""/>
+        <p:cNvGrpSpPr/>
+        <p:nvPr/>
+      </p:nvGrpSpPr>
+      <p:grpSpPr>
+        <a:xfrm>
+          <a:off x="0" y="0"/>
+          <a:ext cx="0" cy="0"/>
+          <a:chOff x="0" y="0"/>
+          <a:chExt cx="0" cy="0"/>
+        </a:xfrm>
+      </p:grpSpPr>
+      <p:sp>
+        <p:nvSpPr>
+          <p:cNvPr id="2" name="Title 1">
+            <a:extLst>
+              <a:ext uri="{FF2B5EF4-FFF2-40B4-BE49-F238E27FC236}">
+                <a16:creationId xmlns:a16="http://schemas.microsoft.com/office/drawing/2014/main" id="{52FDF0B9-B3AB-3A17-8FC7-F4892A7DB154}"/>
+              </a:ext>
+            </a:extLst>
+          </p:cNvPr>
+          <p:cNvSpPr>
+            <a:spLocks noGrp="1"/>
+          </p:cNvSpPr>
+          <p:nvPr>
+            <p:ph type="title"/>
+          </p:nvPr>
+        </p:nvSpPr>
+        <p:spPr>
+          <a:xfrm>
+            <a:off x="1097280" y="191472"/>
+            <a:ext cx="10058400" cy="748452"/>
+          </a:xfrm>
+        </p:spPr>
+        <p:txBody>
+          <a:bodyPr/>
+          <a:lstStyle/>
+          <a:p>
+            <a:r>
+              <a:rPr lang="en-US" dirty="0"/>
+              <a:t>Insight 3</a:t>
+            </a:r>
+            <a:endParaRPr lang="en-IN" dirty="0"/>
+          </a:p>
+        </p:txBody>
+      </p:sp>
+      <p:sp>
+        <p:nvSpPr>
+          <p:cNvPr id="3" name="Content Placeholder 2">
+            <a:extLst>
+              <a:ext uri="{FF2B5EF4-FFF2-40B4-BE49-F238E27FC236}">
+                <a16:creationId xmlns:a16="http://schemas.microsoft.com/office/drawing/2014/main" id="{D955C1A0-F490-B7A4-0AE9-871F3F7C9B5D}"/>
+              </a:ext>
+            </a:extLst>
+          </p:cNvPr>
+          <p:cNvSpPr>
+            <a:spLocks noGrp="1"/>
+          </p:cNvSpPr>
+          <p:nvPr>
+            <p:ph idx="1"/>
+          </p:nvPr>
+        </p:nvSpPr>
+        <p:spPr>
+          <a:xfrm>
+            <a:off x="1097280" y="939924"/>
+            <a:ext cx="10058400" cy="4778243"/>
+          </a:xfrm>
+        </p:spPr>
+        <p:txBody>
+          <a:bodyPr/>
+          <a:lstStyle/>
+          <a:p>
+            <a:pPr>
+              <a:buFont typeface="Wingdings" panose="05000000000000000000" pitchFamily="2" charset="2"/>
+              <a:buChar char="v"/>
+            </a:pPr>
+            <a:r>
+              <a:rPr lang="en-US" dirty="0"/>
+              <a:t>At higher interest rates, charged off loans  as a percentage of total loans doubled when compared to overall range of data. Three loans in every ten loans charged off, meaning there is correlation between higher interest rate and loan getting charged off</a:t>
+            </a:r>
+          </a:p>
+          <a:p>
+            <a:pPr>
+              <a:buFont typeface="Wingdings" panose="05000000000000000000" pitchFamily="2" charset="2"/>
+              <a:buChar char="v"/>
+            </a:pPr>
+            <a:endParaRPr lang="en-US" dirty="0"/>
+          </a:p>
+          <a:p>
+            <a:pPr>
+              <a:buFont typeface="Wingdings" panose="05000000000000000000" pitchFamily="2" charset="2"/>
+              <a:buChar char="v"/>
+            </a:pPr>
+            <a:endParaRPr lang="en-US" dirty="0"/>
+          </a:p>
+          <a:p>
+            <a:pPr>
+              <a:buFont typeface="Wingdings" panose="05000000000000000000" pitchFamily="2" charset="2"/>
+              <a:buChar char="v"/>
+            </a:pPr>
+            <a:endParaRPr lang="en-US" dirty="0"/>
+          </a:p>
+          <a:p>
+            <a:pPr>
+              <a:buFont typeface="Wingdings" panose="05000000000000000000" pitchFamily="2" charset="2"/>
+              <a:buChar char="v"/>
+            </a:pPr>
+            <a:endParaRPr lang="en-US" dirty="0"/>
+          </a:p>
+          <a:p>
+            <a:pPr>
+              <a:buFont typeface="Wingdings" panose="05000000000000000000" pitchFamily="2" charset="2"/>
+              <a:buChar char="v"/>
+            </a:pPr>
+            <a:endParaRPr lang="en-US" dirty="0"/>
+          </a:p>
+          <a:p>
+            <a:pPr>
+              <a:buFont typeface="Wingdings" panose="05000000000000000000" pitchFamily="2" charset="2"/>
+              <a:buChar char="v"/>
+            </a:pPr>
+            <a:endParaRPr lang="en-US" dirty="0"/>
+          </a:p>
+          <a:p>
+            <a:pPr lvl="1">
+              <a:buFont typeface="Wingdings" panose="05000000000000000000" pitchFamily="2" charset="2"/>
+              <a:buChar char="v"/>
+            </a:pPr>
+            <a:endParaRPr lang="en-IN" sz="1400" dirty="0"/>
+          </a:p>
+        </p:txBody>
+      </p:sp>
+    </p:spTree>
+    <p:extLst>
+      <p:ext uri="{BB962C8B-B14F-4D97-AF65-F5344CB8AC3E}">
+        <p14:creationId xmlns:p14="http://schemas.microsoft.com/office/powerpoint/2010/main" val="1065348308"/>
+      </p:ext>
+    </p:extLst>
+  </p:cSld>
+  <p:clrMapOvr>
+    <a:masterClrMapping/>
+  </p:clrMapOvr>
+</p:sld>
+</file>
+
+<file path=ppt/slides/slide12.xml><?xml version="1.0" encoding="utf-8"?>
+<p:sld xmlns:a="http://schemas.openxmlformats.org/drawingml/2006/main" xmlns:r="http://schemas.openxmlformats.org/officeDocument/2006/relationships" xmlns:p="http://schemas.openxmlformats.org/presentationml/2006/main">
+  <p:cSld>
+    <p:spTree>
+      <p:nvGrpSpPr>
+        <p:cNvPr id="1" name=""/>
+        <p:cNvGrpSpPr/>
+        <p:nvPr/>
+      </p:nvGrpSpPr>
+      <p:grpSpPr>
+        <a:xfrm>
+          <a:off x="0" y="0"/>
+          <a:ext cx="0" cy="0"/>
+          <a:chOff x="0" y="0"/>
+          <a:chExt cx="0" cy="0"/>
+        </a:xfrm>
+      </p:grpSpPr>
+      <p:sp>
+        <p:nvSpPr>
+          <p:cNvPr id="2" name="Title 1">
+            <a:extLst>
+              <a:ext uri="{FF2B5EF4-FFF2-40B4-BE49-F238E27FC236}">
+                <a16:creationId xmlns:a16="http://schemas.microsoft.com/office/drawing/2014/main" id="{52FDF0B9-B3AB-3A17-8FC7-F4892A7DB154}"/>
+              </a:ext>
+            </a:extLst>
+          </p:cNvPr>
+          <p:cNvSpPr>
+            <a:spLocks noGrp="1"/>
+          </p:cNvSpPr>
+          <p:nvPr>
+            <p:ph type="title"/>
+          </p:nvPr>
+        </p:nvSpPr>
+        <p:spPr>
+          <a:xfrm>
+            <a:off x="1097280" y="191472"/>
+            <a:ext cx="10058400" cy="748452"/>
+          </a:xfrm>
+        </p:spPr>
+        <p:txBody>
+          <a:bodyPr/>
+          <a:lstStyle/>
+          <a:p>
+            <a:r>
+              <a:rPr lang="en-US" dirty="0"/>
+              <a:t>Insight 3</a:t>
+            </a:r>
+            <a:endParaRPr lang="en-IN" dirty="0"/>
+          </a:p>
+        </p:txBody>
+      </p:sp>
+      <p:sp>
+        <p:nvSpPr>
+          <p:cNvPr id="3" name="Content Placeholder 2">
+            <a:extLst>
+              <a:ext uri="{FF2B5EF4-FFF2-40B4-BE49-F238E27FC236}">
+                <a16:creationId xmlns:a16="http://schemas.microsoft.com/office/drawing/2014/main" id="{D955C1A0-F490-B7A4-0AE9-871F3F7C9B5D}"/>
+              </a:ext>
+            </a:extLst>
+          </p:cNvPr>
+          <p:cNvSpPr>
+            <a:spLocks noGrp="1"/>
+          </p:cNvSpPr>
+          <p:nvPr>
+            <p:ph idx="1"/>
+          </p:nvPr>
+        </p:nvSpPr>
+        <p:spPr>
+          <a:xfrm>
+            <a:off x="1097280" y="1065321"/>
+            <a:ext cx="10058400" cy="4652846"/>
+          </a:xfrm>
+        </p:spPr>
+        <p:txBody>
+          <a:bodyPr/>
+          <a:lstStyle/>
+          <a:p>
+            <a:pPr>
+              <a:buFont typeface="Wingdings" panose="05000000000000000000" pitchFamily="2" charset="2"/>
+              <a:buChar char="v"/>
+            </a:pPr>
+            <a:r>
+              <a:rPr lang="en-US" dirty="0"/>
+              <a:t>When the interest rate is very low, the percent of charged off loans is way to less when compared to the overall range. This means when the interest rate is very low, very few loans gets charged </a:t>
+            </a:r>
+            <a:r>
+              <a:rPr lang="en-US" sz="2000" dirty="0">
+                <a:cs typeface="Arial" panose="020B0604020202020204" pitchFamily="34" charset="0"/>
+              </a:rPr>
+              <a:t>off</a:t>
+            </a:r>
+          </a:p>
+          <a:p>
+            <a:pPr>
+              <a:buFont typeface="Wingdings" panose="05000000000000000000" pitchFamily="2" charset="2"/>
+              <a:buChar char="v"/>
+            </a:pPr>
+            <a:endParaRPr lang="en-US" dirty="0"/>
+          </a:p>
+          <a:p>
+            <a:pPr>
+              <a:buFont typeface="Wingdings" panose="05000000000000000000" pitchFamily="2" charset="2"/>
+              <a:buChar char="v"/>
+            </a:pPr>
+            <a:endParaRPr lang="en-US" dirty="0"/>
+          </a:p>
+          <a:p>
+            <a:pPr>
+              <a:buFont typeface="Wingdings" panose="05000000000000000000" pitchFamily="2" charset="2"/>
+              <a:buChar char="v"/>
+            </a:pPr>
+            <a:endParaRPr lang="en-US" dirty="0"/>
+          </a:p>
+          <a:p>
+            <a:pPr>
+              <a:buFont typeface="Wingdings" panose="05000000000000000000" pitchFamily="2" charset="2"/>
+              <a:buChar char="v"/>
+            </a:pPr>
+            <a:endParaRPr lang="en-US" dirty="0"/>
+          </a:p>
+          <a:p>
+            <a:pPr>
+              <a:buFont typeface="Wingdings" panose="05000000000000000000" pitchFamily="2" charset="2"/>
+              <a:buChar char="v"/>
+            </a:pPr>
+            <a:endParaRPr lang="en-US" dirty="0"/>
+          </a:p>
+          <a:p>
+            <a:pPr>
+              <a:buFont typeface="Wingdings" panose="05000000000000000000" pitchFamily="2" charset="2"/>
+              <a:buChar char="v"/>
+            </a:pPr>
+            <a:endParaRPr lang="en-US" dirty="0"/>
+          </a:p>
+          <a:p>
+            <a:pPr lvl="1">
+              <a:buFont typeface="Wingdings" panose="05000000000000000000" pitchFamily="2" charset="2"/>
+              <a:buChar char="v"/>
+            </a:pPr>
+            <a:endParaRPr lang="en-IN" sz="1400" dirty="0"/>
+          </a:p>
+        </p:txBody>
+      </p:sp>
+    </p:spTree>
+    <p:extLst>
+      <p:ext uri="{BB962C8B-B14F-4D97-AF65-F5344CB8AC3E}">
+        <p14:creationId xmlns:p14="http://schemas.microsoft.com/office/powerpoint/2010/main" val="4261551828"/>
+      </p:ext>
+    </p:extLst>
+  </p:cSld>
+  <p:clrMapOvr>
+    <a:masterClrMapping/>
+  </p:clrMapOvr>
+</p:sld>
+</file>
+
+<file path=ppt/slides/slide13.xml><?xml version="1.0" encoding="utf-8"?>
+<p:sld xmlns:a="http://schemas.openxmlformats.org/drawingml/2006/main" xmlns:r="http://schemas.openxmlformats.org/officeDocument/2006/relationships" xmlns:p="http://schemas.openxmlformats.org/presentationml/2006/main">
+  <p:cSld>
+    <p:spTree>
+      <p:nvGrpSpPr>
+        <p:cNvPr id="1" name=""/>
+        <p:cNvGrpSpPr/>
+        <p:nvPr/>
+      </p:nvGrpSpPr>
+      <p:grpSpPr>
+        <a:xfrm>
+          <a:off x="0" y="0"/>
+          <a:ext cx="0" cy="0"/>
+          <a:chOff x="0" y="0"/>
+          <a:chExt cx="0" cy="0"/>
+        </a:xfrm>
+      </p:grpSpPr>
+      <p:sp>
+        <p:nvSpPr>
+          <p:cNvPr id="2" name="Title 1">
+            <a:extLst>
+              <a:ext uri="{FF2B5EF4-FFF2-40B4-BE49-F238E27FC236}">
+                <a16:creationId xmlns:a16="http://schemas.microsoft.com/office/drawing/2014/main" id="{52FDF0B9-B3AB-3A17-8FC7-F4892A7DB154}"/>
+              </a:ext>
+            </a:extLst>
+          </p:cNvPr>
+          <p:cNvSpPr>
+            <a:spLocks noGrp="1"/>
+          </p:cNvSpPr>
+          <p:nvPr>
+            <p:ph type="title"/>
+          </p:nvPr>
+        </p:nvSpPr>
+        <p:spPr>
+          <a:xfrm>
+            <a:off x="1097280" y="191472"/>
+            <a:ext cx="10058400" cy="748452"/>
+          </a:xfrm>
+        </p:spPr>
+        <p:txBody>
+          <a:bodyPr/>
+          <a:lstStyle/>
+          <a:p>
+            <a:r>
+              <a:rPr lang="en-US" dirty="0"/>
+              <a:t>Insight 4</a:t>
+            </a:r>
+            <a:endParaRPr lang="en-IN" dirty="0"/>
+          </a:p>
+        </p:txBody>
+      </p:sp>
+      <p:sp>
+        <p:nvSpPr>
+          <p:cNvPr id="3" name="Content Placeholder 2">
+            <a:extLst>
+              <a:ext uri="{FF2B5EF4-FFF2-40B4-BE49-F238E27FC236}">
+                <a16:creationId xmlns:a16="http://schemas.microsoft.com/office/drawing/2014/main" id="{D955C1A0-F490-B7A4-0AE9-871F3F7C9B5D}"/>
+              </a:ext>
+            </a:extLst>
+          </p:cNvPr>
+          <p:cNvSpPr>
+            <a:spLocks noGrp="1"/>
+          </p:cNvSpPr>
+          <p:nvPr>
+            <p:ph idx="1"/>
+          </p:nvPr>
+        </p:nvSpPr>
+        <p:spPr>
+          <a:xfrm>
+            <a:off x="1097280" y="1278383"/>
+            <a:ext cx="10058400" cy="4439783"/>
+          </a:xfrm>
+        </p:spPr>
+        <p:txBody>
+          <a:bodyPr/>
+          <a:lstStyle/>
+          <a:p>
+            <a:pPr>
+              <a:buFont typeface="Wingdings" panose="05000000000000000000" pitchFamily="2" charset="2"/>
+              <a:buChar char="v"/>
+            </a:pPr>
+            <a:r>
+              <a:rPr lang="en-US" dirty="0"/>
+              <a:t>When the loan term is 60 months, 25% of the total loans  got charged off</a:t>
+            </a:r>
+          </a:p>
+          <a:p>
+            <a:pPr>
+              <a:buFont typeface="Wingdings" panose="05000000000000000000" pitchFamily="2" charset="2"/>
+              <a:buChar char="v"/>
+            </a:pPr>
+            <a:endParaRPr lang="en-US" dirty="0"/>
+          </a:p>
+          <a:p>
+            <a:pPr>
+              <a:buFont typeface="Wingdings" panose="05000000000000000000" pitchFamily="2" charset="2"/>
+              <a:buChar char="v"/>
+            </a:pPr>
+            <a:endParaRPr lang="en-US" dirty="0"/>
+          </a:p>
+          <a:p>
+            <a:pPr>
+              <a:buFont typeface="Wingdings" panose="05000000000000000000" pitchFamily="2" charset="2"/>
+              <a:buChar char="v"/>
+            </a:pPr>
+            <a:endParaRPr lang="en-US" dirty="0"/>
+          </a:p>
+          <a:p>
+            <a:pPr>
+              <a:buFont typeface="Wingdings" panose="05000000000000000000" pitchFamily="2" charset="2"/>
+              <a:buChar char="v"/>
+            </a:pPr>
+            <a:endParaRPr lang="en-US" dirty="0"/>
+          </a:p>
+          <a:p>
+            <a:pPr>
+              <a:buFont typeface="Wingdings" panose="05000000000000000000" pitchFamily="2" charset="2"/>
+              <a:buChar char="v"/>
+            </a:pPr>
+            <a:endParaRPr lang="en-US" dirty="0"/>
+          </a:p>
+          <a:p>
+            <a:pPr lvl="1">
+              <a:buFont typeface="Wingdings" panose="05000000000000000000" pitchFamily="2" charset="2"/>
+              <a:buChar char="v"/>
+            </a:pPr>
+            <a:endParaRPr lang="en-IN" sz="1400" dirty="0"/>
+          </a:p>
+        </p:txBody>
+      </p:sp>
+      <p:pic>
+        <p:nvPicPr>
+          <p:cNvPr id="20" name="Picture 19">
+            <a:extLst>
+              <a:ext uri="{FF2B5EF4-FFF2-40B4-BE49-F238E27FC236}">
+                <a16:creationId xmlns:a16="http://schemas.microsoft.com/office/drawing/2014/main" id="{043339AA-8066-C89B-4936-3F86B84D934B}"/>
+              </a:ext>
+            </a:extLst>
+          </p:cNvPr>
+          <p:cNvPicPr>
+            <a:picLocks noChangeAspect="1"/>
+          </p:cNvPicPr>
+          <p:nvPr/>
+        </p:nvPicPr>
+        <p:blipFill>
+          <a:blip r:embed="rId2"/>
+          <a:stretch>
+            <a:fillRect/>
+          </a:stretch>
+        </p:blipFill>
+        <p:spPr>
+          <a:xfrm>
+            <a:off x="3171816" y="2057485"/>
+            <a:ext cx="5377379" cy="4161623"/>
+          </a:xfrm>
+          <a:prstGeom prst="rect">
+            <a:avLst/>
+          </a:prstGeom>
+        </p:spPr>
+      </p:pic>
+    </p:spTree>
+    <p:extLst>
+      <p:ext uri="{BB962C8B-B14F-4D97-AF65-F5344CB8AC3E}">
+        <p14:creationId xmlns:p14="http://schemas.microsoft.com/office/powerpoint/2010/main" val="3301793802"/>
+      </p:ext>
+    </p:extLst>
+  </p:cSld>
+  <p:clrMapOvr>
+    <a:masterClrMapping/>
+  </p:clrMapOvr>
+</p:sld>
+</file>
+
+<file path=ppt/slides/slide14.xml><?xml version="1.0" encoding="utf-8"?>
+<p:sld xmlns:a="http://schemas.openxmlformats.org/drawingml/2006/main" xmlns:r="http://schemas.openxmlformats.org/officeDocument/2006/relationships" xmlns:p="http://schemas.openxmlformats.org/presentationml/2006/main">
+  <p:cSld>
+    <p:spTree>
+      <p:nvGrpSpPr>
+        <p:cNvPr id="1" name=""/>
+        <p:cNvGrpSpPr/>
+        <p:nvPr/>
+      </p:nvGrpSpPr>
+      <p:grpSpPr>
+        <a:xfrm>
+          <a:off x="0" y="0"/>
+          <a:ext cx="0" cy="0"/>
+          <a:chOff x="0" y="0"/>
+          <a:chExt cx="0" cy="0"/>
+        </a:xfrm>
+      </p:grpSpPr>
+      <p:sp>
+        <p:nvSpPr>
+          <p:cNvPr id="2" name="Title 1">
+            <a:extLst>
+              <a:ext uri="{FF2B5EF4-FFF2-40B4-BE49-F238E27FC236}">
+                <a16:creationId xmlns:a16="http://schemas.microsoft.com/office/drawing/2014/main" id="{52FDF0B9-B3AB-3A17-8FC7-F4892A7DB154}"/>
+              </a:ext>
+            </a:extLst>
+          </p:cNvPr>
+          <p:cNvSpPr>
+            <a:spLocks noGrp="1"/>
+          </p:cNvSpPr>
+          <p:nvPr>
+            <p:ph type="title"/>
+          </p:nvPr>
+        </p:nvSpPr>
+        <p:spPr>
+          <a:xfrm>
+            <a:off x="1097280" y="191472"/>
+            <a:ext cx="10058400" cy="748452"/>
+          </a:xfrm>
+        </p:spPr>
+        <p:txBody>
+          <a:bodyPr/>
+          <a:lstStyle/>
+          <a:p>
+            <a:r>
+              <a:rPr lang="en-US" dirty="0"/>
+              <a:t>Insight 5</a:t>
+            </a:r>
+            <a:endParaRPr lang="en-IN" dirty="0"/>
+          </a:p>
+        </p:txBody>
+      </p:sp>
+      <p:sp>
+        <p:nvSpPr>
+          <p:cNvPr id="3" name="Content Placeholder 2">
+            <a:extLst>
+              <a:ext uri="{FF2B5EF4-FFF2-40B4-BE49-F238E27FC236}">
+                <a16:creationId xmlns:a16="http://schemas.microsoft.com/office/drawing/2014/main" id="{D955C1A0-F490-B7A4-0AE9-871F3F7C9B5D}"/>
+              </a:ext>
+            </a:extLst>
+          </p:cNvPr>
+          <p:cNvSpPr>
+            <a:spLocks noGrp="1"/>
+          </p:cNvSpPr>
+          <p:nvPr>
+            <p:ph idx="1"/>
+          </p:nvPr>
+        </p:nvSpPr>
+        <p:spPr>
+          <a:xfrm>
+            <a:off x="1097280" y="912331"/>
+            <a:ext cx="10058400" cy="4805836"/>
+          </a:xfrm>
+        </p:spPr>
+        <p:txBody>
+          <a:bodyPr/>
+          <a:lstStyle/>
+          <a:p>
+            <a:pPr>
+              <a:buFont typeface="Wingdings" panose="05000000000000000000" pitchFamily="2" charset="2"/>
+              <a:buChar char="v"/>
+            </a:pPr>
+            <a:r>
+              <a:rPr lang="en-US" dirty="0"/>
+              <a:t>As the grade of loan moves from A to G, the percentage of charged off loans keeps increasing. While only 6% of the grade A loans ended up in charged off, in grade G over 33% of the loans are charged off</a:t>
+            </a:r>
+          </a:p>
+          <a:p>
+            <a:pPr>
+              <a:buFont typeface="Wingdings" panose="05000000000000000000" pitchFamily="2" charset="2"/>
+              <a:buChar char="v"/>
+            </a:pPr>
+            <a:endParaRPr lang="en-US" dirty="0"/>
+          </a:p>
+          <a:p>
+            <a:pPr>
+              <a:buFont typeface="Wingdings" panose="05000000000000000000" pitchFamily="2" charset="2"/>
+              <a:buChar char="v"/>
+            </a:pPr>
+            <a:endParaRPr lang="en-US" dirty="0"/>
+          </a:p>
+          <a:p>
+            <a:pPr>
+              <a:buFont typeface="Wingdings" panose="05000000000000000000" pitchFamily="2" charset="2"/>
+              <a:buChar char="v"/>
+            </a:pPr>
+            <a:endParaRPr lang="en-US" dirty="0"/>
+          </a:p>
+          <a:p>
+            <a:pPr>
+              <a:buFont typeface="Wingdings" panose="05000000000000000000" pitchFamily="2" charset="2"/>
+              <a:buChar char="v"/>
+            </a:pPr>
+            <a:endParaRPr lang="en-US" dirty="0"/>
+          </a:p>
+          <a:p>
+            <a:pPr lvl="1">
+              <a:buFont typeface="Wingdings" panose="05000000000000000000" pitchFamily="2" charset="2"/>
+              <a:buChar char="v"/>
+            </a:pPr>
+            <a:endParaRPr lang="en-IN" sz="1400" dirty="0"/>
+          </a:p>
+        </p:txBody>
+      </p:sp>
+      <p:pic>
+        <p:nvPicPr>
+          <p:cNvPr id="18" name="Picture 17">
+            <a:extLst>
+              <a:ext uri="{FF2B5EF4-FFF2-40B4-BE49-F238E27FC236}">
+                <a16:creationId xmlns:a16="http://schemas.microsoft.com/office/drawing/2014/main" id="{432B96F6-C84C-2F95-022D-31B4A65634E6}"/>
+              </a:ext>
+            </a:extLst>
+          </p:cNvPr>
+          <p:cNvPicPr>
+            <a:picLocks noChangeAspect="1"/>
+          </p:cNvPicPr>
+          <p:nvPr/>
+        </p:nvPicPr>
+        <p:blipFill>
+          <a:blip r:embed="rId2"/>
+          <a:stretch>
+            <a:fillRect/>
+          </a:stretch>
+        </p:blipFill>
+        <p:spPr>
+          <a:xfrm>
+            <a:off x="3278997" y="2008335"/>
+            <a:ext cx="5470488" cy="4294811"/>
+          </a:xfrm>
+          <a:prstGeom prst="rect">
+            <a:avLst/>
+          </a:prstGeom>
+        </p:spPr>
+      </p:pic>
+    </p:spTree>
+    <p:extLst>
+      <p:ext uri="{BB962C8B-B14F-4D97-AF65-F5344CB8AC3E}">
+        <p14:creationId xmlns:p14="http://schemas.microsoft.com/office/powerpoint/2010/main" val="2748959871"/>
+      </p:ext>
+    </p:extLst>
+  </p:cSld>
+  <p:clrMapOvr>
+    <a:masterClrMapping/>
+  </p:clrMapOvr>
+</p:sld>
+</file>
+
+<file path=ppt/slides/slide15.xml><?xml version="1.0" encoding="utf-8"?>
+<p:sld xmlns:a="http://schemas.openxmlformats.org/drawingml/2006/main" xmlns:r="http://schemas.openxmlformats.org/officeDocument/2006/relationships" xmlns:p="http://schemas.openxmlformats.org/presentationml/2006/main">
+  <p:cSld>
+    <p:spTree>
+      <p:nvGrpSpPr>
+        <p:cNvPr id="1" name=""/>
+        <p:cNvGrpSpPr/>
+        <p:nvPr/>
+      </p:nvGrpSpPr>
+      <p:grpSpPr>
+        <a:xfrm>
+          <a:off x="0" y="0"/>
+          <a:ext cx="0" cy="0"/>
+          <a:chOff x="0" y="0"/>
+          <a:chExt cx="0" cy="0"/>
+        </a:xfrm>
+      </p:grpSpPr>
+      <p:sp>
+        <p:nvSpPr>
+          <p:cNvPr id="2" name="Title 1">
+            <a:extLst>
+              <a:ext uri="{FF2B5EF4-FFF2-40B4-BE49-F238E27FC236}">
+                <a16:creationId xmlns:a16="http://schemas.microsoft.com/office/drawing/2014/main" id="{52FDF0B9-B3AB-3A17-8FC7-F4892A7DB154}"/>
+              </a:ext>
+            </a:extLst>
+          </p:cNvPr>
+          <p:cNvSpPr>
+            <a:spLocks noGrp="1"/>
+          </p:cNvSpPr>
+          <p:nvPr>
+            <p:ph type="title"/>
+          </p:nvPr>
+        </p:nvSpPr>
+        <p:spPr>
+          <a:xfrm>
+            <a:off x="1097280" y="191472"/>
+            <a:ext cx="10058400" cy="748452"/>
+          </a:xfrm>
+        </p:spPr>
+        <p:txBody>
+          <a:bodyPr/>
+          <a:lstStyle/>
+          <a:p>
+            <a:r>
+              <a:rPr lang="en-US" dirty="0"/>
+              <a:t>Insight 6</a:t>
+            </a:r>
+            <a:endParaRPr lang="en-IN" dirty="0"/>
+          </a:p>
+        </p:txBody>
+      </p:sp>
+      <p:sp>
+        <p:nvSpPr>
+          <p:cNvPr id="3" name="Content Placeholder 2">
+            <a:extLst>
+              <a:ext uri="{FF2B5EF4-FFF2-40B4-BE49-F238E27FC236}">
+                <a16:creationId xmlns:a16="http://schemas.microsoft.com/office/drawing/2014/main" id="{D955C1A0-F490-B7A4-0AE9-871F3F7C9B5D}"/>
+              </a:ext>
+            </a:extLst>
+          </p:cNvPr>
+          <p:cNvSpPr>
+            <a:spLocks noGrp="1"/>
+          </p:cNvSpPr>
+          <p:nvPr>
+            <p:ph idx="1"/>
+          </p:nvPr>
+        </p:nvSpPr>
+        <p:spPr>
+          <a:xfrm>
+            <a:off x="1097280" y="912331"/>
+            <a:ext cx="10058400" cy="4805836"/>
+          </a:xfrm>
+        </p:spPr>
+        <p:txBody>
+          <a:bodyPr/>
+          <a:lstStyle/>
+          <a:p>
+            <a:pPr>
+              <a:buFont typeface="Wingdings" panose="05000000000000000000" pitchFamily="2" charset="2"/>
+              <a:buChar char="v"/>
+            </a:pPr>
+            <a:r>
+              <a:rPr lang="en-US" dirty="0"/>
+              <a:t>In the F5 subgrade, almost 48% of the loans resulted in charged off loans. In these subgrades F5,G3,G2,F4,G5,G1 the charged off loans percentage is very high(more than 33%. At least One in every three loans got charged off)</a:t>
+            </a:r>
+          </a:p>
+          <a:p>
+            <a:pPr>
+              <a:buFont typeface="Wingdings" panose="05000000000000000000" pitchFamily="2" charset="2"/>
+              <a:buChar char="v"/>
+            </a:pPr>
+            <a:endParaRPr lang="en-US" dirty="0"/>
+          </a:p>
+          <a:p>
+            <a:pPr>
+              <a:buFont typeface="Wingdings" panose="05000000000000000000" pitchFamily="2" charset="2"/>
+              <a:buChar char="v"/>
+            </a:pPr>
+            <a:endParaRPr lang="en-US" dirty="0"/>
+          </a:p>
+          <a:p>
+            <a:pPr>
+              <a:buFont typeface="Wingdings" panose="05000000000000000000" pitchFamily="2" charset="2"/>
+              <a:buChar char="v"/>
+            </a:pPr>
+            <a:endParaRPr lang="en-US" dirty="0"/>
+          </a:p>
+          <a:p>
+            <a:pPr>
+              <a:buFont typeface="Wingdings" panose="05000000000000000000" pitchFamily="2" charset="2"/>
+              <a:buChar char="v"/>
+            </a:pPr>
+            <a:endParaRPr lang="en-US" dirty="0"/>
+          </a:p>
+          <a:p>
+            <a:pPr lvl="1">
+              <a:buFont typeface="Wingdings" panose="05000000000000000000" pitchFamily="2" charset="2"/>
+              <a:buChar char="v"/>
+            </a:pPr>
+            <a:endParaRPr lang="en-IN" sz="1400" dirty="0"/>
+          </a:p>
+        </p:txBody>
+      </p:sp>
+      <p:pic>
+        <p:nvPicPr>
+          <p:cNvPr id="16" name="Picture 15">
+            <a:extLst>
+              <a:ext uri="{FF2B5EF4-FFF2-40B4-BE49-F238E27FC236}">
+                <a16:creationId xmlns:a16="http://schemas.microsoft.com/office/drawing/2014/main" id="{96A09246-925E-6E93-BD06-CF0A40CF0F60}"/>
+              </a:ext>
+            </a:extLst>
+          </p:cNvPr>
+          <p:cNvPicPr>
+            <a:picLocks noChangeAspect="1"/>
+          </p:cNvPicPr>
+          <p:nvPr/>
+        </p:nvPicPr>
+        <p:blipFill>
+          <a:blip r:embed="rId2"/>
+          <a:stretch>
+            <a:fillRect/>
+          </a:stretch>
+        </p:blipFill>
+        <p:spPr>
+          <a:xfrm>
+            <a:off x="3656152" y="1962198"/>
+            <a:ext cx="6017163" cy="4394214"/>
+          </a:xfrm>
+          <a:prstGeom prst="rect">
+            <a:avLst/>
+          </a:prstGeom>
+        </p:spPr>
+      </p:pic>
+    </p:spTree>
+    <p:extLst>
+      <p:ext uri="{BB962C8B-B14F-4D97-AF65-F5344CB8AC3E}">
+        <p14:creationId xmlns:p14="http://schemas.microsoft.com/office/powerpoint/2010/main" val="45402649"/>
+      </p:ext>
+    </p:extLst>
+  </p:cSld>
+  <p:clrMapOvr>
+    <a:masterClrMapping/>
+  </p:clrMapOvr>
+</p:sld>
+</file>
+
+<file path=ppt/slides/slide16.xml><?xml version="1.0" encoding="utf-8"?>
+<p:sld xmlns:a="http://schemas.openxmlformats.org/drawingml/2006/main" xmlns:r="http://schemas.openxmlformats.org/officeDocument/2006/relationships" xmlns:p="http://schemas.openxmlformats.org/presentationml/2006/main">
+  <p:cSld>
+    <p:spTree>
+      <p:nvGrpSpPr>
+        <p:cNvPr id="1" name=""/>
+        <p:cNvGrpSpPr/>
+        <p:nvPr/>
+      </p:nvGrpSpPr>
+      <p:grpSpPr>
+        <a:xfrm>
+          <a:off x="0" y="0"/>
+          <a:ext cx="0" cy="0"/>
+          <a:chOff x="0" y="0"/>
+          <a:chExt cx="0" cy="0"/>
+        </a:xfrm>
+      </p:grpSpPr>
+      <p:sp>
+        <p:nvSpPr>
+          <p:cNvPr id="2" name="Title 1">
+            <a:extLst>
+              <a:ext uri="{FF2B5EF4-FFF2-40B4-BE49-F238E27FC236}">
+                <a16:creationId xmlns:a16="http://schemas.microsoft.com/office/drawing/2014/main" id="{52FDF0B9-B3AB-3A17-8FC7-F4892A7DB154}"/>
+              </a:ext>
+            </a:extLst>
+          </p:cNvPr>
+          <p:cNvSpPr>
+            <a:spLocks noGrp="1"/>
+          </p:cNvSpPr>
+          <p:nvPr>
+            <p:ph type="title"/>
+          </p:nvPr>
+        </p:nvSpPr>
+        <p:spPr>
+          <a:xfrm>
+            <a:off x="1097280" y="191472"/>
+            <a:ext cx="10058400" cy="748452"/>
+          </a:xfrm>
+        </p:spPr>
+        <p:txBody>
+          <a:bodyPr/>
+          <a:lstStyle/>
+          <a:p>
+            <a:r>
+              <a:rPr lang="en-US" dirty="0"/>
+              <a:t>Insight 7</a:t>
+            </a:r>
+            <a:endParaRPr lang="en-IN" dirty="0"/>
+          </a:p>
+        </p:txBody>
+      </p:sp>
+      <p:sp>
+        <p:nvSpPr>
+          <p:cNvPr id="3" name="Content Placeholder 2">
+            <a:extLst>
+              <a:ext uri="{FF2B5EF4-FFF2-40B4-BE49-F238E27FC236}">
+                <a16:creationId xmlns:a16="http://schemas.microsoft.com/office/drawing/2014/main" id="{D955C1A0-F490-B7A4-0AE9-871F3F7C9B5D}"/>
+              </a:ext>
+            </a:extLst>
+          </p:cNvPr>
+          <p:cNvSpPr>
+            <a:spLocks noGrp="1"/>
+          </p:cNvSpPr>
+          <p:nvPr>
+            <p:ph idx="1"/>
+          </p:nvPr>
+        </p:nvSpPr>
+        <p:spPr>
+          <a:xfrm>
+            <a:off x="1097280" y="1063257"/>
+            <a:ext cx="10058400" cy="4805836"/>
+          </a:xfrm>
+        </p:spPr>
+        <p:txBody>
+          <a:bodyPr/>
+          <a:lstStyle/>
+          <a:p>
+            <a:pPr>
+              <a:buFont typeface="Wingdings" panose="05000000000000000000" pitchFamily="2" charset="2"/>
+              <a:buChar char="v"/>
+            </a:pPr>
+            <a:r>
+              <a:rPr lang="en-US" dirty="0"/>
+              <a:t>Lending for the purpose of small business turned out to be risky. More than 27% of the total loans resulted in charged off, this is way more than the average of 16%</a:t>
+            </a:r>
+          </a:p>
+          <a:p>
+            <a:pPr>
+              <a:buFont typeface="Wingdings" panose="05000000000000000000" pitchFamily="2" charset="2"/>
+              <a:buChar char="v"/>
+            </a:pPr>
+            <a:endParaRPr lang="en-US" dirty="0"/>
+          </a:p>
+          <a:p>
+            <a:pPr>
+              <a:buFont typeface="Wingdings" panose="05000000000000000000" pitchFamily="2" charset="2"/>
+              <a:buChar char="v"/>
+            </a:pPr>
+            <a:endParaRPr lang="en-US" dirty="0"/>
+          </a:p>
+          <a:p>
+            <a:pPr>
+              <a:buFont typeface="Wingdings" panose="05000000000000000000" pitchFamily="2" charset="2"/>
+              <a:buChar char="v"/>
+            </a:pPr>
+            <a:endParaRPr lang="en-US" dirty="0"/>
+          </a:p>
+          <a:p>
+            <a:pPr lvl="1">
+              <a:buFont typeface="Wingdings" panose="05000000000000000000" pitchFamily="2" charset="2"/>
+              <a:buChar char="v"/>
+            </a:pPr>
+            <a:endParaRPr lang="en-IN" sz="1400" dirty="0"/>
+          </a:p>
+        </p:txBody>
+      </p:sp>
+      <p:pic>
+        <p:nvPicPr>
+          <p:cNvPr id="14" name="Picture 13">
+            <a:extLst>
+              <a:ext uri="{FF2B5EF4-FFF2-40B4-BE49-F238E27FC236}">
+                <a16:creationId xmlns:a16="http://schemas.microsoft.com/office/drawing/2014/main" id="{0426207A-4F76-43F7-35E9-A234BAE456A2}"/>
+              </a:ext>
+            </a:extLst>
+          </p:cNvPr>
+          <p:cNvPicPr>
+            <a:picLocks noChangeAspect="1"/>
+          </p:cNvPicPr>
+          <p:nvPr/>
+        </p:nvPicPr>
+        <p:blipFill>
+          <a:blip r:embed="rId2"/>
+          <a:stretch>
+            <a:fillRect/>
+          </a:stretch>
+        </p:blipFill>
+        <p:spPr>
+          <a:xfrm>
+            <a:off x="3335261" y="1965420"/>
+            <a:ext cx="4934321" cy="4213438"/>
+          </a:xfrm>
+          <a:prstGeom prst="rect">
+            <a:avLst/>
+          </a:prstGeom>
+        </p:spPr>
+      </p:pic>
+    </p:spTree>
+    <p:extLst>
+      <p:ext uri="{BB962C8B-B14F-4D97-AF65-F5344CB8AC3E}">
+        <p14:creationId xmlns:p14="http://schemas.microsoft.com/office/powerpoint/2010/main" val="2431763611"/>
+      </p:ext>
+    </p:extLst>
+  </p:cSld>
+  <p:clrMapOvr>
+    <a:masterClrMapping/>
+  </p:clrMapOvr>
+</p:sld>
+</file>
+
+<file path=ppt/slides/slide17.xml><?xml version="1.0" encoding="utf-8"?>
+<p:sld xmlns:a="http://schemas.openxmlformats.org/drawingml/2006/main" xmlns:r="http://schemas.openxmlformats.org/officeDocument/2006/relationships" xmlns:p="http://schemas.openxmlformats.org/presentationml/2006/main">
+  <p:cSld>
+    <p:spTree>
+      <p:nvGrpSpPr>
+        <p:cNvPr id="1" name=""/>
+        <p:cNvGrpSpPr/>
+        <p:nvPr/>
+      </p:nvGrpSpPr>
+      <p:grpSpPr>
+        <a:xfrm>
+          <a:off x="0" y="0"/>
+          <a:ext cx="0" cy="0"/>
+          <a:chOff x="0" y="0"/>
+          <a:chExt cx="0" cy="0"/>
+        </a:xfrm>
+      </p:grpSpPr>
+      <p:sp>
+        <p:nvSpPr>
+          <p:cNvPr id="2" name="Title 1">
+            <a:extLst>
+              <a:ext uri="{FF2B5EF4-FFF2-40B4-BE49-F238E27FC236}">
+                <a16:creationId xmlns:a16="http://schemas.microsoft.com/office/drawing/2014/main" id="{52FDF0B9-B3AB-3A17-8FC7-F4892A7DB154}"/>
+              </a:ext>
+            </a:extLst>
+          </p:cNvPr>
+          <p:cNvSpPr>
+            <a:spLocks noGrp="1"/>
+          </p:cNvSpPr>
+          <p:nvPr>
+            <p:ph type="title"/>
+          </p:nvPr>
+        </p:nvSpPr>
+        <p:spPr>
+          <a:xfrm>
+            <a:off x="1097280" y="191472"/>
+            <a:ext cx="10058400" cy="748452"/>
+          </a:xfrm>
+        </p:spPr>
+        <p:txBody>
+          <a:bodyPr/>
+          <a:lstStyle/>
+          <a:p>
+            <a:r>
+              <a:rPr lang="en-US" dirty="0"/>
+              <a:t>Insight 8</a:t>
+            </a:r>
+            <a:endParaRPr lang="en-IN" dirty="0"/>
+          </a:p>
+        </p:txBody>
+      </p:sp>
+      <p:sp>
+        <p:nvSpPr>
+          <p:cNvPr id="3" name="Content Placeholder 2">
+            <a:extLst>
+              <a:ext uri="{FF2B5EF4-FFF2-40B4-BE49-F238E27FC236}">
+                <a16:creationId xmlns:a16="http://schemas.microsoft.com/office/drawing/2014/main" id="{D955C1A0-F490-B7A4-0AE9-871F3F7C9B5D}"/>
+              </a:ext>
+            </a:extLst>
+          </p:cNvPr>
+          <p:cNvSpPr>
+            <a:spLocks noGrp="1"/>
+          </p:cNvSpPr>
+          <p:nvPr>
+            <p:ph idx="1"/>
+          </p:nvPr>
+        </p:nvSpPr>
+        <p:spPr>
+          <a:xfrm>
+            <a:off x="1097280" y="1063257"/>
+            <a:ext cx="10058400" cy="4805836"/>
+          </a:xfrm>
+        </p:spPr>
+        <p:txBody>
+          <a:bodyPr/>
+          <a:lstStyle/>
+          <a:p>
+            <a:pPr>
+              <a:buFont typeface="Wingdings" panose="05000000000000000000" pitchFamily="2" charset="2"/>
+              <a:buChar char="v"/>
+            </a:pPr>
+            <a:r>
+              <a:rPr lang="en-US" dirty="0"/>
+              <a:t>The percentage of charged off loans is around 15% in most cases except DC-7% and NV-22.5%</a:t>
+            </a:r>
+          </a:p>
+          <a:p>
+            <a:pPr>
+              <a:buFont typeface="Wingdings" panose="05000000000000000000" pitchFamily="2" charset="2"/>
+              <a:buChar char="v"/>
+            </a:pPr>
+            <a:endParaRPr lang="en-US" dirty="0"/>
+          </a:p>
+          <a:p>
+            <a:pPr>
+              <a:buFont typeface="Wingdings" panose="05000000000000000000" pitchFamily="2" charset="2"/>
+              <a:buChar char="v"/>
+            </a:pPr>
+            <a:endParaRPr lang="en-US" dirty="0"/>
+          </a:p>
+          <a:p>
+            <a:pPr>
+              <a:buFont typeface="Wingdings" panose="05000000000000000000" pitchFamily="2" charset="2"/>
+              <a:buChar char="v"/>
+            </a:pPr>
+            <a:endParaRPr lang="en-US" dirty="0"/>
+          </a:p>
+          <a:p>
+            <a:pPr lvl="1">
+              <a:buFont typeface="Wingdings" panose="05000000000000000000" pitchFamily="2" charset="2"/>
+              <a:buChar char="v"/>
+            </a:pPr>
+            <a:endParaRPr lang="en-IN" sz="1400" dirty="0"/>
+          </a:p>
+        </p:txBody>
+      </p:sp>
+      <p:pic>
+        <p:nvPicPr>
+          <p:cNvPr id="5" name="Picture 4">
+            <a:extLst>
+              <a:ext uri="{FF2B5EF4-FFF2-40B4-BE49-F238E27FC236}">
+                <a16:creationId xmlns:a16="http://schemas.microsoft.com/office/drawing/2014/main" id="{B6FBC7A8-19A5-F712-887A-BDFE73B5D61C}"/>
+              </a:ext>
+            </a:extLst>
+          </p:cNvPr>
+          <p:cNvPicPr>
+            <a:picLocks noChangeAspect="1"/>
+          </p:cNvPicPr>
+          <p:nvPr/>
+        </p:nvPicPr>
+        <p:blipFill>
+          <a:blip r:embed="rId2"/>
+          <a:stretch>
+            <a:fillRect/>
+          </a:stretch>
+        </p:blipFill>
+        <p:spPr>
+          <a:xfrm>
+            <a:off x="2999204" y="1945448"/>
+            <a:ext cx="5789224" cy="4286677"/>
+          </a:xfrm>
+          <a:prstGeom prst="rect">
+            <a:avLst/>
+          </a:prstGeom>
+        </p:spPr>
+      </p:pic>
+    </p:spTree>
+    <p:extLst>
+      <p:ext uri="{BB962C8B-B14F-4D97-AF65-F5344CB8AC3E}">
+        <p14:creationId xmlns:p14="http://schemas.microsoft.com/office/powerpoint/2010/main" val="3394608202"/>
+      </p:ext>
+    </p:extLst>
+  </p:cSld>
+  <p:clrMapOvr>
+    <a:masterClrMapping/>
+  </p:clrMapOvr>
+</p:sld>
+</file>
+
+<file path=ppt/slides/slide18.xml><?xml version="1.0" encoding="utf-8"?>
+<p:sld xmlns:a="http://schemas.openxmlformats.org/drawingml/2006/main" xmlns:r="http://schemas.openxmlformats.org/officeDocument/2006/relationships" xmlns:p="http://schemas.openxmlformats.org/presentationml/2006/main">
+  <p:cSld>
+    <p:spTree>
+      <p:nvGrpSpPr>
+        <p:cNvPr id="1" name=""/>
+        <p:cNvGrpSpPr/>
+        <p:nvPr/>
+      </p:nvGrpSpPr>
+      <p:grpSpPr>
+        <a:xfrm>
+          <a:off x="0" y="0"/>
+          <a:ext cx="0" cy="0"/>
+          <a:chOff x="0" y="0"/>
+          <a:chExt cx="0" cy="0"/>
+        </a:xfrm>
+      </p:grpSpPr>
+      <p:sp>
+        <p:nvSpPr>
+          <p:cNvPr id="2" name="Title 1">
+            <a:extLst>
+              <a:ext uri="{FF2B5EF4-FFF2-40B4-BE49-F238E27FC236}">
+                <a16:creationId xmlns:a16="http://schemas.microsoft.com/office/drawing/2014/main" id="{52FDF0B9-B3AB-3A17-8FC7-F4892A7DB154}"/>
+              </a:ext>
+            </a:extLst>
+          </p:cNvPr>
+          <p:cNvSpPr>
+            <a:spLocks noGrp="1"/>
+          </p:cNvSpPr>
+          <p:nvPr>
+            <p:ph type="title"/>
+          </p:nvPr>
+        </p:nvSpPr>
+        <p:spPr>
+          <a:xfrm>
+            <a:off x="1097280" y="191472"/>
+            <a:ext cx="10058400" cy="748452"/>
+          </a:xfrm>
+        </p:spPr>
+        <p:txBody>
+          <a:bodyPr/>
+          <a:lstStyle/>
+          <a:p>
+            <a:r>
+              <a:rPr lang="en-US" dirty="0"/>
+              <a:t>Insight 9</a:t>
+            </a:r>
+            <a:endParaRPr lang="en-IN" dirty="0"/>
+          </a:p>
+        </p:txBody>
+      </p:sp>
+      <p:sp>
+        <p:nvSpPr>
+          <p:cNvPr id="3" name="Content Placeholder 2">
+            <a:extLst>
+              <a:ext uri="{FF2B5EF4-FFF2-40B4-BE49-F238E27FC236}">
+                <a16:creationId xmlns:a16="http://schemas.microsoft.com/office/drawing/2014/main" id="{D955C1A0-F490-B7A4-0AE9-871F3F7C9B5D}"/>
+              </a:ext>
+            </a:extLst>
+          </p:cNvPr>
+          <p:cNvSpPr>
+            <a:spLocks noGrp="1"/>
+          </p:cNvSpPr>
+          <p:nvPr>
+            <p:ph idx="1"/>
+          </p:nvPr>
+        </p:nvSpPr>
+        <p:spPr>
+          <a:xfrm>
+            <a:off x="1097280" y="1063257"/>
+            <a:ext cx="10058400" cy="4805836"/>
+          </a:xfrm>
+        </p:spPr>
+        <p:txBody>
+          <a:bodyPr/>
+          <a:lstStyle/>
+          <a:p>
+            <a:pPr>
+              <a:buFont typeface="Wingdings" panose="05000000000000000000" pitchFamily="2" charset="2"/>
+              <a:buChar char="v"/>
+            </a:pPr>
+            <a:r>
+              <a:rPr lang="en-US" dirty="0"/>
+              <a:t>When there is one </a:t>
+            </a:r>
+            <a:r>
+              <a:rPr lang="en-US" dirty="0" err="1"/>
+              <a:t>pubrec</a:t>
+            </a:r>
+            <a:r>
+              <a:rPr lang="en-US" dirty="0"/>
+              <a:t>, the percent of charged off loans is high when compared to average</a:t>
+            </a:r>
+          </a:p>
+          <a:p>
+            <a:pPr lvl="1">
+              <a:buFont typeface="Wingdings" panose="05000000000000000000" pitchFamily="2" charset="2"/>
+              <a:buChar char="v"/>
+            </a:pPr>
+            <a:endParaRPr lang="en-IN" sz="1400" dirty="0"/>
+          </a:p>
+        </p:txBody>
+      </p:sp>
+      <p:pic>
+        <p:nvPicPr>
+          <p:cNvPr id="7" name="Picture 6">
+            <a:extLst>
+              <a:ext uri="{FF2B5EF4-FFF2-40B4-BE49-F238E27FC236}">
+                <a16:creationId xmlns:a16="http://schemas.microsoft.com/office/drawing/2014/main" id="{4AC25735-36AD-4844-3A7A-890EA23F9CE4}"/>
+              </a:ext>
+            </a:extLst>
+          </p:cNvPr>
+          <p:cNvPicPr>
+            <a:picLocks noChangeAspect="1"/>
+          </p:cNvPicPr>
+          <p:nvPr/>
+        </p:nvPicPr>
+        <p:blipFill>
+          <a:blip r:embed="rId2"/>
+          <a:stretch>
+            <a:fillRect/>
+          </a:stretch>
+        </p:blipFill>
+        <p:spPr>
+          <a:xfrm>
+            <a:off x="2788373" y="2014537"/>
+            <a:ext cx="5491965" cy="3977889"/>
+          </a:xfrm>
+          <a:prstGeom prst="rect">
+            <a:avLst/>
+          </a:prstGeom>
+        </p:spPr>
+      </p:pic>
+    </p:spTree>
+    <p:extLst>
+      <p:ext uri="{BB962C8B-B14F-4D97-AF65-F5344CB8AC3E}">
+        <p14:creationId xmlns:p14="http://schemas.microsoft.com/office/powerpoint/2010/main" val="2891702152"/>
+      </p:ext>
+    </p:extLst>
+  </p:cSld>
+  <p:clrMapOvr>
+    <a:masterClrMapping/>
+  </p:clrMapOvr>
+</p:sld>
+</file>
+
+<file path=ppt/slides/slide19.xml><?xml version="1.0" encoding="utf-8"?>
+<p:sld xmlns:a="http://schemas.openxmlformats.org/drawingml/2006/main" xmlns:r="http://schemas.openxmlformats.org/officeDocument/2006/relationships" xmlns:p="http://schemas.openxmlformats.org/presentationml/2006/main">
+  <p:cSld>
+    <p:spTree>
+      <p:nvGrpSpPr>
+        <p:cNvPr id="1" name=""/>
+        <p:cNvGrpSpPr/>
+        <p:nvPr/>
+      </p:nvGrpSpPr>
+      <p:grpSpPr>
+        <a:xfrm>
+          <a:off x="0" y="0"/>
+          <a:ext cx="0" cy="0"/>
+          <a:chOff x="0" y="0"/>
+          <a:chExt cx="0" cy="0"/>
+        </a:xfrm>
+      </p:grpSpPr>
+      <p:sp>
+        <p:nvSpPr>
+          <p:cNvPr id="2" name="Title 1">
+            <a:extLst>
+              <a:ext uri="{FF2B5EF4-FFF2-40B4-BE49-F238E27FC236}">
+                <a16:creationId xmlns:a16="http://schemas.microsoft.com/office/drawing/2014/main" id="{52FDF0B9-B3AB-3A17-8FC7-F4892A7DB154}"/>
+              </a:ext>
+            </a:extLst>
+          </p:cNvPr>
+          <p:cNvSpPr>
+            <a:spLocks noGrp="1"/>
+          </p:cNvSpPr>
+          <p:nvPr>
+            <p:ph type="title"/>
+          </p:nvPr>
+        </p:nvSpPr>
+        <p:spPr>
+          <a:xfrm>
+            <a:off x="1097280" y="191472"/>
+            <a:ext cx="10058400" cy="748452"/>
+          </a:xfrm>
+        </p:spPr>
+        <p:txBody>
+          <a:bodyPr/>
+          <a:lstStyle/>
+          <a:p>
+            <a:r>
+              <a:rPr lang="en-US" dirty="0"/>
+              <a:t>Insight 10</a:t>
+            </a:r>
+            <a:endParaRPr lang="en-IN" dirty="0"/>
+          </a:p>
+        </p:txBody>
+      </p:sp>
+      <p:sp>
+        <p:nvSpPr>
+          <p:cNvPr id="3" name="Content Placeholder 2">
+            <a:extLst>
+              <a:ext uri="{FF2B5EF4-FFF2-40B4-BE49-F238E27FC236}">
+                <a16:creationId xmlns:a16="http://schemas.microsoft.com/office/drawing/2014/main" id="{D955C1A0-F490-B7A4-0AE9-871F3F7C9B5D}"/>
+              </a:ext>
+            </a:extLst>
+          </p:cNvPr>
+          <p:cNvSpPr>
+            <a:spLocks noGrp="1"/>
+          </p:cNvSpPr>
+          <p:nvPr>
+            <p:ph idx="1"/>
+          </p:nvPr>
+        </p:nvSpPr>
+        <p:spPr>
+          <a:xfrm>
+            <a:off x="1097280" y="1063257"/>
+            <a:ext cx="10058400" cy="4805836"/>
+          </a:xfrm>
+        </p:spPr>
+        <p:txBody>
+          <a:bodyPr/>
+          <a:lstStyle/>
+          <a:p>
+            <a:pPr>
+              <a:buFont typeface="Wingdings" panose="05000000000000000000" pitchFamily="2" charset="2"/>
+              <a:buChar char="v"/>
+            </a:pPr>
+            <a:r>
+              <a:rPr lang="en-US" dirty="0"/>
+              <a:t>When there is one </a:t>
+            </a:r>
+            <a:r>
+              <a:rPr lang="en-US" dirty="0" err="1"/>
+              <a:t>pub_rec</a:t>
+            </a:r>
+            <a:r>
+              <a:rPr lang="en-US" dirty="0"/>
+              <a:t>, bankruptcy, the percent of charged off loans is high when compared to average</a:t>
+            </a:r>
+          </a:p>
+          <a:p>
+            <a:pPr lvl="1">
+              <a:buFont typeface="Wingdings" panose="05000000000000000000" pitchFamily="2" charset="2"/>
+              <a:buChar char="v"/>
+            </a:pPr>
+            <a:endParaRPr lang="en-IN" sz="1400" dirty="0"/>
+          </a:p>
+        </p:txBody>
+      </p:sp>
+      <p:pic>
+        <p:nvPicPr>
+          <p:cNvPr id="5" name="Picture 4">
+            <a:extLst>
+              <a:ext uri="{FF2B5EF4-FFF2-40B4-BE49-F238E27FC236}">
+                <a16:creationId xmlns:a16="http://schemas.microsoft.com/office/drawing/2014/main" id="{AC20BDD2-EAA3-76DE-EF46-7C03FA3C15AE}"/>
+              </a:ext>
+            </a:extLst>
+          </p:cNvPr>
+          <p:cNvPicPr>
+            <a:picLocks noChangeAspect="1"/>
+          </p:cNvPicPr>
+          <p:nvPr/>
+        </p:nvPicPr>
+        <p:blipFill>
+          <a:blip r:embed="rId2"/>
+          <a:stretch>
+            <a:fillRect/>
+          </a:stretch>
+        </p:blipFill>
+        <p:spPr>
+          <a:xfrm>
+            <a:off x="3307334" y="2080277"/>
+            <a:ext cx="5481559" cy="3977889"/>
+          </a:xfrm>
+          <a:prstGeom prst="rect">
+            <a:avLst/>
+          </a:prstGeom>
+        </p:spPr>
+      </p:pic>
+    </p:spTree>
+    <p:extLst>
+      <p:ext uri="{BB962C8B-B14F-4D97-AF65-F5344CB8AC3E}">
+        <p14:creationId xmlns:p14="http://schemas.microsoft.com/office/powerpoint/2010/main" val="3565307341"/>
+      </p:ext>
+    </p:extLst>
+  </p:cSld>
+  <p:clrMapOvr>
+    <a:masterClrMapping/>
+  </p:clrMapOvr>
+</p:sld>
+</file>
+
 <file path=ppt/slides/slide2.xml><?xml version="1.0" encoding="utf-8"?>
 <p:sld xmlns:a="http://schemas.openxmlformats.org/drawingml/2006/main" xmlns:r="http://schemas.openxmlformats.org/officeDocument/2006/relationships" xmlns:p="http://schemas.openxmlformats.org/presentationml/2006/main">
   <p:cSld>
@@ -4112,7 +5695,7 @@
         </p:spPr>
         <p:txBody>
           <a:bodyPr>
-            <a:normAutofit fontScale="77500" lnSpcReduction="20000"/>
+            <a:normAutofit/>
           </a:bodyPr>
           <a:lstStyle/>
           <a:p>
@@ -4122,7 +5705,7 @@
             </a:pPr>
             <a:r>
               <a:rPr lang="en-US" dirty="0"/>
-              <a:t>Problem statement (1-2 slides)</a:t>
+              <a:t>Problem statement </a:t>
             </a:r>
           </a:p>
           <a:p>
@@ -4142,7 +5725,7 @@
             </a:pPr>
             <a:r>
               <a:rPr lang="en-US" dirty="0"/>
-              <a:t>Approach (2-3 slides)</a:t>
+              <a:t>Approach</a:t>
             </a:r>
           </a:p>
           <a:p>
@@ -4152,15 +5735,7 @@
             </a:pPr>
             <a:r>
               <a:rPr lang="en-US" dirty="0"/>
-              <a:t>Results (only relevant charts with some </a:t>
-            </a:r>
-            <a:r>
-              <a:rPr lang="en-US" dirty="0" err="1"/>
-              <a:t>explaination</a:t>
-            </a:r>
-            <a:r>
-              <a:rPr lang="en-US" dirty="0"/>
-              <a:t>/observation)</a:t>
+              <a:t>Insights</a:t>
             </a:r>
           </a:p>
           <a:p>
@@ -4172,66 +5747,6 @@
               <a:rPr lang="en-US" dirty="0"/>
               <a:t>Recommendation and conclusion</a:t>
             </a:r>
-          </a:p>
-          <a:p>
-            <a:pPr marL="0" indent="0">
-              <a:buNone/>
-            </a:pPr>
-            <a:r>
-              <a:rPr lang="en-US" dirty="0"/>
-              <a:t>Tips for ppt  </a:t>
-            </a:r>
-          </a:p>
-          <a:p>
-            <a:pPr>
-              <a:buFontTx/>
-              <a:buChar char="-"/>
-            </a:pPr>
-            <a:r>
-              <a:rPr lang="en-US" dirty="0"/>
-              <a:t>no code  </a:t>
-            </a:r>
-          </a:p>
-          <a:p>
-            <a:pPr>
-              <a:buFontTx/>
-              <a:buChar char="-"/>
-            </a:pPr>
-            <a:r>
-              <a:rPr lang="en-US" dirty="0"/>
-              <a:t>ppt should be crisp, clear and to the point  </a:t>
-            </a:r>
-          </a:p>
-          <a:p>
-            <a:pPr>
-              <a:buFontTx/>
-              <a:buChar char="-"/>
-            </a:pPr>
-            <a:r>
-              <a:rPr lang="en-US" dirty="0"/>
-              <a:t>chart with proper labels  </a:t>
-            </a:r>
-          </a:p>
-          <a:p>
-            <a:pPr>
-              <a:buFontTx/>
-              <a:buChar char="-"/>
-            </a:pPr>
-            <a:r>
-              <a:rPr lang="en-US" dirty="0"/>
-              <a:t>title of chart  </a:t>
-            </a:r>
-          </a:p>
-          <a:p>
-            <a:pPr>
-              <a:buFontTx/>
-              <a:buChar char="-"/>
-            </a:pPr>
-            <a:r>
-              <a:rPr lang="en-US" dirty="0"/>
-              <a:t>size of the chart should be easy to understand... not to small and not too big8. </a:t>
-            </a:r>
-            <a:endParaRPr lang="en-IN" dirty="0"/>
           </a:p>
         </p:txBody>
       </p:sp>
@@ -4315,7 +5830,19 @@
           <a:bodyPr/>
           <a:lstStyle/>
           <a:p>
-            <a:endParaRPr lang="en-IN"/>
+            <a:r>
+              <a:rPr lang="en-US" b="1" i="0" dirty="0">
+                <a:solidFill>
+                  <a:schemeClr val="tx1"/>
+                </a:solidFill>
+                <a:effectLst/>
+                <a:highlight>
+                  <a:srgbClr val="FFFFFF"/>
+                </a:highlight>
+                <a:latin typeface="system-ui"/>
+              </a:rPr>
+              <a:t>Objective of case study is to understand the driving factors (or driver variables) behind loan default i.e. the variables which are strong indicators of default</a:t>
+            </a:r>
           </a:p>
         </p:txBody>
       </p:sp>
@@ -4464,33 +5991,334 @@
       </p:sp>
       <p:sp>
         <p:nvSpPr>
-          <p:cNvPr id="3" name="Content Placeholder 2">
-            <a:extLst>
-              <a:ext uri="{FF2B5EF4-FFF2-40B4-BE49-F238E27FC236}">
-                <a16:creationId xmlns:a16="http://schemas.microsoft.com/office/drawing/2014/main" id="{D955C1A0-F490-B7A4-0AE9-871F3F7C9B5D}"/>
-              </a:ext>
-            </a:extLst>
-          </p:cNvPr>
-          <p:cNvSpPr>
-            <a:spLocks noGrp="1"/>
-          </p:cNvSpPr>
-          <p:nvPr>
-            <p:ph idx="1"/>
-          </p:nvPr>
-        </p:nvSpPr>
-        <p:spPr/>
-        <p:txBody>
-          <a:bodyPr/>
-          <a:lstStyle/>
-          <a:p>
-            <a:endParaRPr lang="en-IN"/>
+          <p:cNvPr id="4" name="Content Placeholder 2">
+            <a:extLst>
+              <a:ext uri="{FF2B5EF4-FFF2-40B4-BE49-F238E27FC236}">
+                <a16:creationId xmlns:a16="http://schemas.microsoft.com/office/drawing/2014/main" id="{48F976D1-9F35-91B5-0DA9-9749E0976833}"/>
+              </a:ext>
+            </a:extLst>
+          </p:cNvPr>
+          <p:cNvSpPr txBox="1">
+            <a:spLocks/>
+          </p:cNvSpPr>
+          <p:nvPr/>
+        </p:nvSpPr>
+        <p:spPr>
+          <a:xfrm>
+            <a:off x="1097280" y="2009555"/>
+            <a:ext cx="10058400" cy="4805836"/>
+          </a:xfrm>
+          <a:prstGeom prst="rect">
+            <a:avLst/>
+          </a:prstGeom>
+        </p:spPr>
+        <p:txBody>
+          <a:bodyPr vert="horz" lIns="0" tIns="45720" rIns="0" bIns="45720" rtlCol="0">
+            <a:normAutofit/>
+          </a:bodyPr>
+          <a:lstStyle>
+            <a:lvl1pPr marL="91440" indent="-91440" algn="l" defTabSz="914400" rtl="0" eaLnBrk="1" latinLnBrk="0" hangingPunct="1">
+              <a:lnSpc>
+                <a:spcPct val="110000"/>
+              </a:lnSpc>
+              <a:spcBef>
+                <a:spcPts val="1200"/>
+              </a:spcBef>
+              <a:spcAft>
+                <a:spcPts val="200"/>
+              </a:spcAft>
+              <a:buClr>
+                <a:schemeClr val="accent1"/>
+              </a:buClr>
+              <a:buSzPct val="100000"/>
+              <a:buFont typeface="Calibri" panose="020F0502020204030204" pitchFamily="34" charset="0"/>
+              <a:buChar char=" "/>
+              <a:defRPr sz="1900" kern="1200">
+                <a:solidFill>
+                  <a:schemeClr val="tx1">
+                    <a:lumMod val="75000"/>
+                    <a:lumOff val="25000"/>
+                  </a:schemeClr>
+                </a:solidFill>
+                <a:latin typeface="+mn-lt"/>
+                <a:ea typeface="+mn-ea"/>
+                <a:cs typeface="+mn-cs"/>
+              </a:defRPr>
+            </a:lvl1pPr>
+            <a:lvl2pPr marL="384048" indent="-182880" algn="l" defTabSz="914400" rtl="0" eaLnBrk="1" latinLnBrk="0" hangingPunct="1">
+              <a:lnSpc>
+                <a:spcPct val="100000"/>
+              </a:lnSpc>
+              <a:spcBef>
+                <a:spcPts val="200"/>
+              </a:spcBef>
+              <a:spcAft>
+                <a:spcPts val="400"/>
+              </a:spcAft>
+              <a:buClrTx/>
+              <a:buFont typeface="Calibri" pitchFamily="34" charset="0"/>
+              <a:buChar char="◦"/>
+              <a:defRPr sz="1700" kern="1200">
+                <a:solidFill>
+                  <a:schemeClr val="tx1">
+                    <a:lumMod val="75000"/>
+                    <a:lumOff val="25000"/>
+                  </a:schemeClr>
+                </a:solidFill>
+                <a:latin typeface="+mn-lt"/>
+                <a:ea typeface="+mn-ea"/>
+                <a:cs typeface="+mn-cs"/>
+              </a:defRPr>
+            </a:lvl2pPr>
+            <a:lvl3pPr marL="566928" indent="-182880" algn="l" defTabSz="914400" rtl="0" eaLnBrk="1" latinLnBrk="0" hangingPunct="1">
+              <a:lnSpc>
+                <a:spcPct val="100000"/>
+              </a:lnSpc>
+              <a:spcBef>
+                <a:spcPts val="200"/>
+              </a:spcBef>
+              <a:spcAft>
+                <a:spcPts val="400"/>
+              </a:spcAft>
+              <a:buClrTx/>
+              <a:buFont typeface="Calibri" pitchFamily="34" charset="0"/>
+              <a:buChar char="◦"/>
+              <a:defRPr sz="1300" kern="1200">
+                <a:solidFill>
+                  <a:schemeClr val="tx1">
+                    <a:lumMod val="75000"/>
+                    <a:lumOff val="25000"/>
+                  </a:schemeClr>
+                </a:solidFill>
+                <a:latin typeface="+mn-lt"/>
+                <a:ea typeface="+mn-ea"/>
+                <a:cs typeface="+mn-cs"/>
+              </a:defRPr>
+            </a:lvl3pPr>
+            <a:lvl4pPr marL="749808" indent="-182880" algn="l" defTabSz="914400" rtl="0" eaLnBrk="1" latinLnBrk="0" hangingPunct="1">
+              <a:lnSpc>
+                <a:spcPct val="100000"/>
+              </a:lnSpc>
+              <a:spcBef>
+                <a:spcPts val="200"/>
+              </a:spcBef>
+              <a:spcAft>
+                <a:spcPts val="400"/>
+              </a:spcAft>
+              <a:buClrTx/>
+              <a:buFont typeface="Calibri" pitchFamily="34" charset="0"/>
+              <a:buChar char="◦"/>
+              <a:defRPr sz="1300" kern="1200">
+                <a:solidFill>
+                  <a:schemeClr val="tx1">
+                    <a:lumMod val="75000"/>
+                    <a:lumOff val="25000"/>
+                  </a:schemeClr>
+                </a:solidFill>
+                <a:latin typeface="+mn-lt"/>
+                <a:ea typeface="+mn-ea"/>
+                <a:cs typeface="+mn-cs"/>
+              </a:defRPr>
+            </a:lvl4pPr>
+            <a:lvl5pPr marL="932688" indent="-182880" algn="l" defTabSz="914400" rtl="0" eaLnBrk="1" latinLnBrk="0" hangingPunct="1">
+              <a:lnSpc>
+                <a:spcPct val="100000"/>
+              </a:lnSpc>
+              <a:spcBef>
+                <a:spcPts val="200"/>
+              </a:spcBef>
+              <a:spcAft>
+                <a:spcPts val="400"/>
+              </a:spcAft>
+              <a:buClrTx/>
+              <a:buFont typeface="Calibri" pitchFamily="34" charset="0"/>
+              <a:buChar char="◦"/>
+              <a:defRPr sz="1300" kern="1200">
+                <a:solidFill>
+                  <a:schemeClr val="tx1">
+                    <a:lumMod val="75000"/>
+                    <a:lumOff val="25000"/>
+                  </a:schemeClr>
+                </a:solidFill>
+                <a:latin typeface="+mn-lt"/>
+                <a:ea typeface="+mn-ea"/>
+                <a:cs typeface="+mn-cs"/>
+              </a:defRPr>
+            </a:lvl5pPr>
+            <a:lvl6pPr marL="1100000" indent="-228600" algn="l" defTabSz="914400" rtl="0" eaLnBrk="1" latinLnBrk="0" hangingPunct="1">
+              <a:lnSpc>
+                <a:spcPct val="90000"/>
+              </a:lnSpc>
+              <a:spcBef>
+                <a:spcPts val="200"/>
+              </a:spcBef>
+              <a:spcAft>
+                <a:spcPts val="400"/>
+              </a:spcAft>
+              <a:buClr>
+                <a:schemeClr val="accent1"/>
+              </a:buClr>
+              <a:buFont typeface="Calibri" pitchFamily="34" charset="0"/>
+              <a:buChar char="◦"/>
+              <a:defRPr sz="1400" kern="1200">
+                <a:solidFill>
+                  <a:schemeClr val="tx1">
+                    <a:lumMod val="75000"/>
+                    <a:lumOff val="25000"/>
+                  </a:schemeClr>
+                </a:solidFill>
+                <a:latin typeface="+mn-lt"/>
+                <a:ea typeface="+mn-ea"/>
+                <a:cs typeface="+mn-cs"/>
+              </a:defRPr>
+            </a:lvl6pPr>
+            <a:lvl7pPr marL="1300000" indent="-228600" algn="l" defTabSz="914400" rtl="0" eaLnBrk="1" latinLnBrk="0" hangingPunct="1">
+              <a:lnSpc>
+                <a:spcPct val="90000"/>
+              </a:lnSpc>
+              <a:spcBef>
+                <a:spcPts val="200"/>
+              </a:spcBef>
+              <a:spcAft>
+                <a:spcPts val="400"/>
+              </a:spcAft>
+              <a:buClr>
+                <a:schemeClr val="accent1"/>
+              </a:buClr>
+              <a:buFont typeface="Calibri" pitchFamily="34" charset="0"/>
+              <a:buChar char="◦"/>
+              <a:defRPr sz="1400" kern="1200">
+                <a:solidFill>
+                  <a:schemeClr val="tx1">
+                    <a:lumMod val="75000"/>
+                    <a:lumOff val="25000"/>
+                  </a:schemeClr>
+                </a:solidFill>
+                <a:latin typeface="+mn-lt"/>
+                <a:ea typeface="+mn-ea"/>
+                <a:cs typeface="+mn-cs"/>
+              </a:defRPr>
+            </a:lvl7pPr>
+            <a:lvl8pPr marL="1500000" indent="-228600" algn="l" defTabSz="914400" rtl="0" eaLnBrk="1" latinLnBrk="0" hangingPunct="1">
+              <a:lnSpc>
+                <a:spcPct val="90000"/>
+              </a:lnSpc>
+              <a:spcBef>
+                <a:spcPts val="200"/>
+              </a:spcBef>
+              <a:spcAft>
+                <a:spcPts val="400"/>
+              </a:spcAft>
+              <a:buClr>
+                <a:schemeClr val="accent1"/>
+              </a:buClr>
+              <a:buFont typeface="Calibri" pitchFamily="34" charset="0"/>
+              <a:buChar char="◦"/>
+              <a:defRPr sz="1400" kern="1200">
+                <a:solidFill>
+                  <a:schemeClr val="tx1">
+                    <a:lumMod val="75000"/>
+                    <a:lumOff val="25000"/>
+                  </a:schemeClr>
+                </a:solidFill>
+                <a:latin typeface="+mn-lt"/>
+                <a:ea typeface="+mn-ea"/>
+                <a:cs typeface="+mn-cs"/>
+              </a:defRPr>
+            </a:lvl8pPr>
+            <a:lvl9pPr marL="1700000" indent="-228600" algn="l" defTabSz="914400" rtl="0" eaLnBrk="1" latinLnBrk="0" hangingPunct="1">
+              <a:lnSpc>
+                <a:spcPct val="90000"/>
+              </a:lnSpc>
+              <a:spcBef>
+                <a:spcPts val="200"/>
+              </a:spcBef>
+              <a:spcAft>
+                <a:spcPts val="400"/>
+              </a:spcAft>
+              <a:buClr>
+                <a:schemeClr val="accent1"/>
+              </a:buClr>
+              <a:buFont typeface="Calibri" pitchFamily="34" charset="0"/>
+              <a:buChar char="◦"/>
+              <a:defRPr sz="1400" kern="1200">
+                <a:solidFill>
+                  <a:schemeClr val="tx1">
+                    <a:lumMod val="75000"/>
+                    <a:lumOff val="25000"/>
+                  </a:schemeClr>
+                </a:solidFill>
+                <a:latin typeface="+mn-lt"/>
+                <a:ea typeface="+mn-ea"/>
+                <a:cs typeface="+mn-cs"/>
+              </a:defRPr>
+            </a:lvl9pPr>
+          </a:lstStyle>
+          <a:p>
+            <a:pPr>
+              <a:buFont typeface="Wingdings" panose="05000000000000000000" pitchFamily="2" charset="2"/>
+              <a:buChar char="v"/>
+            </a:pPr>
+            <a:r>
+              <a:rPr lang="en-IN" dirty="0"/>
+              <a:t>Step 1: Data Understanding</a:t>
+            </a:r>
+          </a:p>
+          <a:p>
+            <a:pPr lvl="1">
+              <a:buFont typeface="Wingdings" panose="05000000000000000000" pitchFamily="2" charset="2"/>
+              <a:buChar char="v"/>
+            </a:pPr>
+            <a:r>
+              <a:rPr lang="en-US" sz="1600" dirty="0"/>
+              <a:t>Total number of Rows - 39717</a:t>
+            </a:r>
+          </a:p>
+          <a:p>
+            <a:pPr lvl="1">
+              <a:buFont typeface="Wingdings" panose="05000000000000000000" pitchFamily="2" charset="2"/>
+              <a:buChar char="v"/>
+            </a:pPr>
+            <a:r>
+              <a:rPr lang="en-US" sz="1600" dirty="0"/>
+              <a:t>Total number of Columns – 111</a:t>
+            </a:r>
+          </a:p>
+          <a:p>
+            <a:pPr lvl="1">
+              <a:buFont typeface="Wingdings" panose="05000000000000000000" pitchFamily="2" charset="2"/>
+              <a:buChar char="v"/>
+            </a:pPr>
+            <a:r>
+              <a:rPr lang="en-US" sz="1600" dirty="0"/>
+              <a:t>Conclusion</a:t>
+            </a:r>
+          </a:p>
+          <a:p>
+            <a:pPr lvl="2">
+              <a:buFont typeface="Wingdings" panose="05000000000000000000" pitchFamily="2" charset="2"/>
+              <a:buChar char="v"/>
+            </a:pPr>
+            <a:r>
+              <a:rPr lang="en-US" dirty="0">
+                <a:solidFill>
+                  <a:srgbClr val="C00000"/>
+                </a:solidFill>
+              </a:rPr>
+              <a:t>There are many columns with null values for all the rows. Hence we need data cleaning</a:t>
+            </a:r>
+            <a:endParaRPr lang="en-IN" dirty="0">
+              <a:solidFill>
+                <a:srgbClr val="C00000"/>
+              </a:solidFill>
+            </a:endParaRPr>
           </a:p>
         </p:txBody>
       </p:sp>
     </p:spTree>
     <p:extLst>
       <p:ext uri="{BB962C8B-B14F-4D97-AF65-F5344CB8AC3E}">
-        <p14:creationId xmlns:p14="http://schemas.microsoft.com/office/powerpoint/2010/main" val="1562099967"/>
+        <p14:creationId xmlns:p14="http://schemas.microsoft.com/office/powerpoint/2010/main" val="2700040989"/>
       </p:ext>
     </p:extLst>
   </p:cSld>
@@ -4540,7 +6368,7 @@
           <a:p>
             <a:r>
               <a:rPr lang="en-US" dirty="0"/>
-              <a:t>Results</a:t>
+              <a:t>Approach</a:t>
             </a:r>
             <a:endParaRPr lang="en-IN" dirty="0"/>
           </a:p>
@@ -4548,33 +6376,406 @@
       </p:sp>
       <p:sp>
         <p:nvSpPr>
-          <p:cNvPr id="3" name="Content Placeholder 2">
-            <a:extLst>
-              <a:ext uri="{FF2B5EF4-FFF2-40B4-BE49-F238E27FC236}">
-                <a16:creationId xmlns:a16="http://schemas.microsoft.com/office/drawing/2014/main" id="{D955C1A0-F490-B7A4-0AE9-871F3F7C9B5D}"/>
-              </a:ext>
-            </a:extLst>
-          </p:cNvPr>
-          <p:cNvSpPr>
-            <a:spLocks noGrp="1"/>
-          </p:cNvSpPr>
-          <p:nvPr>
-            <p:ph idx="1"/>
-          </p:nvPr>
-        </p:nvSpPr>
-        <p:spPr/>
-        <p:txBody>
-          <a:bodyPr/>
-          <a:lstStyle/>
-          <a:p>
-            <a:endParaRPr lang="en-IN"/>
+          <p:cNvPr id="4" name="Content Placeholder 2">
+            <a:extLst>
+              <a:ext uri="{FF2B5EF4-FFF2-40B4-BE49-F238E27FC236}">
+                <a16:creationId xmlns:a16="http://schemas.microsoft.com/office/drawing/2014/main" id="{48F976D1-9F35-91B5-0DA9-9749E0976833}"/>
+              </a:ext>
+            </a:extLst>
+          </p:cNvPr>
+          <p:cNvSpPr txBox="1">
+            <a:spLocks/>
+          </p:cNvSpPr>
+          <p:nvPr/>
+        </p:nvSpPr>
+        <p:spPr>
+          <a:xfrm>
+            <a:off x="1097280" y="2009555"/>
+            <a:ext cx="10058400" cy="4805836"/>
+          </a:xfrm>
+          <a:prstGeom prst="rect">
+            <a:avLst/>
+          </a:prstGeom>
+        </p:spPr>
+        <p:txBody>
+          <a:bodyPr vert="horz" lIns="0" tIns="45720" rIns="0" bIns="45720" rtlCol="0">
+            <a:normAutofit/>
+          </a:bodyPr>
+          <a:lstStyle>
+            <a:lvl1pPr marL="91440" indent="-91440" algn="l" defTabSz="914400" rtl="0" eaLnBrk="1" latinLnBrk="0" hangingPunct="1">
+              <a:lnSpc>
+                <a:spcPct val="110000"/>
+              </a:lnSpc>
+              <a:spcBef>
+                <a:spcPts val="1200"/>
+              </a:spcBef>
+              <a:spcAft>
+                <a:spcPts val="200"/>
+              </a:spcAft>
+              <a:buClr>
+                <a:schemeClr val="accent1"/>
+              </a:buClr>
+              <a:buSzPct val="100000"/>
+              <a:buFont typeface="Calibri" panose="020F0502020204030204" pitchFamily="34" charset="0"/>
+              <a:buChar char=" "/>
+              <a:defRPr sz="1900" kern="1200">
+                <a:solidFill>
+                  <a:schemeClr val="tx1">
+                    <a:lumMod val="75000"/>
+                    <a:lumOff val="25000"/>
+                  </a:schemeClr>
+                </a:solidFill>
+                <a:latin typeface="+mn-lt"/>
+                <a:ea typeface="+mn-ea"/>
+                <a:cs typeface="+mn-cs"/>
+              </a:defRPr>
+            </a:lvl1pPr>
+            <a:lvl2pPr marL="384048" indent="-182880" algn="l" defTabSz="914400" rtl="0" eaLnBrk="1" latinLnBrk="0" hangingPunct="1">
+              <a:lnSpc>
+                <a:spcPct val="100000"/>
+              </a:lnSpc>
+              <a:spcBef>
+                <a:spcPts val="200"/>
+              </a:spcBef>
+              <a:spcAft>
+                <a:spcPts val="400"/>
+              </a:spcAft>
+              <a:buClrTx/>
+              <a:buFont typeface="Calibri" pitchFamily="34" charset="0"/>
+              <a:buChar char="◦"/>
+              <a:defRPr sz="1700" kern="1200">
+                <a:solidFill>
+                  <a:schemeClr val="tx1">
+                    <a:lumMod val="75000"/>
+                    <a:lumOff val="25000"/>
+                  </a:schemeClr>
+                </a:solidFill>
+                <a:latin typeface="+mn-lt"/>
+                <a:ea typeface="+mn-ea"/>
+                <a:cs typeface="+mn-cs"/>
+              </a:defRPr>
+            </a:lvl2pPr>
+            <a:lvl3pPr marL="566928" indent="-182880" algn="l" defTabSz="914400" rtl="0" eaLnBrk="1" latinLnBrk="0" hangingPunct="1">
+              <a:lnSpc>
+                <a:spcPct val="100000"/>
+              </a:lnSpc>
+              <a:spcBef>
+                <a:spcPts val="200"/>
+              </a:spcBef>
+              <a:spcAft>
+                <a:spcPts val="400"/>
+              </a:spcAft>
+              <a:buClrTx/>
+              <a:buFont typeface="Calibri" pitchFamily="34" charset="0"/>
+              <a:buChar char="◦"/>
+              <a:defRPr sz="1300" kern="1200">
+                <a:solidFill>
+                  <a:schemeClr val="tx1">
+                    <a:lumMod val="75000"/>
+                    <a:lumOff val="25000"/>
+                  </a:schemeClr>
+                </a:solidFill>
+                <a:latin typeface="+mn-lt"/>
+                <a:ea typeface="+mn-ea"/>
+                <a:cs typeface="+mn-cs"/>
+              </a:defRPr>
+            </a:lvl3pPr>
+            <a:lvl4pPr marL="749808" indent="-182880" algn="l" defTabSz="914400" rtl="0" eaLnBrk="1" latinLnBrk="0" hangingPunct="1">
+              <a:lnSpc>
+                <a:spcPct val="100000"/>
+              </a:lnSpc>
+              <a:spcBef>
+                <a:spcPts val="200"/>
+              </a:spcBef>
+              <a:spcAft>
+                <a:spcPts val="400"/>
+              </a:spcAft>
+              <a:buClrTx/>
+              <a:buFont typeface="Calibri" pitchFamily="34" charset="0"/>
+              <a:buChar char="◦"/>
+              <a:defRPr sz="1300" kern="1200">
+                <a:solidFill>
+                  <a:schemeClr val="tx1">
+                    <a:lumMod val="75000"/>
+                    <a:lumOff val="25000"/>
+                  </a:schemeClr>
+                </a:solidFill>
+                <a:latin typeface="+mn-lt"/>
+                <a:ea typeface="+mn-ea"/>
+                <a:cs typeface="+mn-cs"/>
+              </a:defRPr>
+            </a:lvl4pPr>
+            <a:lvl5pPr marL="932688" indent="-182880" algn="l" defTabSz="914400" rtl="0" eaLnBrk="1" latinLnBrk="0" hangingPunct="1">
+              <a:lnSpc>
+                <a:spcPct val="100000"/>
+              </a:lnSpc>
+              <a:spcBef>
+                <a:spcPts val="200"/>
+              </a:spcBef>
+              <a:spcAft>
+                <a:spcPts val="400"/>
+              </a:spcAft>
+              <a:buClrTx/>
+              <a:buFont typeface="Calibri" pitchFamily="34" charset="0"/>
+              <a:buChar char="◦"/>
+              <a:defRPr sz="1300" kern="1200">
+                <a:solidFill>
+                  <a:schemeClr val="tx1">
+                    <a:lumMod val="75000"/>
+                    <a:lumOff val="25000"/>
+                  </a:schemeClr>
+                </a:solidFill>
+                <a:latin typeface="+mn-lt"/>
+                <a:ea typeface="+mn-ea"/>
+                <a:cs typeface="+mn-cs"/>
+              </a:defRPr>
+            </a:lvl5pPr>
+            <a:lvl6pPr marL="1100000" indent="-228600" algn="l" defTabSz="914400" rtl="0" eaLnBrk="1" latinLnBrk="0" hangingPunct="1">
+              <a:lnSpc>
+                <a:spcPct val="90000"/>
+              </a:lnSpc>
+              <a:spcBef>
+                <a:spcPts val="200"/>
+              </a:spcBef>
+              <a:spcAft>
+                <a:spcPts val="400"/>
+              </a:spcAft>
+              <a:buClr>
+                <a:schemeClr val="accent1"/>
+              </a:buClr>
+              <a:buFont typeface="Calibri" pitchFamily="34" charset="0"/>
+              <a:buChar char="◦"/>
+              <a:defRPr sz="1400" kern="1200">
+                <a:solidFill>
+                  <a:schemeClr val="tx1">
+                    <a:lumMod val="75000"/>
+                    <a:lumOff val="25000"/>
+                  </a:schemeClr>
+                </a:solidFill>
+                <a:latin typeface="+mn-lt"/>
+                <a:ea typeface="+mn-ea"/>
+                <a:cs typeface="+mn-cs"/>
+              </a:defRPr>
+            </a:lvl6pPr>
+            <a:lvl7pPr marL="1300000" indent="-228600" algn="l" defTabSz="914400" rtl="0" eaLnBrk="1" latinLnBrk="0" hangingPunct="1">
+              <a:lnSpc>
+                <a:spcPct val="90000"/>
+              </a:lnSpc>
+              <a:spcBef>
+                <a:spcPts val="200"/>
+              </a:spcBef>
+              <a:spcAft>
+                <a:spcPts val="400"/>
+              </a:spcAft>
+              <a:buClr>
+                <a:schemeClr val="accent1"/>
+              </a:buClr>
+              <a:buFont typeface="Calibri" pitchFamily="34" charset="0"/>
+              <a:buChar char="◦"/>
+              <a:defRPr sz="1400" kern="1200">
+                <a:solidFill>
+                  <a:schemeClr val="tx1">
+                    <a:lumMod val="75000"/>
+                    <a:lumOff val="25000"/>
+                  </a:schemeClr>
+                </a:solidFill>
+                <a:latin typeface="+mn-lt"/>
+                <a:ea typeface="+mn-ea"/>
+                <a:cs typeface="+mn-cs"/>
+              </a:defRPr>
+            </a:lvl7pPr>
+            <a:lvl8pPr marL="1500000" indent="-228600" algn="l" defTabSz="914400" rtl="0" eaLnBrk="1" latinLnBrk="0" hangingPunct="1">
+              <a:lnSpc>
+                <a:spcPct val="90000"/>
+              </a:lnSpc>
+              <a:spcBef>
+                <a:spcPts val="200"/>
+              </a:spcBef>
+              <a:spcAft>
+                <a:spcPts val="400"/>
+              </a:spcAft>
+              <a:buClr>
+                <a:schemeClr val="accent1"/>
+              </a:buClr>
+              <a:buFont typeface="Calibri" pitchFamily="34" charset="0"/>
+              <a:buChar char="◦"/>
+              <a:defRPr sz="1400" kern="1200">
+                <a:solidFill>
+                  <a:schemeClr val="tx1">
+                    <a:lumMod val="75000"/>
+                    <a:lumOff val="25000"/>
+                  </a:schemeClr>
+                </a:solidFill>
+                <a:latin typeface="+mn-lt"/>
+                <a:ea typeface="+mn-ea"/>
+                <a:cs typeface="+mn-cs"/>
+              </a:defRPr>
+            </a:lvl8pPr>
+            <a:lvl9pPr marL="1700000" indent="-228600" algn="l" defTabSz="914400" rtl="0" eaLnBrk="1" latinLnBrk="0" hangingPunct="1">
+              <a:lnSpc>
+                <a:spcPct val="90000"/>
+              </a:lnSpc>
+              <a:spcBef>
+                <a:spcPts val="200"/>
+              </a:spcBef>
+              <a:spcAft>
+                <a:spcPts val="400"/>
+              </a:spcAft>
+              <a:buClr>
+                <a:schemeClr val="accent1"/>
+              </a:buClr>
+              <a:buFont typeface="Calibri" pitchFamily="34" charset="0"/>
+              <a:buChar char="◦"/>
+              <a:defRPr sz="1400" kern="1200">
+                <a:solidFill>
+                  <a:schemeClr val="tx1">
+                    <a:lumMod val="75000"/>
+                    <a:lumOff val="25000"/>
+                  </a:schemeClr>
+                </a:solidFill>
+                <a:latin typeface="+mn-lt"/>
+                <a:ea typeface="+mn-ea"/>
+                <a:cs typeface="+mn-cs"/>
+              </a:defRPr>
+            </a:lvl9pPr>
+          </a:lstStyle>
+          <a:p>
+            <a:pPr>
+              <a:buFont typeface="Wingdings" panose="05000000000000000000" pitchFamily="2" charset="2"/>
+              <a:buChar char="v"/>
+            </a:pPr>
+            <a:r>
+              <a:rPr lang="en-IN" dirty="0"/>
+              <a:t>Step 2: Data Cleaning – Strategy</a:t>
+            </a:r>
+          </a:p>
+          <a:p>
+            <a:pPr lvl="1">
+              <a:buFont typeface="Wingdings" panose="05000000000000000000" pitchFamily="2" charset="2"/>
+              <a:buChar char="v"/>
+            </a:pPr>
+            <a:r>
+              <a:rPr lang="en-US" sz="1400" dirty="0"/>
+              <a:t>Columns having high percentage of missing values, directly discard those column from the analysis</a:t>
+            </a:r>
+          </a:p>
+          <a:p>
+            <a:pPr lvl="1">
+              <a:buFont typeface="Wingdings" panose="05000000000000000000" pitchFamily="2" charset="2"/>
+              <a:buChar char="v"/>
+            </a:pPr>
+            <a:r>
+              <a:rPr lang="en-US" sz="1400" dirty="0"/>
+              <a:t>Columns having missing values under acceptable range we prefer to impute them(replace with some values)</a:t>
+            </a:r>
+          </a:p>
+          <a:p>
+            <a:pPr lvl="1">
+              <a:buFont typeface="Wingdings" panose="05000000000000000000" pitchFamily="2" charset="2"/>
+              <a:buChar char="v"/>
+            </a:pPr>
+            <a:r>
+              <a:rPr lang="en-US" sz="1400" dirty="0"/>
+              <a:t>For numerical columns we prefer to use mean or median (Median is preferred)</a:t>
+            </a:r>
+          </a:p>
+          <a:p>
+            <a:pPr lvl="1">
+              <a:buFont typeface="Wingdings" panose="05000000000000000000" pitchFamily="2" charset="2"/>
+              <a:buChar char="v"/>
+            </a:pPr>
+            <a:r>
+              <a:rPr lang="en-US" sz="1400" dirty="0"/>
+              <a:t>Median is not affected with the outliers</a:t>
+            </a:r>
+          </a:p>
+          <a:p>
+            <a:pPr lvl="1">
+              <a:buFont typeface="Wingdings" panose="05000000000000000000" pitchFamily="2" charset="2"/>
+              <a:buChar char="v"/>
+            </a:pPr>
+            <a:r>
+              <a:rPr lang="en-US" sz="1400" dirty="0"/>
+              <a:t>For categorical column we refer to use mode</a:t>
+            </a:r>
+          </a:p>
+          <a:p>
+            <a:pPr lvl="1">
+              <a:buFont typeface="Wingdings" panose="05000000000000000000" pitchFamily="2" charset="2"/>
+              <a:buChar char="v"/>
+            </a:pPr>
+            <a:r>
+              <a:rPr lang="en-US" sz="1400" dirty="0"/>
+              <a:t>If we have very less missing values in any column in that case you can drop rows as well</a:t>
+            </a:r>
+          </a:p>
+          <a:p>
+            <a:pPr lvl="1">
+              <a:buFont typeface="Wingdings" panose="05000000000000000000" pitchFamily="2" charset="2"/>
+              <a:buChar char="v"/>
+            </a:pPr>
+            <a:r>
+              <a:rPr lang="en-US" sz="1400" dirty="0"/>
+              <a:t>For a target variable - if there are missing values, drop the row</a:t>
+            </a:r>
+          </a:p>
+          <a:p>
+            <a:pPr lvl="1">
+              <a:buFont typeface="Wingdings" panose="05000000000000000000" pitchFamily="2" charset="2"/>
+              <a:buChar char="v"/>
+            </a:pPr>
+            <a:r>
+              <a:rPr lang="en-US" sz="1400" dirty="0"/>
+              <a:t>Removing columns which has all values as null</a:t>
+            </a:r>
+          </a:p>
+          <a:p>
+            <a:pPr lvl="1">
+              <a:buFont typeface="Wingdings" panose="05000000000000000000" pitchFamily="2" charset="2"/>
+              <a:buChar char="v"/>
+            </a:pPr>
+            <a:r>
+              <a:rPr lang="en-US" sz="1400" dirty="0"/>
+              <a:t>Drop columns where same value is present in all or most of the rows</a:t>
+            </a:r>
+          </a:p>
+          <a:p>
+            <a:pPr lvl="1">
+              <a:buFont typeface="Wingdings" panose="05000000000000000000" pitchFamily="2" charset="2"/>
+              <a:buChar char="v"/>
+            </a:pPr>
+            <a:r>
+              <a:rPr lang="en-US" sz="1600" dirty="0"/>
+              <a:t>Conclusion</a:t>
+            </a:r>
+          </a:p>
+          <a:p>
+            <a:pPr lvl="2">
+              <a:buFont typeface="Wingdings" panose="05000000000000000000" pitchFamily="2" charset="2"/>
+              <a:buChar char="v"/>
+            </a:pPr>
+            <a:r>
+              <a:rPr lang="en-IN" dirty="0">
+                <a:solidFill>
+                  <a:srgbClr val="C00000"/>
+                </a:solidFill>
+              </a:rPr>
+              <a:t>&lt;need to add&gt;</a:t>
+            </a:r>
+          </a:p>
+          <a:p>
+            <a:pPr lvl="1">
+              <a:buFont typeface="Wingdings" panose="05000000000000000000" pitchFamily="2" charset="2"/>
+              <a:buChar char="v"/>
+            </a:pPr>
+            <a:endParaRPr lang="en-IN" sz="1400" dirty="0"/>
           </a:p>
         </p:txBody>
       </p:sp>
     </p:spTree>
     <p:extLst>
       <p:ext uri="{BB962C8B-B14F-4D97-AF65-F5344CB8AC3E}">
-        <p14:creationId xmlns:p14="http://schemas.microsoft.com/office/powerpoint/2010/main" val="2962964088"/>
+        <p14:creationId xmlns:p14="http://schemas.microsoft.com/office/powerpoint/2010/main" val="1988897769"/>
       </p:ext>
     </p:extLst>
   </p:cSld>
@@ -4585,6 +6786,384 @@
 </file>
 
 <file path=ppt/slides/slide7.xml><?xml version="1.0" encoding="utf-8"?>
+<p:sld xmlns:a="http://schemas.openxmlformats.org/drawingml/2006/main" xmlns:r="http://schemas.openxmlformats.org/officeDocument/2006/relationships" xmlns:p="http://schemas.openxmlformats.org/presentationml/2006/main">
+  <p:cSld>
+    <p:spTree>
+      <p:nvGrpSpPr>
+        <p:cNvPr id="1" name=""/>
+        <p:cNvGrpSpPr/>
+        <p:nvPr/>
+      </p:nvGrpSpPr>
+      <p:grpSpPr>
+        <a:xfrm>
+          <a:off x="0" y="0"/>
+          <a:ext cx="0" cy="0"/>
+          <a:chOff x="0" y="0"/>
+          <a:chExt cx="0" cy="0"/>
+        </a:xfrm>
+      </p:grpSpPr>
+      <p:sp>
+        <p:nvSpPr>
+          <p:cNvPr id="2" name="Title 1">
+            <a:extLst>
+              <a:ext uri="{FF2B5EF4-FFF2-40B4-BE49-F238E27FC236}">
+                <a16:creationId xmlns:a16="http://schemas.microsoft.com/office/drawing/2014/main" id="{52FDF0B9-B3AB-3A17-8FC7-F4892A7DB154}"/>
+              </a:ext>
+            </a:extLst>
+          </p:cNvPr>
+          <p:cNvSpPr>
+            <a:spLocks noGrp="1"/>
+          </p:cNvSpPr>
+          <p:nvPr>
+            <p:ph type="title"/>
+          </p:nvPr>
+        </p:nvSpPr>
+        <p:spPr/>
+        <p:txBody>
+          <a:bodyPr/>
+          <a:lstStyle/>
+          <a:p>
+            <a:r>
+              <a:rPr lang="en-US" dirty="0"/>
+              <a:t>Approach</a:t>
+            </a:r>
+            <a:endParaRPr lang="en-IN" dirty="0"/>
+          </a:p>
+        </p:txBody>
+      </p:sp>
+      <p:sp>
+        <p:nvSpPr>
+          <p:cNvPr id="4" name="Content Placeholder 2">
+            <a:extLst>
+              <a:ext uri="{FF2B5EF4-FFF2-40B4-BE49-F238E27FC236}">
+                <a16:creationId xmlns:a16="http://schemas.microsoft.com/office/drawing/2014/main" id="{48F976D1-9F35-91B5-0DA9-9749E0976833}"/>
+              </a:ext>
+            </a:extLst>
+          </p:cNvPr>
+          <p:cNvSpPr txBox="1">
+            <a:spLocks/>
+          </p:cNvSpPr>
+          <p:nvPr/>
+        </p:nvSpPr>
+        <p:spPr>
+          <a:xfrm>
+            <a:off x="1097280" y="2009555"/>
+            <a:ext cx="10058400" cy="4805836"/>
+          </a:xfrm>
+          <a:prstGeom prst="rect">
+            <a:avLst/>
+          </a:prstGeom>
+        </p:spPr>
+        <p:txBody>
+          <a:bodyPr vert="horz" lIns="0" tIns="45720" rIns="0" bIns="45720" rtlCol="0">
+            <a:normAutofit/>
+          </a:bodyPr>
+          <a:lstStyle>
+            <a:lvl1pPr marL="91440" indent="-91440" algn="l" defTabSz="914400" rtl="0" eaLnBrk="1" latinLnBrk="0" hangingPunct="1">
+              <a:lnSpc>
+                <a:spcPct val="110000"/>
+              </a:lnSpc>
+              <a:spcBef>
+                <a:spcPts val="1200"/>
+              </a:spcBef>
+              <a:spcAft>
+                <a:spcPts val="200"/>
+              </a:spcAft>
+              <a:buClr>
+                <a:schemeClr val="accent1"/>
+              </a:buClr>
+              <a:buSzPct val="100000"/>
+              <a:buFont typeface="Calibri" panose="020F0502020204030204" pitchFamily="34" charset="0"/>
+              <a:buChar char=" "/>
+              <a:defRPr sz="1900" kern="1200">
+                <a:solidFill>
+                  <a:schemeClr val="tx1">
+                    <a:lumMod val="75000"/>
+                    <a:lumOff val="25000"/>
+                  </a:schemeClr>
+                </a:solidFill>
+                <a:latin typeface="+mn-lt"/>
+                <a:ea typeface="+mn-ea"/>
+                <a:cs typeface="+mn-cs"/>
+              </a:defRPr>
+            </a:lvl1pPr>
+            <a:lvl2pPr marL="384048" indent="-182880" algn="l" defTabSz="914400" rtl="0" eaLnBrk="1" latinLnBrk="0" hangingPunct="1">
+              <a:lnSpc>
+                <a:spcPct val="100000"/>
+              </a:lnSpc>
+              <a:spcBef>
+                <a:spcPts val="200"/>
+              </a:spcBef>
+              <a:spcAft>
+                <a:spcPts val="400"/>
+              </a:spcAft>
+              <a:buClrTx/>
+              <a:buFont typeface="Calibri" pitchFamily="34" charset="0"/>
+              <a:buChar char="◦"/>
+              <a:defRPr sz="1700" kern="1200">
+                <a:solidFill>
+                  <a:schemeClr val="tx1">
+                    <a:lumMod val="75000"/>
+                    <a:lumOff val="25000"/>
+                  </a:schemeClr>
+                </a:solidFill>
+                <a:latin typeface="+mn-lt"/>
+                <a:ea typeface="+mn-ea"/>
+                <a:cs typeface="+mn-cs"/>
+              </a:defRPr>
+            </a:lvl2pPr>
+            <a:lvl3pPr marL="566928" indent="-182880" algn="l" defTabSz="914400" rtl="0" eaLnBrk="1" latinLnBrk="0" hangingPunct="1">
+              <a:lnSpc>
+                <a:spcPct val="100000"/>
+              </a:lnSpc>
+              <a:spcBef>
+                <a:spcPts val="200"/>
+              </a:spcBef>
+              <a:spcAft>
+                <a:spcPts val="400"/>
+              </a:spcAft>
+              <a:buClrTx/>
+              <a:buFont typeface="Calibri" pitchFamily="34" charset="0"/>
+              <a:buChar char="◦"/>
+              <a:defRPr sz="1300" kern="1200">
+                <a:solidFill>
+                  <a:schemeClr val="tx1">
+                    <a:lumMod val="75000"/>
+                    <a:lumOff val="25000"/>
+                  </a:schemeClr>
+                </a:solidFill>
+                <a:latin typeface="+mn-lt"/>
+                <a:ea typeface="+mn-ea"/>
+                <a:cs typeface="+mn-cs"/>
+              </a:defRPr>
+            </a:lvl3pPr>
+            <a:lvl4pPr marL="749808" indent="-182880" algn="l" defTabSz="914400" rtl="0" eaLnBrk="1" latinLnBrk="0" hangingPunct="1">
+              <a:lnSpc>
+                <a:spcPct val="100000"/>
+              </a:lnSpc>
+              <a:spcBef>
+                <a:spcPts val="200"/>
+              </a:spcBef>
+              <a:spcAft>
+                <a:spcPts val="400"/>
+              </a:spcAft>
+              <a:buClrTx/>
+              <a:buFont typeface="Calibri" pitchFamily="34" charset="0"/>
+              <a:buChar char="◦"/>
+              <a:defRPr sz="1300" kern="1200">
+                <a:solidFill>
+                  <a:schemeClr val="tx1">
+                    <a:lumMod val="75000"/>
+                    <a:lumOff val="25000"/>
+                  </a:schemeClr>
+                </a:solidFill>
+                <a:latin typeface="+mn-lt"/>
+                <a:ea typeface="+mn-ea"/>
+                <a:cs typeface="+mn-cs"/>
+              </a:defRPr>
+            </a:lvl4pPr>
+            <a:lvl5pPr marL="932688" indent="-182880" algn="l" defTabSz="914400" rtl="0" eaLnBrk="1" latinLnBrk="0" hangingPunct="1">
+              <a:lnSpc>
+                <a:spcPct val="100000"/>
+              </a:lnSpc>
+              <a:spcBef>
+                <a:spcPts val="200"/>
+              </a:spcBef>
+              <a:spcAft>
+                <a:spcPts val="400"/>
+              </a:spcAft>
+              <a:buClrTx/>
+              <a:buFont typeface="Calibri" pitchFamily="34" charset="0"/>
+              <a:buChar char="◦"/>
+              <a:defRPr sz="1300" kern="1200">
+                <a:solidFill>
+                  <a:schemeClr val="tx1">
+                    <a:lumMod val="75000"/>
+                    <a:lumOff val="25000"/>
+                  </a:schemeClr>
+                </a:solidFill>
+                <a:latin typeface="+mn-lt"/>
+                <a:ea typeface="+mn-ea"/>
+                <a:cs typeface="+mn-cs"/>
+              </a:defRPr>
+            </a:lvl5pPr>
+            <a:lvl6pPr marL="1100000" indent="-228600" algn="l" defTabSz="914400" rtl="0" eaLnBrk="1" latinLnBrk="0" hangingPunct="1">
+              <a:lnSpc>
+                <a:spcPct val="90000"/>
+              </a:lnSpc>
+              <a:spcBef>
+                <a:spcPts val="200"/>
+              </a:spcBef>
+              <a:spcAft>
+                <a:spcPts val="400"/>
+              </a:spcAft>
+              <a:buClr>
+                <a:schemeClr val="accent1"/>
+              </a:buClr>
+              <a:buFont typeface="Calibri" pitchFamily="34" charset="0"/>
+              <a:buChar char="◦"/>
+              <a:defRPr sz="1400" kern="1200">
+                <a:solidFill>
+                  <a:schemeClr val="tx1">
+                    <a:lumMod val="75000"/>
+                    <a:lumOff val="25000"/>
+                  </a:schemeClr>
+                </a:solidFill>
+                <a:latin typeface="+mn-lt"/>
+                <a:ea typeface="+mn-ea"/>
+                <a:cs typeface="+mn-cs"/>
+              </a:defRPr>
+            </a:lvl6pPr>
+            <a:lvl7pPr marL="1300000" indent="-228600" algn="l" defTabSz="914400" rtl="0" eaLnBrk="1" latinLnBrk="0" hangingPunct="1">
+              <a:lnSpc>
+                <a:spcPct val="90000"/>
+              </a:lnSpc>
+              <a:spcBef>
+                <a:spcPts val="200"/>
+              </a:spcBef>
+              <a:spcAft>
+                <a:spcPts val="400"/>
+              </a:spcAft>
+              <a:buClr>
+                <a:schemeClr val="accent1"/>
+              </a:buClr>
+              <a:buFont typeface="Calibri" pitchFamily="34" charset="0"/>
+              <a:buChar char="◦"/>
+              <a:defRPr sz="1400" kern="1200">
+                <a:solidFill>
+                  <a:schemeClr val="tx1">
+                    <a:lumMod val="75000"/>
+                    <a:lumOff val="25000"/>
+                  </a:schemeClr>
+                </a:solidFill>
+                <a:latin typeface="+mn-lt"/>
+                <a:ea typeface="+mn-ea"/>
+                <a:cs typeface="+mn-cs"/>
+              </a:defRPr>
+            </a:lvl7pPr>
+            <a:lvl8pPr marL="1500000" indent="-228600" algn="l" defTabSz="914400" rtl="0" eaLnBrk="1" latinLnBrk="0" hangingPunct="1">
+              <a:lnSpc>
+                <a:spcPct val="90000"/>
+              </a:lnSpc>
+              <a:spcBef>
+                <a:spcPts val="200"/>
+              </a:spcBef>
+              <a:spcAft>
+                <a:spcPts val="400"/>
+              </a:spcAft>
+              <a:buClr>
+                <a:schemeClr val="accent1"/>
+              </a:buClr>
+              <a:buFont typeface="Calibri" pitchFamily="34" charset="0"/>
+              <a:buChar char="◦"/>
+              <a:defRPr sz="1400" kern="1200">
+                <a:solidFill>
+                  <a:schemeClr val="tx1">
+                    <a:lumMod val="75000"/>
+                    <a:lumOff val="25000"/>
+                  </a:schemeClr>
+                </a:solidFill>
+                <a:latin typeface="+mn-lt"/>
+                <a:ea typeface="+mn-ea"/>
+                <a:cs typeface="+mn-cs"/>
+              </a:defRPr>
+            </a:lvl8pPr>
+            <a:lvl9pPr marL="1700000" indent="-228600" algn="l" defTabSz="914400" rtl="0" eaLnBrk="1" latinLnBrk="0" hangingPunct="1">
+              <a:lnSpc>
+                <a:spcPct val="90000"/>
+              </a:lnSpc>
+              <a:spcBef>
+                <a:spcPts val="200"/>
+              </a:spcBef>
+              <a:spcAft>
+                <a:spcPts val="400"/>
+              </a:spcAft>
+              <a:buClr>
+                <a:schemeClr val="accent1"/>
+              </a:buClr>
+              <a:buFont typeface="Calibri" pitchFamily="34" charset="0"/>
+              <a:buChar char="◦"/>
+              <a:defRPr sz="1400" kern="1200">
+                <a:solidFill>
+                  <a:schemeClr val="tx1">
+                    <a:lumMod val="75000"/>
+                    <a:lumOff val="25000"/>
+                  </a:schemeClr>
+                </a:solidFill>
+                <a:latin typeface="+mn-lt"/>
+                <a:ea typeface="+mn-ea"/>
+                <a:cs typeface="+mn-cs"/>
+              </a:defRPr>
+            </a:lvl9pPr>
+          </a:lstStyle>
+          <a:p>
+            <a:pPr>
+              <a:buFont typeface="Wingdings" panose="05000000000000000000" pitchFamily="2" charset="2"/>
+              <a:buChar char="v"/>
+            </a:pPr>
+            <a:r>
+              <a:rPr lang="en-IN" dirty="0"/>
+              <a:t>Step 3: Data Analysis</a:t>
+            </a:r>
+          </a:p>
+          <a:p>
+            <a:pPr lvl="1">
+              <a:buFont typeface="Wingdings" panose="05000000000000000000" pitchFamily="2" charset="2"/>
+              <a:buChar char="v"/>
+            </a:pPr>
+            <a:r>
+              <a:rPr lang="en-US" sz="1600" dirty="0"/>
+              <a:t>Identify Categorical and Numeric variables</a:t>
+            </a:r>
+            <a:endParaRPr lang="en-US" sz="1400" dirty="0"/>
+          </a:p>
+          <a:p>
+            <a:pPr lvl="1">
+              <a:buFont typeface="Wingdings" panose="05000000000000000000" pitchFamily="2" charset="2"/>
+              <a:buChar char="v"/>
+            </a:pPr>
+            <a:r>
+              <a:rPr lang="en-US" sz="1600" dirty="0"/>
+              <a:t>Conclusion</a:t>
+            </a:r>
+          </a:p>
+          <a:p>
+            <a:pPr lvl="2">
+              <a:buFont typeface="Wingdings" panose="05000000000000000000" pitchFamily="2" charset="2"/>
+              <a:buChar char="v"/>
+            </a:pPr>
+            <a:r>
+              <a:rPr lang="en-IN" dirty="0">
+                <a:solidFill>
+                  <a:srgbClr val="C00000"/>
+                </a:solidFill>
+              </a:rPr>
+              <a:t>&lt;need to add&gt;</a:t>
+            </a:r>
+          </a:p>
+          <a:p>
+            <a:pPr lvl="1">
+              <a:buFont typeface="Wingdings" panose="05000000000000000000" pitchFamily="2" charset="2"/>
+              <a:buChar char="v"/>
+            </a:pPr>
+            <a:endParaRPr lang="en-IN" sz="1400" dirty="0"/>
+          </a:p>
+        </p:txBody>
+      </p:sp>
+    </p:spTree>
+    <p:extLst>
+      <p:ext uri="{BB962C8B-B14F-4D97-AF65-F5344CB8AC3E}">
+        <p14:creationId xmlns:p14="http://schemas.microsoft.com/office/powerpoint/2010/main" val="610039699"/>
+      </p:ext>
+    </p:extLst>
+  </p:cSld>
+  <p:clrMapOvr>
+    <a:masterClrMapping/>
+  </p:clrMapOvr>
+</p:sld>
+</file>
+
+<file path=ppt/slides/slide8.xml><?xml version="1.0" encoding="utf-8"?>
 <p:sld xmlns:a="http://schemas.openxmlformats.org/drawingml/2006/main" xmlns:r="http://schemas.openxmlformats.org/officeDocument/2006/relationships" xmlns:p="http://schemas.openxmlformats.org/presentationml/2006/main">
   <p:cSld>
     <p:bg>
@@ -4707,7 +7286,7 @@
                   <a:srgbClr val="FFFFFF"/>
                 </a:solidFill>
               </a:rPr>
-              <a:t>Recommendations here</a:t>
+              <a:t>Insights</a:t>
             </a:r>
           </a:p>
         </p:txBody>
@@ -4817,6 +7396,315 @@
     <p:extLst>
       <p:ext uri="{BB962C8B-B14F-4D97-AF65-F5344CB8AC3E}">
         <p14:creationId xmlns:p14="http://schemas.microsoft.com/office/powerpoint/2010/main" val="191714609"/>
+      </p:ext>
+    </p:extLst>
+  </p:cSld>
+  <p:clrMapOvr>
+    <a:masterClrMapping/>
+  </p:clrMapOvr>
+</p:sld>
+</file>
+
+<file path=ppt/slides/slide9.xml><?xml version="1.0" encoding="utf-8"?>
+<p:sld xmlns:a="http://schemas.openxmlformats.org/drawingml/2006/main" xmlns:r="http://schemas.openxmlformats.org/officeDocument/2006/relationships" xmlns:p="http://schemas.openxmlformats.org/presentationml/2006/main">
+  <p:cSld>
+    <p:spTree>
+      <p:nvGrpSpPr>
+        <p:cNvPr id="1" name=""/>
+        <p:cNvGrpSpPr/>
+        <p:nvPr/>
+      </p:nvGrpSpPr>
+      <p:grpSpPr>
+        <a:xfrm>
+          <a:off x="0" y="0"/>
+          <a:ext cx="0" cy="0"/>
+          <a:chOff x="0" y="0"/>
+          <a:chExt cx="0" cy="0"/>
+        </a:xfrm>
+      </p:grpSpPr>
+      <p:sp>
+        <p:nvSpPr>
+          <p:cNvPr id="2" name="Title 1">
+            <a:extLst>
+              <a:ext uri="{FF2B5EF4-FFF2-40B4-BE49-F238E27FC236}">
+                <a16:creationId xmlns:a16="http://schemas.microsoft.com/office/drawing/2014/main" id="{52FDF0B9-B3AB-3A17-8FC7-F4892A7DB154}"/>
+              </a:ext>
+            </a:extLst>
+          </p:cNvPr>
+          <p:cNvSpPr>
+            <a:spLocks noGrp="1"/>
+          </p:cNvSpPr>
+          <p:nvPr>
+            <p:ph type="title"/>
+          </p:nvPr>
+        </p:nvSpPr>
+        <p:spPr>
+          <a:xfrm>
+            <a:off x="1097280" y="-33005"/>
+            <a:ext cx="10058400" cy="1450757"/>
+          </a:xfrm>
+        </p:spPr>
+        <p:txBody>
+          <a:bodyPr/>
+          <a:lstStyle/>
+          <a:p>
+            <a:r>
+              <a:rPr lang="en-US" dirty="0"/>
+              <a:t>Insights</a:t>
+            </a:r>
+            <a:br>
+              <a:rPr lang="en-US" dirty="0"/>
+            </a:br>
+            <a:endParaRPr lang="en-IN" dirty="0"/>
+          </a:p>
+        </p:txBody>
+      </p:sp>
+      <p:sp>
+        <p:nvSpPr>
+          <p:cNvPr id="3" name="Content Placeholder 2">
+            <a:extLst>
+              <a:ext uri="{FF2B5EF4-FFF2-40B4-BE49-F238E27FC236}">
+                <a16:creationId xmlns:a16="http://schemas.microsoft.com/office/drawing/2014/main" id="{D955C1A0-F490-B7A4-0AE9-871F3F7C9B5D}"/>
+              </a:ext>
+            </a:extLst>
+          </p:cNvPr>
+          <p:cNvSpPr>
+            <a:spLocks noGrp="1"/>
+          </p:cNvSpPr>
+          <p:nvPr>
+            <p:ph idx="1"/>
+          </p:nvPr>
+        </p:nvSpPr>
+        <p:spPr>
+          <a:xfrm>
+            <a:off x="1097280" y="812759"/>
+            <a:ext cx="10058400" cy="4736725"/>
+          </a:xfrm>
+        </p:spPr>
+        <p:txBody>
+          <a:bodyPr>
+            <a:noAutofit/>
+          </a:bodyPr>
+          <a:lstStyle/>
+          <a:p>
+            <a:pPr>
+              <a:buFont typeface="Wingdings" panose="05000000000000000000" pitchFamily="2" charset="2"/>
+              <a:buChar char="v"/>
+            </a:pPr>
+            <a:r>
+              <a:rPr lang="en-US" sz="1300" dirty="0">
+                <a:cs typeface="Arial" panose="020B0604020202020204" pitchFamily="34" charset="0"/>
+              </a:rPr>
+              <a:t>Insight1: At </a:t>
+            </a:r>
+            <a:r>
+              <a:rPr lang="en-US" sz="1300" b="1" u="sng" dirty="0">
+                <a:cs typeface="Arial" panose="020B0604020202020204" pitchFamily="34" charset="0"/>
+              </a:rPr>
+              <a:t>higher loan amounts</a:t>
+            </a:r>
+            <a:r>
+              <a:rPr lang="en-US" sz="1300" dirty="0">
+                <a:cs typeface="Arial" panose="020B0604020202020204" pitchFamily="34" charset="0"/>
+              </a:rPr>
+              <a:t> the percent of charged off loans over total loans increased by 5 percentage points i.e. one in every five loans charged off </a:t>
+            </a:r>
+          </a:p>
+          <a:p>
+            <a:pPr>
+              <a:buFont typeface="Wingdings" panose="05000000000000000000" pitchFamily="2" charset="2"/>
+              <a:buChar char="v"/>
+            </a:pPr>
+            <a:r>
+              <a:rPr lang="en-US" sz="1300" dirty="0">
+                <a:cs typeface="Arial" panose="020B0604020202020204" pitchFamily="34" charset="0"/>
+              </a:rPr>
+              <a:t>Insight2: At </a:t>
+            </a:r>
+            <a:r>
+              <a:rPr lang="en-US" sz="1300" b="1" u="sng" dirty="0">
+                <a:cs typeface="Arial" panose="020B0604020202020204" pitchFamily="34" charset="0"/>
+              </a:rPr>
+              <a:t>higher interest rates</a:t>
+            </a:r>
+            <a:r>
+              <a:rPr lang="en-US" sz="1300" dirty="0">
+                <a:cs typeface="Arial" panose="020B0604020202020204" pitchFamily="34" charset="0"/>
+              </a:rPr>
+              <a:t>, charged off loans  as a percentage of total loans doubled when compared to overall range of data. Three loans in every ten loans charged off, meaning there is correlation between higher interest rate and loan getting charged off</a:t>
+            </a:r>
+          </a:p>
+          <a:p>
+            <a:pPr>
+              <a:buFont typeface="Wingdings" panose="05000000000000000000" pitchFamily="2" charset="2"/>
+              <a:buChar char="v"/>
+            </a:pPr>
+            <a:r>
+              <a:rPr lang="en-US" sz="1300" dirty="0">
+                <a:cs typeface="Arial" panose="020B0604020202020204" pitchFamily="34" charset="0"/>
+              </a:rPr>
+              <a:t>Insight3: When the </a:t>
+            </a:r>
+            <a:r>
+              <a:rPr lang="en-US" sz="1300" b="1" u="sng" dirty="0">
+                <a:cs typeface="Arial" panose="020B0604020202020204" pitchFamily="34" charset="0"/>
+              </a:rPr>
+              <a:t>interest rate </a:t>
+            </a:r>
+            <a:r>
+              <a:rPr lang="en-US" sz="1300" dirty="0">
+                <a:cs typeface="Arial" panose="020B0604020202020204" pitchFamily="34" charset="0"/>
+              </a:rPr>
+              <a:t>is very low, the percent of charged off loans is way to less when compared to the overall range. This means when the interest rate is very low, very few loans gets charged off</a:t>
+            </a:r>
+          </a:p>
+          <a:p>
+            <a:pPr>
+              <a:buFont typeface="Wingdings" panose="05000000000000000000" pitchFamily="2" charset="2"/>
+              <a:buChar char="v"/>
+            </a:pPr>
+            <a:r>
+              <a:rPr lang="en-US" sz="1300" dirty="0">
+                <a:cs typeface="Arial" panose="020B0604020202020204" pitchFamily="34" charset="0"/>
+              </a:rPr>
+              <a:t>Insight4: When the </a:t>
+            </a:r>
+            <a:r>
+              <a:rPr lang="en-US" sz="1300" b="1" u="sng" dirty="0">
+                <a:cs typeface="Arial" panose="020B0604020202020204" pitchFamily="34" charset="0"/>
+              </a:rPr>
+              <a:t>loan term </a:t>
+            </a:r>
+            <a:r>
+              <a:rPr lang="en-US" sz="1300" dirty="0">
+                <a:cs typeface="Arial" panose="020B0604020202020204" pitchFamily="34" charset="0"/>
+              </a:rPr>
+              <a:t>is 60 months, 25% of the total loans  got charged off</a:t>
+            </a:r>
+          </a:p>
+          <a:p>
+            <a:pPr>
+              <a:buFont typeface="Wingdings" panose="05000000000000000000" pitchFamily="2" charset="2"/>
+              <a:buChar char="v"/>
+            </a:pPr>
+            <a:r>
+              <a:rPr lang="en-US" sz="1300" dirty="0">
+                <a:cs typeface="Arial" panose="020B0604020202020204" pitchFamily="34" charset="0"/>
+              </a:rPr>
+              <a:t>Insight5: As the grade of loan moves from A to G, the percentage of charged off loans keeps increasing. While only 6% of the grade A loans ended up in charged off, in grade G over 33% of the loans are charged off</a:t>
+            </a:r>
+          </a:p>
+          <a:p>
+            <a:pPr>
+              <a:buFont typeface="Wingdings" panose="05000000000000000000" pitchFamily="2" charset="2"/>
+              <a:buChar char="v"/>
+            </a:pPr>
+            <a:r>
+              <a:rPr lang="en-US" sz="1300" dirty="0">
+                <a:cs typeface="Arial" panose="020B0604020202020204" pitchFamily="34" charset="0"/>
+              </a:rPr>
+              <a:t>Insight6: In the F5 </a:t>
+            </a:r>
+            <a:r>
+              <a:rPr lang="en-US" sz="1300" b="1" u="sng" dirty="0">
+                <a:cs typeface="Arial" panose="020B0604020202020204" pitchFamily="34" charset="0"/>
+              </a:rPr>
+              <a:t>subgrade, </a:t>
+            </a:r>
+            <a:r>
+              <a:rPr lang="en-US" sz="1300" dirty="0">
+                <a:cs typeface="Arial" panose="020B0604020202020204" pitchFamily="34" charset="0"/>
+              </a:rPr>
+              <a:t>almost 48% of the loans resulted in charged off loans. In these subgrades F5,G3,G2,F4,G5,G1 the charged off loans percentage is very high(more than 33%. At least One in every three loans got charged off)</a:t>
+            </a:r>
+          </a:p>
+          <a:p>
+            <a:pPr>
+              <a:buFont typeface="Wingdings" panose="05000000000000000000" pitchFamily="2" charset="2"/>
+              <a:buChar char="v"/>
+            </a:pPr>
+            <a:r>
+              <a:rPr lang="en-US" sz="1300" dirty="0">
+                <a:cs typeface="Arial" panose="020B0604020202020204" pitchFamily="34" charset="0"/>
+              </a:rPr>
+              <a:t>Insight7: Lending for the purpose of small business turned out to be risky. More than 27% of the total loans resulted in charged off, this is way more than the average of 16%</a:t>
+            </a:r>
+          </a:p>
+          <a:p>
+            <a:pPr>
+              <a:buFont typeface="Wingdings" panose="05000000000000000000" pitchFamily="2" charset="2"/>
+              <a:buChar char="v"/>
+            </a:pPr>
+            <a:r>
+              <a:rPr lang="en-US" sz="1300" dirty="0">
+                <a:cs typeface="Arial" panose="020B0604020202020204" pitchFamily="34" charset="0"/>
+              </a:rPr>
+              <a:t>Insight8: The percentage of charged off loans is around 15% in most cases except DC-7% and NV-22.5%</a:t>
+            </a:r>
+          </a:p>
+          <a:p>
+            <a:pPr>
+              <a:buFont typeface="Wingdings" panose="05000000000000000000" pitchFamily="2" charset="2"/>
+              <a:buChar char="v"/>
+            </a:pPr>
+            <a:r>
+              <a:rPr lang="en-US" sz="1300" dirty="0">
+                <a:cs typeface="Arial" panose="020B0604020202020204" pitchFamily="34" charset="0"/>
+              </a:rPr>
+              <a:t>Insight9: When there is one </a:t>
+            </a:r>
+            <a:r>
+              <a:rPr lang="en-US" sz="1300" b="1" u="sng" dirty="0" err="1">
+                <a:cs typeface="Arial" panose="020B0604020202020204" pitchFamily="34" charset="0"/>
+              </a:rPr>
+              <a:t>pubrec</a:t>
+            </a:r>
+            <a:r>
+              <a:rPr lang="en-US" sz="1300" dirty="0">
+                <a:cs typeface="Arial" panose="020B0604020202020204" pitchFamily="34" charset="0"/>
+              </a:rPr>
+              <a:t>, the percent of charged off loans is high when compared to average. The other sample sizes are very small, so not considering them.</a:t>
+            </a:r>
+          </a:p>
+          <a:p>
+            <a:pPr>
+              <a:buFont typeface="Wingdings" panose="05000000000000000000" pitchFamily="2" charset="2"/>
+              <a:buChar char="v"/>
+            </a:pPr>
+            <a:r>
+              <a:rPr lang="en-US" sz="1300" dirty="0">
+                <a:cs typeface="Arial" panose="020B0604020202020204" pitchFamily="34" charset="0"/>
+              </a:rPr>
+              <a:t>Insight10: When there is one </a:t>
+            </a:r>
+            <a:r>
+              <a:rPr lang="en-US" sz="1300" b="1" u="sng" dirty="0" err="1">
+                <a:cs typeface="Arial" panose="020B0604020202020204" pitchFamily="34" charset="0"/>
+              </a:rPr>
+              <a:t>pub_rec</a:t>
+            </a:r>
+            <a:r>
+              <a:rPr lang="en-US" sz="1300" b="1" u="sng" dirty="0">
+                <a:cs typeface="Arial" panose="020B0604020202020204" pitchFamily="34" charset="0"/>
+              </a:rPr>
+              <a:t>, bankruptcy</a:t>
+            </a:r>
+            <a:r>
+              <a:rPr lang="en-US" sz="1300" dirty="0">
+                <a:cs typeface="Arial" panose="020B0604020202020204" pitchFamily="34" charset="0"/>
+              </a:rPr>
+              <a:t>, the percent of charged off loans is high when compared to average. The other sample sizes are very small, so not considering them</a:t>
+            </a:r>
+            <a:endParaRPr lang="en-IN" sz="1300" dirty="0">
+              <a:cs typeface="Arial" panose="020B0604020202020204" pitchFamily="34" charset="0"/>
+            </a:endParaRPr>
+          </a:p>
+        </p:txBody>
+      </p:sp>
+    </p:spTree>
+    <p:extLst>
+      <p:ext uri="{BB962C8B-B14F-4D97-AF65-F5344CB8AC3E}">
+        <p14:creationId xmlns:p14="http://schemas.microsoft.com/office/powerpoint/2010/main" val="2962964088"/>
       </p:ext>
     </p:extLst>
   </p:cSld>
@@ -5110,35 +7998,6 @@
 </file>
 
 <file path=customXml/item1.xml><?xml version="1.0" encoding="utf-8"?>
-<p:properties xmlns:p="http://schemas.microsoft.com/office/2006/metadata/properties" xmlns:xsi="http://www.w3.org/2001/XMLSchema-instance" xmlns:pc="http://schemas.microsoft.com/office/infopath/2007/PartnerControls">
-  <documentManagement>
-    <_ip_UnifiedCompliancePolicyUIAction xmlns="http://schemas.microsoft.com/sharepoint/v3" xsi:nil="true"/>
-    <Image xmlns="71af3243-3dd4-4a8d-8c0d-dd76da1f02a5">
-      <Url xsi:nil="true"/>
-      <Description xsi:nil="true"/>
-    </Image>
-    <Status xmlns="71af3243-3dd4-4a8d-8c0d-dd76da1f02a5">Not started</Status>
-    <Background xmlns="71af3243-3dd4-4a8d-8c0d-dd76da1f02a5">false</Background>
-    <_ip_UnifiedCompliancePolicyProperties xmlns="http://schemas.microsoft.com/sharepoint/v3" xsi:nil="true"/>
-    <ImageTagsTaxHTField xmlns="71af3243-3dd4-4a8d-8c0d-dd76da1f02a5">
-      <Terms xmlns="http://schemas.microsoft.com/office/infopath/2007/PartnerControls"/>
-    </ImageTagsTaxHTField>
-    <TaxCatchAll xmlns="230e9df3-be65-4c73-a93b-d1236ebd677e" xsi:nil="true"/>
-    <MediaServiceKeyPoints xmlns="71af3243-3dd4-4a8d-8c0d-dd76da1f02a5" xsi:nil="true"/>
-  </documentManagement>
-</p:properties>
-</file>
-
-<file path=customXml/item2.xml><?xml version="1.0" encoding="utf-8"?>
-<?mso-contentType ?>
-<FormTemplates xmlns="http://schemas.microsoft.com/sharepoint/v3/contenttype/forms">
-  <Display>DocumentLibraryForm</Display>
-  <Edit>DocumentLibraryForm</Edit>
-  <New>DocumentLibraryForm</New>
-</FormTemplates>
-</file>
-
-<file path=customXml/item3.xml><?xml version="1.0" encoding="utf-8"?>
 <ct:contentTypeSchema xmlns:ct="http://schemas.microsoft.com/office/2006/metadata/contentType" xmlns:ma="http://schemas.microsoft.com/office/2006/metadata/properties/metaAttributes" ct:_="" ma:_="" ma:contentTypeName="Document" ma:contentTypeID="0x01010079F111ED35F8CC479449609E8A0923A6" ma:contentTypeVersion="27" ma:contentTypeDescription="Create a new document." ma:contentTypeScope="" ma:versionID="c6f9a84f66a9c8b9a21755b9ffafb945">
   <xsd:schema xmlns:xsd="http://www.w3.org/2001/XMLSchema" xmlns:xs="http://www.w3.org/2001/XMLSchema" xmlns:p="http://schemas.microsoft.com/office/2006/metadata/properties" xmlns:ns1="http://schemas.microsoft.com/sharepoint/v3" xmlns:ns2="71af3243-3dd4-4a8d-8c0d-dd76da1f02a5" xmlns:ns3="16c05727-aa75-4e4a-9b5f-8a80a1165891" xmlns:ns4="230e9df3-be65-4c73-a93b-d1236ebd677e" targetNamespace="http://schemas.microsoft.com/office/2006/metadata/properties" ma:root="true" ma:fieldsID="27df39e3e7036dff54f89ddd5805ce72" ns1:_="" ns2:_="" ns3:_="" ns4:_="">
     <xsd:import namespace="http://schemas.microsoft.com/sharepoint/v3"/>
@@ -5444,27 +8303,36 @@
 </ct:contentTypeSchema>
 </file>
 
-<file path=customXml/itemProps1.xml><?xml version="1.0" encoding="utf-8"?>
-<ds:datastoreItem xmlns:ds="http://schemas.openxmlformats.org/officeDocument/2006/customXml" ds:itemID="{6F4F4D41-822D-40F2-A7AC-E4E6CB36CA7A}">
-  <ds:schemaRefs>
-    <ds:schemaRef ds:uri="http://schemas.microsoft.com/office/2006/metadata/properties"/>
-    <ds:schemaRef ds:uri="http://schemas.microsoft.com/office/infopath/2007/PartnerControls"/>
-    <ds:schemaRef ds:uri="http://schemas.microsoft.com/sharepoint/v3"/>
-    <ds:schemaRef ds:uri="71af3243-3dd4-4a8d-8c0d-dd76da1f02a5"/>
-    <ds:schemaRef ds:uri="230e9df3-be65-4c73-a93b-d1236ebd677e"/>
-  </ds:schemaRefs>
-</ds:datastoreItem>
+<file path=customXml/item2.xml><?xml version="1.0" encoding="utf-8"?>
+<?mso-contentType ?>
+<FormTemplates xmlns="http://schemas.microsoft.com/sharepoint/v3/contenttype/forms">
+  <Display>DocumentLibraryForm</Display>
+  <Edit>DocumentLibraryForm</Edit>
+  <New>DocumentLibraryForm</New>
+</FormTemplates>
 </file>
 
-<file path=customXml/itemProps2.xml><?xml version="1.0" encoding="utf-8"?>
-<ds:datastoreItem xmlns:ds="http://schemas.openxmlformats.org/officeDocument/2006/customXml" ds:itemID="{19DAD249-BF80-48EF-9AFB-36A11BCDC2CE}">
-  <ds:schemaRefs>
-    <ds:schemaRef ds:uri="http://schemas.microsoft.com/sharepoint/v3/contenttype/forms"/>
-  </ds:schemaRefs>
-</ds:datastoreItem>
+<file path=customXml/item3.xml><?xml version="1.0" encoding="utf-8"?>
+<p:properties xmlns:p="http://schemas.microsoft.com/office/2006/metadata/properties" xmlns:xsi="http://www.w3.org/2001/XMLSchema-instance" xmlns:pc="http://schemas.microsoft.com/office/infopath/2007/PartnerControls">
+  <documentManagement>
+    <_ip_UnifiedCompliancePolicyUIAction xmlns="http://schemas.microsoft.com/sharepoint/v3" xsi:nil="true"/>
+    <Image xmlns="71af3243-3dd4-4a8d-8c0d-dd76da1f02a5">
+      <Url xsi:nil="true"/>
+      <Description xsi:nil="true"/>
+    </Image>
+    <Status xmlns="71af3243-3dd4-4a8d-8c0d-dd76da1f02a5">Not started</Status>
+    <Background xmlns="71af3243-3dd4-4a8d-8c0d-dd76da1f02a5">false</Background>
+    <_ip_UnifiedCompliancePolicyProperties xmlns="http://schemas.microsoft.com/sharepoint/v3" xsi:nil="true"/>
+    <ImageTagsTaxHTField xmlns="71af3243-3dd4-4a8d-8c0d-dd76da1f02a5">
+      <Terms xmlns="http://schemas.microsoft.com/office/infopath/2007/PartnerControls"/>
+    </ImageTagsTaxHTField>
+    <TaxCatchAll xmlns="230e9df3-be65-4c73-a93b-d1236ebd677e" xsi:nil="true"/>
+    <MediaServiceKeyPoints xmlns="71af3243-3dd4-4a8d-8c0d-dd76da1f02a5" xsi:nil="true"/>
+  </documentManagement>
+</p:properties>
 </file>
 
-<file path=customXml/itemProps3.xml><?xml version="1.0" encoding="utf-8"?>
+<file path=customXml/itemProps1.xml><?xml version="1.0" encoding="utf-8"?>
 <ds:datastoreItem xmlns:ds="http://schemas.openxmlformats.org/officeDocument/2006/customXml" ds:itemID="{C5A59D56-2157-4202-9D02-F44E447A241D}">
   <ds:schemaRefs>
     <ds:schemaRef ds:uri="http://schemas.microsoft.com/office/2006/metadata/contentType"/>
@@ -5483,4 +8351,24 @@
     <ds:schemaRef ds:uri="http://schemas.microsoft.com/internal/obd"/>
   </ds:schemaRefs>
 </ds:datastoreItem>
+</file>
+
+<file path=customXml/itemProps2.xml><?xml version="1.0" encoding="utf-8"?>
+<ds:datastoreItem xmlns:ds="http://schemas.openxmlformats.org/officeDocument/2006/customXml" ds:itemID="{19DAD249-BF80-48EF-9AFB-36A11BCDC2CE}">
+  <ds:schemaRefs>
+    <ds:schemaRef ds:uri="http://schemas.microsoft.com/sharepoint/v3/contenttype/forms"/>
+  </ds:schemaRefs>
+</ds:datastoreItem>
+</file>
+
+<file path=customXml/itemProps3.xml><?xml version="1.0" encoding="utf-8"?>
+<ds:datastoreItem xmlns:ds="http://schemas.openxmlformats.org/officeDocument/2006/customXml" ds:itemID="{6F4F4D41-822D-40F2-A7AC-E4E6CB36CA7A}">
+  <ds:schemaRefs>
+    <ds:schemaRef ds:uri="http://schemas.microsoft.com/office/2006/metadata/properties"/>
+    <ds:schemaRef ds:uri="http://schemas.microsoft.com/office/infopath/2007/PartnerControls"/>
+    <ds:schemaRef ds:uri="http://schemas.microsoft.com/sharepoint/v3"/>
+    <ds:schemaRef ds:uri="71af3243-3dd4-4a8d-8c0d-dd76da1f02a5"/>
+    <ds:schemaRef ds:uri="230e9df3-be65-4c73-a93b-d1236ebd677e"/>
+  </ds:schemaRefs>
+</ds:datastoreItem>
 </file>
</xml_diff>

<commit_message>
added redme and pdf files
</commit_message>
<xml_diff>
--- a/LendingClubCaseStudy-Presentation.pptx
+++ b/LendingClubCaseStudy-Presentation.pptx
@@ -374,7 +374,7 @@
           <a:p>
             <a:fld id="{9184DA70-C731-4C70-880D-CCD4705E623C}" type="datetime1">
               <a:rPr lang="en-US" smtClean="0"/>
-              <a:t>5/25/2024</a:t>
+              <a:t>5/26/2024</a:t>
             </a:fld>
             <a:endParaRPr lang="en-US" dirty="0"/>
           </a:p>
@@ -562,7 +562,7 @@
           <a:p>
             <a:fld id="{B612A279-0833-481D-8C56-F67FD0AC6C50}" type="datetime1">
               <a:rPr lang="en-US" smtClean="0"/>
-              <a:t>5/25/2024</a:t>
+              <a:t>5/26/2024</a:t>
             </a:fld>
             <a:endParaRPr lang="en-US" dirty="0"/>
           </a:p>
@@ -804,7 +804,7 @@
           <a:p>
             <a:fld id="{6587DA83-5663-4C9C-B9AA-0B40A3DAFF81}" type="datetime1">
               <a:rPr lang="en-US" smtClean="0"/>
-              <a:t>5/25/2024</a:t>
+              <a:t>5/26/2024</a:t>
             </a:fld>
             <a:endParaRPr lang="en-US" dirty="0"/>
           </a:p>
@@ -992,7 +992,7 @@
           <a:p>
             <a:fld id="{4BE1D723-8F53-4F53-90B0-1982A396982E}" type="datetime1">
               <a:rPr lang="en-US" smtClean="0"/>
-              <a:t>5/25/2024</a:t>
+              <a:t>5/26/2024</a:t>
             </a:fld>
             <a:endParaRPr lang="en-US" dirty="0"/>
           </a:p>
@@ -1365,7 +1365,7 @@
           <a:p>
             <a:fld id="{97669AF7-7BEB-44E4-9852-375E34362B5B}" type="datetime1">
               <a:rPr lang="en-US" smtClean="0"/>
-              <a:t>5/25/2024</a:t>
+              <a:t>5/26/2024</a:t>
             </a:fld>
             <a:endParaRPr lang="en-US" dirty="0"/>
           </a:p>
@@ -1620,7 +1620,7 @@
           <a:p>
             <a:fld id="{BAAAC38D-0552-4C82-B593-E6124DFADBE2}" type="datetime1">
               <a:rPr lang="en-US" smtClean="0"/>
-              <a:t>5/25/2024</a:t>
+              <a:t>5/26/2024</a:t>
             </a:fld>
             <a:endParaRPr lang="en-US" dirty="0"/>
           </a:p>
@@ -2017,7 +2017,7 @@
           <a:p>
             <a:fld id="{D9DF0F1C-5577-4ACB-BB62-DF8F3C494C7E}" type="datetime1">
               <a:rPr lang="en-US" smtClean="0"/>
-              <a:t>5/25/2024</a:t>
+              <a:t>5/26/2024</a:t>
             </a:fld>
             <a:endParaRPr lang="en-US" dirty="0"/>
           </a:p>
@@ -2153,7 +2153,7 @@
           <a:p>
             <a:fld id="{1775B394-D9F9-4F0C-B15D-605F45CB9E9F}" type="datetime1">
               <a:rPr lang="en-US" smtClean="0"/>
-              <a:t>5/25/2024</a:t>
+              <a:t>5/26/2024</a:t>
             </a:fld>
             <a:endParaRPr lang="en-US" dirty="0"/>
           </a:p>
@@ -2310,7 +2310,7 @@
           <a:p>
             <a:fld id="{39667345-2558-425A-8533-9BFDBCE15005}" type="datetime1">
               <a:rPr lang="en-US" smtClean="0"/>
-              <a:t>5/25/2024</a:t>
+              <a:t>5/26/2024</a:t>
             </a:fld>
             <a:endParaRPr lang="en-US" dirty="0"/>
           </a:p>
@@ -2639,7 +2639,7 @@
           <a:p>
             <a:fld id="{92BEA474-078D-4E9B-9B14-09A87B19DC46}" type="datetime1">
               <a:rPr lang="en-US" smtClean="0"/>
-              <a:t>5/25/2024</a:t>
+              <a:t>5/26/2024</a:t>
             </a:fld>
             <a:endParaRPr lang="en-US" dirty="0"/>
           </a:p>
@@ -2989,7 +2989,7 @@
           <a:p>
             <a:fld id="{4907D986-8816-4272-A432-0437A28A9828}" type="datetime1">
               <a:rPr lang="en-US" smtClean="0"/>
-              <a:t>5/25/2024</a:t>
+              <a:t>5/26/2024</a:t>
             </a:fld>
             <a:endParaRPr lang="en-US" dirty="0"/>
           </a:p>
@@ -3250,7 +3250,7 @@
           <a:p>
             <a:fld id="{62D6E202-B606-4609-B914-27C9371A1F6D}" type="datetime1">
               <a:rPr lang="en-US" smtClean="0"/>
-              <a:t>5/25/2024</a:t>
+              <a:t>5/26/2024</a:t>
             </a:fld>
             <a:endParaRPr lang="en-US" dirty="0"/>
           </a:p>
@@ -4250,7 +4250,7 @@
           <a:p>
             <a:r>
               <a:rPr lang="en-US" dirty="0"/>
-              <a:t>Insight 3</a:t>
+              <a:t>Insight 2</a:t>
             </a:r>
             <a:endParaRPr lang="en-IN" dirty="0"/>
           </a:p>
@@ -5926,7 +5926,17 @@
           <a:bodyPr/>
           <a:lstStyle/>
           <a:p>
-            <a:endParaRPr lang="en-IN"/>
+            <a:r>
+              <a:rPr lang="en-IN" dirty="0">
+                <a:solidFill>
+                  <a:srgbClr val="C00000"/>
+                </a:solidFill>
+              </a:rPr>
+              <a:t>&lt;need to add&gt;</a:t>
+            </a:r>
+          </a:p>
+          <a:p>
+            <a:endParaRPr lang="en-IN" dirty="0"/>
           </a:p>
         </p:txBody>
       </p:sp>
@@ -7115,7 +7125,66 @@
               <a:rPr lang="en-US" sz="1600" dirty="0"/>
               <a:t>Identify Categorical and Numeric variables</a:t>
             </a:r>
-            <a:endParaRPr lang="en-US" sz="1400" dirty="0"/>
+          </a:p>
+          <a:p>
+            <a:pPr lvl="1">
+              <a:buFont typeface="Wingdings" panose="05000000000000000000" pitchFamily="2" charset="2"/>
+              <a:buChar char="v"/>
+            </a:pPr>
+            <a:r>
+              <a:rPr lang="en-US" sz="1600" dirty="0"/>
+              <a:t>Univariate Analysis</a:t>
+            </a:r>
+          </a:p>
+          <a:p>
+            <a:pPr lvl="2">
+              <a:buFont typeface="Wingdings" panose="05000000000000000000" pitchFamily="2" charset="2"/>
+              <a:buChar char="v"/>
+            </a:pPr>
+            <a:r>
+              <a:rPr lang="en-US" sz="1200" dirty="0"/>
+              <a:t>Categorical columns</a:t>
+            </a:r>
+          </a:p>
+          <a:p>
+            <a:pPr lvl="2">
+              <a:buFont typeface="Wingdings" panose="05000000000000000000" pitchFamily="2" charset="2"/>
+              <a:buChar char="v"/>
+            </a:pPr>
+            <a:r>
+              <a:rPr lang="en-US" sz="1200" dirty="0"/>
+              <a:t>Numeric Columns</a:t>
+            </a:r>
+          </a:p>
+          <a:p>
+            <a:pPr lvl="1">
+              <a:buFont typeface="Wingdings" panose="05000000000000000000" pitchFamily="2" charset="2"/>
+              <a:buChar char="v"/>
+            </a:pPr>
+            <a:r>
+              <a:rPr lang="en-US" sz="1600" dirty="0"/>
+              <a:t>Bivariate Analysis</a:t>
+            </a:r>
+          </a:p>
+          <a:p>
+            <a:pPr lvl="2">
+              <a:buFont typeface="Wingdings" panose="05000000000000000000" pitchFamily="2" charset="2"/>
+              <a:buChar char="v"/>
+            </a:pPr>
+            <a:r>
+              <a:rPr lang="en-US" sz="1200" dirty="0"/>
+              <a:t>Categorical columns</a:t>
+            </a:r>
+          </a:p>
+          <a:p>
+            <a:pPr lvl="2">
+              <a:buFont typeface="Wingdings" panose="05000000000000000000" pitchFamily="2" charset="2"/>
+              <a:buChar char="v"/>
+            </a:pPr>
+            <a:r>
+              <a:rPr lang="en-US" sz="1200" dirty="0"/>
+              <a:t>Numeric Columns</a:t>
+            </a:r>
           </a:p>
           <a:p>
             <a:pPr lvl="1">
@@ -7998,6 +8067,35 @@
 </file>
 
 <file path=customXml/item1.xml><?xml version="1.0" encoding="utf-8"?>
+<p:properties xmlns:p="http://schemas.microsoft.com/office/2006/metadata/properties" xmlns:xsi="http://www.w3.org/2001/XMLSchema-instance" xmlns:pc="http://schemas.microsoft.com/office/infopath/2007/PartnerControls">
+  <documentManagement>
+    <_ip_UnifiedCompliancePolicyUIAction xmlns="http://schemas.microsoft.com/sharepoint/v3" xsi:nil="true"/>
+    <Image xmlns="71af3243-3dd4-4a8d-8c0d-dd76da1f02a5">
+      <Url xsi:nil="true"/>
+      <Description xsi:nil="true"/>
+    </Image>
+    <Status xmlns="71af3243-3dd4-4a8d-8c0d-dd76da1f02a5">Not started</Status>
+    <Background xmlns="71af3243-3dd4-4a8d-8c0d-dd76da1f02a5">false</Background>
+    <_ip_UnifiedCompliancePolicyProperties xmlns="http://schemas.microsoft.com/sharepoint/v3" xsi:nil="true"/>
+    <ImageTagsTaxHTField xmlns="71af3243-3dd4-4a8d-8c0d-dd76da1f02a5">
+      <Terms xmlns="http://schemas.microsoft.com/office/infopath/2007/PartnerControls"/>
+    </ImageTagsTaxHTField>
+    <TaxCatchAll xmlns="230e9df3-be65-4c73-a93b-d1236ebd677e" xsi:nil="true"/>
+    <MediaServiceKeyPoints xmlns="71af3243-3dd4-4a8d-8c0d-dd76da1f02a5" xsi:nil="true"/>
+  </documentManagement>
+</p:properties>
+</file>
+
+<file path=customXml/item2.xml><?xml version="1.0" encoding="utf-8"?>
+<?mso-contentType ?>
+<FormTemplates xmlns="http://schemas.microsoft.com/sharepoint/v3/contenttype/forms">
+  <Display>DocumentLibraryForm</Display>
+  <Edit>DocumentLibraryForm</Edit>
+  <New>DocumentLibraryForm</New>
+</FormTemplates>
+</file>
+
+<file path=customXml/item3.xml><?xml version="1.0" encoding="utf-8"?>
 <ct:contentTypeSchema xmlns:ct="http://schemas.microsoft.com/office/2006/metadata/contentType" xmlns:ma="http://schemas.microsoft.com/office/2006/metadata/properties/metaAttributes" ct:_="" ma:_="" ma:contentTypeName="Document" ma:contentTypeID="0x01010079F111ED35F8CC479449609E8A0923A6" ma:contentTypeVersion="27" ma:contentTypeDescription="Create a new document." ma:contentTypeScope="" ma:versionID="c6f9a84f66a9c8b9a21755b9ffafb945">
   <xsd:schema xmlns:xsd="http://www.w3.org/2001/XMLSchema" xmlns:xs="http://www.w3.org/2001/XMLSchema" xmlns:p="http://schemas.microsoft.com/office/2006/metadata/properties" xmlns:ns1="http://schemas.microsoft.com/sharepoint/v3" xmlns:ns2="71af3243-3dd4-4a8d-8c0d-dd76da1f02a5" xmlns:ns3="16c05727-aa75-4e4a-9b5f-8a80a1165891" xmlns:ns4="230e9df3-be65-4c73-a93b-d1236ebd677e" targetNamespace="http://schemas.microsoft.com/office/2006/metadata/properties" ma:root="true" ma:fieldsID="27df39e3e7036dff54f89ddd5805ce72" ns1:_="" ns2:_="" ns3:_="" ns4:_="">
     <xsd:import namespace="http://schemas.microsoft.com/sharepoint/v3"/>
@@ -8303,36 +8401,27 @@
 </ct:contentTypeSchema>
 </file>
 
-<file path=customXml/item2.xml><?xml version="1.0" encoding="utf-8"?>
-<?mso-contentType ?>
-<FormTemplates xmlns="http://schemas.microsoft.com/sharepoint/v3/contenttype/forms">
-  <Display>DocumentLibraryForm</Display>
-  <Edit>DocumentLibraryForm</Edit>
-  <New>DocumentLibraryForm</New>
-</FormTemplates>
+<file path=customXml/itemProps1.xml><?xml version="1.0" encoding="utf-8"?>
+<ds:datastoreItem xmlns:ds="http://schemas.openxmlformats.org/officeDocument/2006/customXml" ds:itemID="{6F4F4D41-822D-40F2-A7AC-E4E6CB36CA7A}">
+  <ds:schemaRefs>
+    <ds:schemaRef ds:uri="http://schemas.microsoft.com/office/2006/metadata/properties"/>
+    <ds:schemaRef ds:uri="http://schemas.microsoft.com/office/infopath/2007/PartnerControls"/>
+    <ds:schemaRef ds:uri="http://schemas.microsoft.com/sharepoint/v3"/>
+    <ds:schemaRef ds:uri="71af3243-3dd4-4a8d-8c0d-dd76da1f02a5"/>
+    <ds:schemaRef ds:uri="230e9df3-be65-4c73-a93b-d1236ebd677e"/>
+  </ds:schemaRefs>
+</ds:datastoreItem>
 </file>
 
-<file path=customXml/item3.xml><?xml version="1.0" encoding="utf-8"?>
-<p:properties xmlns:p="http://schemas.microsoft.com/office/2006/metadata/properties" xmlns:xsi="http://www.w3.org/2001/XMLSchema-instance" xmlns:pc="http://schemas.microsoft.com/office/infopath/2007/PartnerControls">
-  <documentManagement>
-    <_ip_UnifiedCompliancePolicyUIAction xmlns="http://schemas.microsoft.com/sharepoint/v3" xsi:nil="true"/>
-    <Image xmlns="71af3243-3dd4-4a8d-8c0d-dd76da1f02a5">
-      <Url xsi:nil="true"/>
-      <Description xsi:nil="true"/>
-    </Image>
-    <Status xmlns="71af3243-3dd4-4a8d-8c0d-dd76da1f02a5">Not started</Status>
-    <Background xmlns="71af3243-3dd4-4a8d-8c0d-dd76da1f02a5">false</Background>
-    <_ip_UnifiedCompliancePolicyProperties xmlns="http://schemas.microsoft.com/sharepoint/v3" xsi:nil="true"/>
-    <ImageTagsTaxHTField xmlns="71af3243-3dd4-4a8d-8c0d-dd76da1f02a5">
-      <Terms xmlns="http://schemas.microsoft.com/office/infopath/2007/PartnerControls"/>
-    </ImageTagsTaxHTField>
-    <TaxCatchAll xmlns="230e9df3-be65-4c73-a93b-d1236ebd677e" xsi:nil="true"/>
-    <MediaServiceKeyPoints xmlns="71af3243-3dd4-4a8d-8c0d-dd76da1f02a5" xsi:nil="true"/>
-  </documentManagement>
-</p:properties>
+<file path=customXml/itemProps2.xml><?xml version="1.0" encoding="utf-8"?>
+<ds:datastoreItem xmlns:ds="http://schemas.openxmlformats.org/officeDocument/2006/customXml" ds:itemID="{19DAD249-BF80-48EF-9AFB-36A11BCDC2CE}">
+  <ds:schemaRefs>
+    <ds:schemaRef ds:uri="http://schemas.microsoft.com/sharepoint/v3/contenttype/forms"/>
+  </ds:schemaRefs>
+</ds:datastoreItem>
 </file>
 
-<file path=customXml/itemProps1.xml><?xml version="1.0" encoding="utf-8"?>
+<file path=customXml/itemProps3.xml><?xml version="1.0" encoding="utf-8"?>
 <ds:datastoreItem xmlns:ds="http://schemas.openxmlformats.org/officeDocument/2006/customXml" ds:itemID="{C5A59D56-2157-4202-9D02-F44E447A241D}">
   <ds:schemaRefs>
     <ds:schemaRef ds:uri="http://schemas.microsoft.com/office/2006/metadata/contentType"/>
@@ -8351,24 +8440,4 @@
     <ds:schemaRef ds:uri="http://schemas.microsoft.com/internal/obd"/>
   </ds:schemaRefs>
 </ds:datastoreItem>
-</file>
-
-<file path=customXml/itemProps2.xml><?xml version="1.0" encoding="utf-8"?>
-<ds:datastoreItem xmlns:ds="http://schemas.openxmlformats.org/officeDocument/2006/customXml" ds:itemID="{19DAD249-BF80-48EF-9AFB-36A11BCDC2CE}">
-  <ds:schemaRefs>
-    <ds:schemaRef ds:uri="http://schemas.microsoft.com/sharepoint/v3/contenttype/forms"/>
-  </ds:schemaRefs>
-</ds:datastoreItem>
-</file>
-
-<file path=customXml/itemProps3.xml><?xml version="1.0" encoding="utf-8"?>
-<ds:datastoreItem xmlns:ds="http://schemas.openxmlformats.org/officeDocument/2006/customXml" ds:itemID="{6F4F4D41-822D-40F2-A7AC-E4E6CB36CA7A}">
-  <ds:schemaRefs>
-    <ds:schemaRef ds:uri="http://schemas.microsoft.com/office/2006/metadata/properties"/>
-    <ds:schemaRef ds:uri="http://schemas.microsoft.com/office/infopath/2007/PartnerControls"/>
-    <ds:schemaRef ds:uri="http://schemas.microsoft.com/sharepoint/v3"/>
-    <ds:schemaRef ds:uri="71af3243-3dd4-4a8d-8c0d-dd76da1f02a5"/>
-    <ds:schemaRef ds:uri="230e9df3-be65-4c73-a93b-d1236ebd677e"/>
-  </ds:schemaRefs>
-</ds:datastoreItem>
 </file>
</xml_diff>

<commit_message>
finalized all files, before submit
</commit_message>
<xml_diff>
--- a/LendingClubCaseStudy-Presentation.pptx
+++ b/LendingClubCaseStudy-Presentation.pptx
@@ -13,17 +13,15 @@
     <p:sldId id="276" r:id="rId10"/>
     <p:sldId id="278" r:id="rId11"/>
     <p:sldId id="258" r:id="rId12"/>
-    <p:sldId id="263" r:id="rId13"/>
-    <p:sldId id="265" r:id="rId14"/>
-    <p:sldId id="274" r:id="rId15"/>
-    <p:sldId id="275" r:id="rId16"/>
-    <p:sldId id="273" r:id="rId17"/>
-    <p:sldId id="272" r:id="rId18"/>
-    <p:sldId id="271" r:id="rId19"/>
-    <p:sldId id="270" r:id="rId20"/>
-    <p:sldId id="269" r:id="rId21"/>
-    <p:sldId id="267" r:id="rId22"/>
-    <p:sldId id="266" r:id="rId23"/>
+    <p:sldId id="265" r:id="rId13"/>
+    <p:sldId id="274" r:id="rId14"/>
+    <p:sldId id="273" r:id="rId15"/>
+    <p:sldId id="272" r:id="rId16"/>
+    <p:sldId id="271" r:id="rId17"/>
+    <p:sldId id="270" r:id="rId18"/>
+    <p:sldId id="269" r:id="rId19"/>
+    <p:sldId id="267" r:id="rId20"/>
+    <p:sldId id="266" r:id="rId21"/>
   </p:sldIdLst>
   <p:sldSz cx="12192000" cy="6858000"/>
   <p:notesSz cx="6858000" cy="9144000"/>
@@ -374,7 +372,7 @@
           <a:p>
             <a:fld id="{9184DA70-C731-4C70-880D-CCD4705E623C}" type="datetime1">
               <a:rPr lang="en-US" smtClean="0"/>
-              <a:t>5/26/2024</a:t>
+              <a:t>5/27/2024</a:t>
             </a:fld>
             <a:endParaRPr lang="en-US" dirty="0"/>
           </a:p>
@@ -562,7 +560,7 @@
           <a:p>
             <a:fld id="{B612A279-0833-481D-8C56-F67FD0AC6C50}" type="datetime1">
               <a:rPr lang="en-US" smtClean="0"/>
-              <a:t>5/26/2024</a:t>
+              <a:t>5/27/2024</a:t>
             </a:fld>
             <a:endParaRPr lang="en-US" dirty="0"/>
           </a:p>
@@ -804,7 +802,7 @@
           <a:p>
             <a:fld id="{6587DA83-5663-4C9C-B9AA-0B40A3DAFF81}" type="datetime1">
               <a:rPr lang="en-US" smtClean="0"/>
-              <a:t>5/26/2024</a:t>
+              <a:t>5/27/2024</a:t>
             </a:fld>
             <a:endParaRPr lang="en-US" dirty="0"/>
           </a:p>
@@ -992,7 +990,7 @@
           <a:p>
             <a:fld id="{4BE1D723-8F53-4F53-90B0-1982A396982E}" type="datetime1">
               <a:rPr lang="en-US" smtClean="0"/>
-              <a:t>5/26/2024</a:t>
+              <a:t>5/27/2024</a:t>
             </a:fld>
             <a:endParaRPr lang="en-US" dirty="0"/>
           </a:p>
@@ -1365,7 +1363,7 @@
           <a:p>
             <a:fld id="{97669AF7-7BEB-44E4-9852-375E34362B5B}" type="datetime1">
               <a:rPr lang="en-US" smtClean="0"/>
-              <a:t>5/26/2024</a:t>
+              <a:t>5/27/2024</a:t>
             </a:fld>
             <a:endParaRPr lang="en-US" dirty="0"/>
           </a:p>
@@ -1620,7 +1618,7 @@
           <a:p>
             <a:fld id="{BAAAC38D-0552-4C82-B593-E6124DFADBE2}" type="datetime1">
               <a:rPr lang="en-US" smtClean="0"/>
-              <a:t>5/26/2024</a:t>
+              <a:t>5/27/2024</a:t>
             </a:fld>
             <a:endParaRPr lang="en-US" dirty="0"/>
           </a:p>
@@ -2017,7 +2015,7 @@
           <a:p>
             <a:fld id="{D9DF0F1C-5577-4ACB-BB62-DF8F3C494C7E}" type="datetime1">
               <a:rPr lang="en-US" smtClean="0"/>
-              <a:t>5/26/2024</a:t>
+              <a:t>5/27/2024</a:t>
             </a:fld>
             <a:endParaRPr lang="en-US" dirty="0"/>
           </a:p>
@@ -2153,7 +2151,7 @@
           <a:p>
             <a:fld id="{1775B394-D9F9-4F0C-B15D-605F45CB9E9F}" type="datetime1">
               <a:rPr lang="en-US" smtClean="0"/>
-              <a:t>5/26/2024</a:t>
+              <a:t>5/27/2024</a:t>
             </a:fld>
             <a:endParaRPr lang="en-US" dirty="0"/>
           </a:p>
@@ -2310,7 +2308,7 @@
           <a:p>
             <a:fld id="{39667345-2558-425A-8533-9BFDBCE15005}" type="datetime1">
               <a:rPr lang="en-US" smtClean="0"/>
-              <a:t>5/26/2024</a:t>
+              <a:t>5/27/2024</a:t>
             </a:fld>
             <a:endParaRPr lang="en-US" dirty="0"/>
           </a:p>
@@ -2639,7 +2637,7 @@
           <a:p>
             <a:fld id="{92BEA474-078D-4E9B-9B14-09A87B19DC46}" type="datetime1">
               <a:rPr lang="en-US" smtClean="0"/>
-              <a:t>5/26/2024</a:t>
+              <a:t>5/27/2024</a:t>
             </a:fld>
             <a:endParaRPr lang="en-US" dirty="0"/>
           </a:p>
@@ -2989,7 +2987,7 @@
           <a:p>
             <a:fld id="{4907D986-8816-4272-A432-0437A28A9828}" type="datetime1">
               <a:rPr lang="en-US" smtClean="0"/>
-              <a:t>5/26/2024</a:t>
+              <a:t>5/27/2024</a:t>
             </a:fld>
             <a:endParaRPr lang="en-US" dirty="0"/>
           </a:p>
@@ -3250,7 +3248,7 @@
           <a:p>
             <a:fld id="{62D6E202-B606-4609-B914-27C9371A1F6D}" type="datetime1">
               <a:rPr lang="en-US" smtClean="0"/>
-              <a:t>5/26/2024</a:t>
+              <a:t>5/27/2024</a:t>
             </a:fld>
             <a:endParaRPr lang="en-US" dirty="0"/>
           </a:p>
@@ -3870,7 +3868,7 @@
           <a:lstStyle/>
           <a:p>
             <a:r>
-              <a:rPr lang="en-US" sz="8000" dirty="0"/>
+              <a:rPr lang="en-US" sz="7200" dirty="0"/>
               <a:t>Lending Club Case Study</a:t>
             </a:r>
           </a:p>
@@ -4090,17 +4088,28 @@
         </p:nvSpPr>
         <p:spPr>
           <a:xfrm>
-            <a:off x="1097280" y="191472"/>
+            <a:off x="1097280" y="808158"/>
             <a:ext cx="10058400" cy="748452"/>
           </a:xfrm>
         </p:spPr>
         <p:txBody>
-          <a:bodyPr/>
+          <a:bodyPr>
+            <a:normAutofit fontScale="90000"/>
+          </a:bodyPr>
           <a:lstStyle/>
           <a:p>
             <a:r>
-              <a:rPr lang="en-US" dirty="0"/>
-              <a:t>Insight 1</a:t>
+              <a:rPr lang="en-US" b="0" i="0" dirty="0">
+                <a:solidFill>
+                  <a:srgbClr val="202124"/>
+                </a:solidFill>
+                <a:effectLst/>
+                <a:highlight>
+                  <a:srgbClr val="FFFFFF"/>
+                </a:highlight>
+                <a:latin typeface="Roboto" panose="02000000000000000000" pitchFamily="2" charset="0"/>
+              </a:rPr>
+              <a:t>Relationship between interest rate and charged off loans</a:t>
             </a:r>
             <a:endParaRPr lang="en-IN" dirty="0"/>
           </a:p>
@@ -4124,12 +4133,14 @@
         </p:nvSpPr>
         <p:spPr>
           <a:xfrm>
-            <a:off x="1097280" y="1065321"/>
-            <a:ext cx="10058400" cy="4652846"/>
+            <a:off x="1097280" y="2020186"/>
+            <a:ext cx="10058400" cy="3697981"/>
           </a:xfrm>
         </p:spPr>
         <p:txBody>
-          <a:bodyPr/>
+          <a:bodyPr>
+            <a:normAutofit/>
+          </a:bodyPr>
           <a:lstStyle/>
           <a:p>
             <a:pPr>
@@ -4138,8 +4149,43 @@
             </a:pPr>
             <a:r>
               <a:rPr lang="en-US" dirty="0"/>
-              <a:t>At higher loan amounts the percent of charged off loans over total loans increased by 5 percentage points i.e. one in every five loans charged off</a:t>
-            </a:r>
+              <a:t>When the analysis is done for the dataset beyond 90th percentile of the interest rate, it is observed that the percentage of the charged off loans in the total loans in this dataset is 30%. This is double when compared to the percentage of charged off loans in the overall dataset(15%) indicating that at higher interest rate there is high chance of loan getting charged off.</a:t>
+            </a:r>
+          </a:p>
+          <a:p>
+            <a:pPr>
+              <a:buFont typeface="Wingdings" panose="05000000000000000000" pitchFamily="2" charset="2"/>
+              <a:buChar char="v"/>
+            </a:pPr>
+            <a:r>
+              <a:rPr lang="en-US" dirty="0"/>
+              <a:t>Similarly, when the analysis is done for the data below the 10th percentile of interest rate, it is observed that the percentage of the charged off loans in the total loans in this dataset is 4%. This is very less when compared to the percentage of charged off loans in the overall dataset(15%) indicating that, at lower interest rate there is high chance of loan getting fully paid.</a:t>
+            </a:r>
+          </a:p>
+          <a:p>
+            <a:pPr>
+              <a:buFont typeface="Wingdings" panose="05000000000000000000" pitchFamily="2" charset="2"/>
+              <a:buChar char="v"/>
+            </a:pPr>
+            <a:r>
+              <a:rPr lang="en-US" b="1" dirty="0"/>
+              <a:t>Observation: </a:t>
+            </a:r>
+          </a:p>
+          <a:p>
+            <a:pPr lvl="1">
+              <a:buFont typeface="Wingdings" panose="05000000000000000000" pitchFamily="2" charset="2"/>
+              <a:buChar char="v"/>
+            </a:pPr>
+            <a:r>
+              <a:rPr lang="en-US" dirty="0"/>
+              <a:t>Higher the interest rate, the higher are the chances for the loan getting </a:t>
+            </a:r>
+            <a:r>
+              <a:rPr lang="en-US" dirty="0" err="1"/>
+              <a:t>chargedoff</a:t>
+            </a:r>
+            <a:endParaRPr lang="en-US" dirty="0"/>
           </a:p>
           <a:p>
             <a:pPr>
@@ -4195,7 +4241,7 @@
     </p:spTree>
     <p:extLst>
       <p:ext uri="{BB962C8B-B14F-4D97-AF65-F5344CB8AC3E}">
-        <p14:creationId xmlns:p14="http://schemas.microsoft.com/office/powerpoint/2010/main" val="3011202115"/>
+        <p14:creationId xmlns:p14="http://schemas.microsoft.com/office/powerpoint/2010/main" val="1065348308"/>
       </p:ext>
     </p:extLst>
   </p:cSld>
@@ -4240,17 +4286,28 @@
         </p:nvSpPr>
         <p:spPr>
           <a:xfrm>
-            <a:off x="1097280" y="191472"/>
+            <a:off x="1097280" y="685884"/>
             <a:ext cx="10058400" cy="748452"/>
           </a:xfrm>
         </p:spPr>
         <p:txBody>
-          <a:bodyPr/>
+          <a:bodyPr>
+            <a:normAutofit/>
+          </a:bodyPr>
           <a:lstStyle/>
           <a:p>
             <a:r>
-              <a:rPr lang="en-US" dirty="0"/>
-              <a:t>Insight 2</a:t>
+              <a:rPr lang="en-US" b="0" i="0" dirty="0">
+                <a:solidFill>
+                  <a:srgbClr val="202124"/>
+                </a:solidFill>
+                <a:effectLst/>
+                <a:highlight>
+                  <a:srgbClr val="FFFFFF"/>
+                </a:highlight>
+                <a:latin typeface="Roboto" panose="02000000000000000000" pitchFamily="2" charset="0"/>
+              </a:rPr>
+              <a:t>Loan term and Charged Off loans</a:t>
             </a:r>
             <a:endParaRPr lang="en-IN" dirty="0"/>
           </a:p>
@@ -4274,12 +4331,14 @@
         </p:nvSpPr>
         <p:spPr>
           <a:xfrm>
-            <a:off x="1097280" y="939924"/>
-            <a:ext cx="10058400" cy="4778243"/>
+            <a:off x="1097280" y="1982972"/>
+            <a:ext cx="4644301" cy="3735194"/>
           </a:xfrm>
         </p:spPr>
         <p:txBody>
-          <a:bodyPr/>
+          <a:bodyPr>
+            <a:normAutofit lnSpcReduction="10000"/>
+          </a:bodyPr>
           <a:lstStyle/>
           <a:p>
             <a:pPr>
@@ -4288,7 +4347,7 @@
             </a:pPr>
             <a:r>
               <a:rPr lang="en-US" dirty="0"/>
-              <a:t>At higher interest rates, charged off loans  as a percentage of total loans doubled when compared to overall range of data. Three loans in every ten loans charged off, meaning there is correlation between higher interest rate and loan getting charged off</a:t>
+              <a:t>When the loan term is 60 months, 25% of the loans in this dataset got charged off. This is higher than the overall average of 15%</a:t>
             </a:r>
           </a:p>
           <a:p>
@@ -4296,14 +4355,34 @@
               <a:buFont typeface="Wingdings" panose="05000000000000000000" pitchFamily="2" charset="2"/>
               <a:buChar char="v"/>
             </a:pPr>
-            <a:endParaRPr lang="en-US" dirty="0"/>
+            <a:r>
+              <a:rPr lang="en-US" dirty="0"/>
+              <a:t>When the loan term is 36 months, only 11% of the loans in this dataset got charged off. This is lower than the overall average of 15% </a:t>
+            </a:r>
           </a:p>
           <a:p>
             <a:pPr>
               <a:buFont typeface="Wingdings" panose="05000000000000000000" pitchFamily="2" charset="2"/>
               <a:buChar char="v"/>
             </a:pPr>
-            <a:endParaRPr lang="en-US" dirty="0"/>
+            <a:r>
+              <a:rPr lang="en-US" b="1" dirty="0"/>
+              <a:t>Observation:</a:t>
+            </a:r>
+            <a:r>
+              <a:rPr lang="en-US" dirty="0"/>
+              <a:t> </a:t>
+            </a:r>
+          </a:p>
+          <a:p>
+            <a:pPr lvl="1">
+              <a:buFont typeface="Wingdings" panose="05000000000000000000" pitchFamily="2" charset="2"/>
+              <a:buChar char="v"/>
+            </a:pPr>
+            <a:r>
+              <a:rPr lang="en-US" dirty="0"/>
+              <a:t>Lending for longer term has high chances for loan getting charged off</a:t>
+            </a:r>
           </a:p>
           <a:p>
             <a:pPr>
@@ -4334,6 +4413,13 @@
             <a:endParaRPr lang="en-US" dirty="0"/>
           </a:p>
           <a:p>
+            <a:pPr>
+              <a:buFont typeface="Wingdings" panose="05000000000000000000" pitchFamily="2" charset="2"/>
+              <a:buChar char="v"/>
+            </a:pPr>
+            <a:endParaRPr lang="en-US" dirty="0"/>
+          </a:p>
+          <a:p>
             <a:pPr lvl="1">
               <a:buFont typeface="Wingdings" panose="05000000000000000000" pitchFamily="2" charset="2"/>
               <a:buChar char="v"/>
@@ -4342,10 +4428,40 @@
           </a:p>
         </p:txBody>
       </p:sp>
+      <p:pic>
+        <p:nvPicPr>
+          <p:cNvPr id="20" name="Picture 19">
+            <a:extLst>
+              <a:ext uri="{FF2B5EF4-FFF2-40B4-BE49-F238E27FC236}">
+                <a16:creationId xmlns:a16="http://schemas.microsoft.com/office/drawing/2014/main" id="{043339AA-8066-C89B-4936-3F86B84D934B}"/>
+              </a:ext>
+            </a:extLst>
+          </p:cNvPr>
+          <p:cNvPicPr>
+            <a:picLocks noChangeAspect="1"/>
+          </p:cNvPicPr>
+          <p:nvPr/>
+        </p:nvPicPr>
+        <p:blipFill>
+          <a:blip r:embed="rId2"/>
+          <a:stretch>
+            <a:fillRect/>
+          </a:stretch>
+        </p:blipFill>
+        <p:spPr>
+          <a:xfrm>
+            <a:off x="5888442" y="2057485"/>
+            <a:ext cx="5377379" cy="4161623"/>
+          </a:xfrm>
+          <a:prstGeom prst="rect">
+            <a:avLst/>
+          </a:prstGeom>
+        </p:spPr>
+      </p:pic>
     </p:spTree>
     <p:extLst>
       <p:ext uri="{BB962C8B-B14F-4D97-AF65-F5344CB8AC3E}">
-        <p14:creationId xmlns:p14="http://schemas.microsoft.com/office/powerpoint/2010/main" val="1065348308"/>
+        <p14:creationId xmlns:p14="http://schemas.microsoft.com/office/powerpoint/2010/main" val="3301793802"/>
       </p:ext>
     </p:extLst>
   </p:cSld>
@@ -4390,17 +4506,28 @@
         </p:nvSpPr>
         <p:spPr>
           <a:xfrm>
-            <a:off x="1097280" y="191472"/>
+            <a:off x="1097280" y="643356"/>
             <a:ext cx="10058400" cy="748452"/>
           </a:xfrm>
         </p:spPr>
         <p:txBody>
-          <a:bodyPr/>
+          <a:bodyPr>
+            <a:normAutofit/>
+          </a:bodyPr>
           <a:lstStyle/>
           <a:p>
             <a:r>
-              <a:rPr lang="en-US" dirty="0"/>
-              <a:t>Insight 3</a:t>
+              <a:rPr lang="en-US" b="0" i="0" dirty="0">
+                <a:solidFill>
+                  <a:srgbClr val="202124"/>
+                </a:solidFill>
+                <a:effectLst/>
+                <a:highlight>
+                  <a:srgbClr val="FFFFFF"/>
+                </a:highlight>
+                <a:latin typeface="Roboto" panose="02000000000000000000" pitchFamily="2" charset="0"/>
+              </a:rPr>
+              <a:t>Loan Grade and Charged Off loans</a:t>
             </a:r>
             <a:endParaRPr lang="en-IN" dirty="0"/>
           </a:p>
@@ -4424,8 +4551,8 @@
         </p:nvSpPr>
         <p:spPr>
           <a:xfrm>
-            <a:off x="1097280" y="1065321"/>
-            <a:ext cx="10058400" cy="4652846"/>
+            <a:off x="1097280" y="2008335"/>
+            <a:ext cx="4739994" cy="3709832"/>
           </a:xfrm>
         </p:spPr>
         <p:txBody>
@@ -4438,13 +4565,7 @@
             </a:pPr>
             <a:r>
               <a:rPr lang="en-US" dirty="0"/>
-              <a:t>When the interest rate is very low, the percent of charged off loans is way to less when compared to the overall range. This means when the interest rate is very low, very few loans gets charged </a:t>
-            </a:r>
-            <a:r>
-              <a:rPr lang="en-US" sz="2000" dirty="0">
-                <a:cs typeface="Arial" panose="020B0604020202020204" pitchFamily="34" charset="0"/>
-              </a:rPr>
-              <a:t>off</a:t>
+              <a:t>As the grade of loan moves from A to G, the percentage of charged off loans keeps increasing. While only 6% of the grade A loans ended up in charged off, in grade G over 33% of the loans are charged off</a:t>
             </a:r>
           </a:p>
           <a:p>
@@ -4452,7 +4573,20 @@
               <a:buFont typeface="Wingdings" panose="05000000000000000000" pitchFamily="2" charset="2"/>
               <a:buChar char="v"/>
             </a:pPr>
-            <a:endParaRPr lang="en-US" dirty="0"/>
+            <a:r>
+              <a:rPr lang="en-US" b="1" dirty="0"/>
+              <a:t>Observation: </a:t>
+            </a:r>
+          </a:p>
+          <a:p>
+            <a:pPr lvl="1">
+              <a:buFont typeface="Wingdings" panose="05000000000000000000" pitchFamily="2" charset="2"/>
+              <a:buChar char="v"/>
+            </a:pPr>
+            <a:r>
+              <a:rPr lang="en-US" dirty="0"/>
+              <a:t>The higher the grade of the loan(E,F,G), the higher are the chances of loan getting charged off. It is advised to give loans with grades (A,B,C) to minimize the credit loss.</a:t>
+            </a:r>
           </a:p>
           <a:p>
             <a:pPr>
@@ -4483,13 +4617,6 @@
             <a:endParaRPr lang="en-US" dirty="0"/>
           </a:p>
           <a:p>
-            <a:pPr>
-              <a:buFont typeface="Wingdings" panose="05000000000000000000" pitchFamily="2" charset="2"/>
-              <a:buChar char="v"/>
-            </a:pPr>
-            <a:endParaRPr lang="en-US" dirty="0"/>
-          </a:p>
-          <a:p>
             <a:pPr lvl="1">
               <a:buFont typeface="Wingdings" panose="05000000000000000000" pitchFamily="2" charset="2"/>
               <a:buChar char="v"/>
@@ -4498,10 +4625,40 @@
           </a:p>
         </p:txBody>
       </p:sp>
+      <p:pic>
+        <p:nvPicPr>
+          <p:cNvPr id="18" name="Picture 17">
+            <a:extLst>
+              <a:ext uri="{FF2B5EF4-FFF2-40B4-BE49-F238E27FC236}">
+                <a16:creationId xmlns:a16="http://schemas.microsoft.com/office/drawing/2014/main" id="{432B96F6-C84C-2F95-022D-31B4A65634E6}"/>
+              </a:ext>
+            </a:extLst>
+          </p:cNvPr>
+          <p:cNvPicPr>
+            <a:picLocks noChangeAspect="1"/>
+          </p:cNvPicPr>
+          <p:nvPr/>
+        </p:nvPicPr>
+        <p:blipFill>
+          <a:blip r:embed="rId2"/>
+          <a:stretch>
+            <a:fillRect/>
+          </a:stretch>
+        </p:blipFill>
+        <p:spPr>
+          <a:xfrm>
+            <a:off x="5809548" y="2008335"/>
+            <a:ext cx="5470488" cy="4294811"/>
+          </a:xfrm>
+          <a:prstGeom prst="rect">
+            <a:avLst/>
+          </a:prstGeom>
+        </p:spPr>
+      </p:pic>
     </p:spTree>
     <p:extLst>
       <p:ext uri="{BB962C8B-B14F-4D97-AF65-F5344CB8AC3E}">
-        <p14:creationId xmlns:p14="http://schemas.microsoft.com/office/powerpoint/2010/main" val="4261551828"/>
+        <p14:creationId xmlns:p14="http://schemas.microsoft.com/office/powerpoint/2010/main" val="2748959871"/>
       </p:ext>
     </p:extLst>
   </p:cSld>
@@ -4546,17 +4703,26 @@
         </p:nvSpPr>
         <p:spPr>
           <a:xfrm>
-            <a:off x="1097280" y="191472"/>
+            <a:off x="1097280" y="595508"/>
             <a:ext cx="10058400" cy="748452"/>
           </a:xfrm>
         </p:spPr>
         <p:txBody>
-          <a:bodyPr/>
+          <a:bodyPr>
+            <a:normAutofit fontScale="90000"/>
+          </a:bodyPr>
           <a:lstStyle/>
           <a:p>
-            <a:r>
-              <a:rPr lang="en-US" dirty="0"/>
-              <a:t>Insight 4</a:t>
+            <a:pPr algn="l"/>
+            <a:r>
+              <a:rPr lang="en-US" b="0" i="0" dirty="0">
+                <a:effectLst/>
+                <a:highlight>
+                  <a:srgbClr val="FFFFFF"/>
+                </a:highlight>
+                <a:latin typeface="Roboto" panose="02000000000000000000" pitchFamily="2" charset="0"/>
+              </a:rPr>
+              <a:t>Loan sub grade and Charged Off loans</a:t>
             </a:r>
             <a:endParaRPr lang="en-IN" dirty="0"/>
           </a:p>
@@ -4580,8 +4746,8 @@
         </p:nvSpPr>
         <p:spPr>
           <a:xfrm>
-            <a:off x="1097280" y="1278383"/>
-            <a:ext cx="10058400" cy="4439783"/>
+            <a:off x="1097280" y="1962197"/>
+            <a:ext cx="4575190" cy="4172789"/>
           </a:xfrm>
         </p:spPr>
         <p:txBody>
@@ -4594,7 +4760,7 @@
             </a:pPr>
             <a:r>
               <a:rPr lang="en-US" dirty="0"/>
-              <a:t>When the loan term is 60 months, 25% of the total loans  got charged off</a:t>
+              <a:t>In the F5 subgrade, almost 48% of the loans resulted in charged off loans. In these subgrades F5,G3,G2,F4,G5,G1 the charged off loans percentage is very high(more than 33%. At least One in every three loans got charged off)</a:t>
             </a:r>
           </a:p>
           <a:p>
@@ -4602,7 +4768,24 @@
               <a:buFont typeface="Wingdings" panose="05000000000000000000" pitchFamily="2" charset="2"/>
               <a:buChar char="v"/>
             </a:pPr>
-            <a:endParaRPr lang="en-US" dirty="0"/>
+            <a:r>
+              <a:rPr lang="en-US" b="1" dirty="0"/>
+              <a:t>Observation:</a:t>
+            </a:r>
+            <a:r>
+              <a:rPr lang="en-US" dirty="0"/>
+              <a:t> </a:t>
+            </a:r>
+          </a:p>
+          <a:p>
+            <a:pPr lvl="1">
+              <a:buFont typeface="Wingdings" panose="05000000000000000000" pitchFamily="2" charset="2"/>
+              <a:buChar char="v"/>
+            </a:pPr>
+            <a:r>
+              <a:rPr lang="en-US" dirty="0"/>
+              <a:t>The loans in subgrades of E,F,G have higher chances of default</a:t>
+            </a:r>
           </a:p>
           <a:p>
             <a:pPr>
@@ -4643,10 +4826,10 @@
       </p:sp>
       <p:pic>
         <p:nvPicPr>
-          <p:cNvPr id="20" name="Picture 19">
+          <p:cNvPr id="16" name="Picture 15">
             <a:extLst>
               <a:ext uri="{FF2B5EF4-FFF2-40B4-BE49-F238E27FC236}">
-                <a16:creationId xmlns:a16="http://schemas.microsoft.com/office/drawing/2014/main" id="{043339AA-8066-C89B-4936-3F86B84D934B}"/>
+                <a16:creationId xmlns:a16="http://schemas.microsoft.com/office/drawing/2014/main" id="{96A09246-925E-6E93-BD06-CF0A40CF0F60}"/>
               </a:ext>
             </a:extLst>
           </p:cNvPr>
@@ -4663,8 +4846,8 @@
         </p:blipFill>
         <p:spPr>
           <a:xfrm>
-            <a:off x="3171816" y="2057485"/>
-            <a:ext cx="5377379" cy="4161623"/>
+            <a:off x="5688969" y="1962199"/>
+            <a:ext cx="5510122" cy="4023932"/>
           </a:xfrm>
           <a:prstGeom prst="rect">
             <a:avLst/>
@@ -4674,7 +4857,7 @@
     </p:spTree>
     <p:extLst>
       <p:ext uri="{BB962C8B-B14F-4D97-AF65-F5344CB8AC3E}">
-        <p14:creationId xmlns:p14="http://schemas.microsoft.com/office/powerpoint/2010/main" val="3301793802"/>
+        <p14:creationId xmlns:p14="http://schemas.microsoft.com/office/powerpoint/2010/main" val="45402649"/>
       </p:ext>
     </p:extLst>
   </p:cSld>
@@ -4719,17 +4902,26 @@
         </p:nvSpPr>
         <p:spPr>
           <a:xfrm>
-            <a:off x="1097280" y="191472"/>
+            <a:off x="1097280" y="685886"/>
             <a:ext cx="10058400" cy="748452"/>
           </a:xfrm>
         </p:spPr>
         <p:txBody>
-          <a:bodyPr/>
+          <a:bodyPr>
+            <a:normAutofit fontScale="90000"/>
+          </a:bodyPr>
           <a:lstStyle/>
           <a:p>
-            <a:r>
-              <a:rPr lang="en-US" dirty="0"/>
-              <a:t>Insight 5</a:t>
+            <a:pPr algn="l"/>
+            <a:r>
+              <a:rPr lang="en-US" b="0" i="0" dirty="0">
+                <a:effectLst/>
+                <a:highlight>
+                  <a:srgbClr val="FFFFFF"/>
+                </a:highlight>
+                <a:latin typeface="Roboto" panose="02000000000000000000" pitchFamily="2" charset="0"/>
+              </a:rPr>
+              <a:t>Purpose of the loan and Charged Off loans</a:t>
             </a:r>
             <a:endParaRPr lang="en-IN" dirty="0"/>
           </a:p>
@@ -4753,8 +4945,8 @@
         </p:nvSpPr>
         <p:spPr>
           <a:xfrm>
-            <a:off x="1097280" y="912331"/>
-            <a:ext cx="10058400" cy="4805836"/>
+            <a:off x="1097280" y="2326928"/>
+            <a:ext cx="5175929" cy="3914306"/>
           </a:xfrm>
         </p:spPr>
         <p:txBody>
@@ -4767,8 +4959,42 @@
             </a:pPr>
             <a:r>
               <a:rPr lang="en-US" dirty="0"/>
-              <a:t>As the grade of loan moves from A to G, the percentage of charged off loans keeps increasing. While only 6% of the grade A loans ended up in charged off, in grade G over 33% of the loans are charged off</a:t>
-            </a:r>
+              <a:t>Lending for the purpose of small business turned out to be risky. More than 27% of the total loans resulted in charged off, this is way more than the average of 16%</a:t>
+            </a:r>
+          </a:p>
+          <a:p>
+            <a:pPr>
+              <a:buFont typeface="Wingdings" panose="05000000000000000000" pitchFamily="2" charset="2"/>
+              <a:buChar char="v"/>
+            </a:pPr>
+            <a:r>
+              <a:rPr lang="en-IN" b="1" dirty="0"/>
+              <a:t>Observation:</a:t>
+            </a:r>
+          </a:p>
+          <a:p>
+            <a:pPr lvl="1">
+              <a:buFont typeface="Wingdings" panose="05000000000000000000" pitchFamily="2" charset="2"/>
+              <a:buChar char="v"/>
+            </a:pPr>
+            <a:r>
+              <a:rPr lang="en-US" dirty="0"/>
+              <a:t>Lending to small businesses is risky when compared to loans for other purposes</a:t>
+            </a:r>
+          </a:p>
+          <a:p>
+            <a:pPr>
+              <a:buFont typeface="Wingdings" panose="05000000000000000000" pitchFamily="2" charset="2"/>
+              <a:buChar char="v"/>
+            </a:pPr>
+            <a:endParaRPr lang="en-US" dirty="0"/>
+          </a:p>
+          <a:p>
+            <a:pPr>
+              <a:buFont typeface="Wingdings" panose="05000000000000000000" pitchFamily="2" charset="2"/>
+              <a:buChar char="v"/>
+            </a:pPr>
+            <a:endParaRPr lang="en-US" dirty="0"/>
           </a:p>
           <a:p>
             <a:pPr>
@@ -4809,10 +5035,10 @@
       </p:sp>
       <p:pic>
         <p:nvPicPr>
-          <p:cNvPr id="18" name="Picture 17">
+          <p:cNvPr id="14" name="Picture 13">
             <a:extLst>
               <a:ext uri="{FF2B5EF4-FFF2-40B4-BE49-F238E27FC236}">
-                <a16:creationId xmlns:a16="http://schemas.microsoft.com/office/drawing/2014/main" id="{432B96F6-C84C-2F95-022D-31B4A65634E6}"/>
+                <a16:creationId xmlns:a16="http://schemas.microsoft.com/office/drawing/2014/main" id="{0426207A-4F76-43F7-35E9-A234BAE456A2}"/>
               </a:ext>
             </a:extLst>
           </p:cNvPr>
@@ -4829,18 +5055,642 @@
         </p:blipFill>
         <p:spPr>
           <a:xfrm>
-            <a:off x="3278997" y="2008335"/>
-            <a:ext cx="5470488" cy="4294811"/>
+            <a:off x="6370856" y="1954787"/>
+            <a:ext cx="4934321" cy="4213438"/>
           </a:xfrm>
           <a:prstGeom prst="rect">
             <a:avLst/>
           </a:prstGeom>
         </p:spPr>
       </p:pic>
+      <p:sp>
+        <p:nvSpPr>
+          <p:cNvPr id="17" name="Rectangle 13">
+            <a:extLst>
+              <a:ext uri="{FF2B5EF4-FFF2-40B4-BE49-F238E27FC236}">
+                <a16:creationId xmlns:a16="http://schemas.microsoft.com/office/drawing/2014/main" id="{94F512C1-79EC-8EB5-B36E-EEE08CB5EA4B}"/>
+              </a:ext>
+            </a:extLst>
+          </p:cNvPr>
+          <p:cNvSpPr>
+            <a:spLocks noChangeArrowheads="1"/>
+          </p:cNvSpPr>
+          <p:nvPr/>
+        </p:nvSpPr>
+        <p:spPr bwMode="auto">
+          <a:xfrm>
+            <a:off x="220663" y="-832443"/>
+            <a:ext cx="1516062" cy="0"/>
+          </a:xfrm>
+          <a:prstGeom prst="rect">
+            <a:avLst/>
+          </a:prstGeom>
+          <a:noFill/>
+          <a:ln>
+            <a:noFill/>
+          </a:ln>
+          <a:effectLst/>
+          <a:extLst>
+            <a:ext uri="{909E8E84-426E-40DD-AFC4-6F175D3DCCD1}">
+              <a14:hiddenFill xmlns:a14="http://schemas.microsoft.com/office/drawing/2010/main">
+                <a:solidFill>
+                  <a:schemeClr val="accent1"/>
+                </a:solidFill>
+              </a14:hiddenFill>
+            </a:ext>
+            <a:ext uri="{91240B29-F687-4F45-9708-019B960494DF}">
+              <a14:hiddenLine xmlns:a14="http://schemas.microsoft.com/office/drawing/2010/main" w="9525">
+                <a:solidFill>
+                  <a:schemeClr val="tx1"/>
+                </a:solidFill>
+                <a:miter lim="800000"/>
+                <a:headEnd/>
+                <a:tailEnd/>
+              </a14:hiddenLine>
+            </a:ext>
+            <a:ext uri="{AF507438-7753-43E0-B8FC-AC1667EBCBE1}">
+              <a14:hiddenEffects xmlns:a14="http://schemas.microsoft.com/office/drawing/2010/main">
+                <a:effectLst>
+                  <a:outerShdw dist="35921" dir="2700000" algn="ctr" rotWithShape="0">
+                    <a:schemeClr val="bg2"/>
+                  </a:outerShdw>
+                </a:effectLst>
+              </a14:hiddenEffects>
+            </a:ext>
+          </a:extLst>
+        </p:spPr>
+        <p:txBody>
+          <a:bodyPr vert="horz" wrap="none" lIns="91440" tIns="45720" rIns="91440" bIns="45720" numCol="1" anchor="ctr" anchorCtr="0" compatLnSpc="1">
+            <a:prstTxWarp prst="textNoShape">
+              <a:avLst/>
+            </a:prstTxWarp>
+            <a:spAutoFit/>
+          </a:bodyPr>
+          <a:lstStyle/>
+          <a:p>
+            <a:pPr marL="0" marR="0" lvl="0" indent="0" algn="l" defTabSz="914400" rtl="0" eaLnBrk="0" fontAlgn="base" latinLnBrk="0" hangingPunct="0">
+              <a:lnSpc>
+                <a:spcPct val="100000"/>
+              </a:lnSpc>
+              <a:spcBef>
+                <a:spcPct val="0"/>
+              </a:spcBef>
+              <a:spcAft>
+                <a:spcPct val="0"/>
+              </a:spcAft>
+              <a:buClrTx/>
+              <a:buSzTx/>
+              <a:buFontTx/>
+              <a:buNone/>
+              <a:tabLst/>
+            </a:pPr>
+            <a:r>
+              <a:rPr kumimoji="0" lang="en-US" altLang="en-US" sz="1800" b="0" i="0" u="none" strike="noStrike" cap="none" normalizeH="0" baseline="0">
+                <a:ln>
+                  <a:noFill/>
+                </a:ln>
+                <a:solidFill>
+                  <a:schemeClr val="tx1"/>
+                </a:solidFill>
+                <a:effectLst/>
+                <a:latin typeface="Arial" panose="020B0604020202020204" pitchFamily="34" charset="0"/>
+              </a:rPr>
+              <a:t>Observation: Lending to small businesses is risky when compared to loans for other purposes</a:t>
+            </a:r>
+          </a:p>
+          <a:p>
+            <a:pPr marL="0" marR="0" lvl="0" indent="0" algn="l" defTabSz="914400" rtl="0" eaLnBrk="0" fontAlgn="base" latinLnBrk="0" hangingPunct="0">
+              <a:lnSpc>
+                <a:spcPct val="100000"/>
+              </a:lnSpc>
+              <a:spcBef>
+                <a:spcPct val="0"/>
+              </a:spcBef>
+              <a:spcAft>
+                <a:spcPct val="0"/>
+              </a:spcAft>
+              <a:buClrTx/>
+              <a:buSzTx/>
+              <a:buFontTx/>
+              <a:buNone/>
+              <a:tabLst/>
+            </a:pPr>
+            <a:endParaRPr kumimoji="0" lang="en-US" altLang="en-US" sz="1800" b="0" i="0" u="none" strike="noStrike" cap="none" normalizeH="0" baseline="0">
+              <a:ln>
+                <a:noFill/>
+              </a:ln>
+              <a:solidFill>
+                <a:schemeClr val="tx1"/>
+              </a:solidFill>
+              <a:effectLst/>
+              <a:latin typeface="Arial" panose="020B0604020202020204" pitchFamily="34" charset="0"/>
+            </a:endParaRPr>
+          </a:p>
+        </p:txBody>
+      </p:sp>
+      <p:sp>
+        <p:nvSpPr>
+          <p:cNvPr id="18" name="Rectangle 14">
+            <a:extLst>
+              <a:ext uri="{FF2B5EF4-FFF2-40B4-BE49-F238E27FC236}">
+                <a16:creationId xmlns:a16="http://schemas.microsoft.com/office/drawing/2014/main" id="{7A9AB365-58E6-F923-2B9C-F6215CD037B1}"/>
+              </a:ext>
+            </a:extLst>
+          </p:cNvPr>
+          <p:cNvSpPr>
+            <a:spLocks noChangeArrowheads="1"/>
+          </p:cNvSpPr>
+          <p:nvPr/>
+        </p:nvSpPr>
+        <p:spPr bwMode="auto">
+          <a:xfrm>
+            <a:off x="220663" y="-832443"/>
+            <a:ext cx="4762" cy="0"/>
+          </a:xfrm>
+          <a:prstGeom prst="rect">
+            <a:avLst/>
+          </a:prstGeom>
+          <a:noFill/>
+          <a:ln>
+            <a:noFill/>
+          </a:ln>
+          <a:effectLst/>
+          <a:extLst>
+            <a:ext uri="{909E8E84-426E-40DD-AFC4-6F175D3DCCD1}">
+              <a14:hiddenFill xmlns:a14="http://schemas.microsoft.com/office/drawing/2010/main">
+                <a:solidFill>
+                  <a:schemeClr val="accent1"/>
+                </a:solidFill>
+              </a14:hiddenFill>
+            </a:ext>
+            <a:ext uri="{91240B29-F687-4F45-9708-019B960494DF}">
+              <a14:hiddenLine xmlns:a14="http://schemas.microsoft.com/office/drawing/2010/main" w="9525">
+                <a:solidFill>
+                  <a:schemeClr val="tx1"/>
+                </a:solidFill>
+                <a:miter lim="800000"/>
+                <a:headEnd/>
+                <a:tailEnd/>
+              </a14:hiddenLine>
+            </a:ext>
+            <a:ext uri="{AF507438-7753-43E0-B8FC-AC1667EBCBE1}">
+              <a14:hiddenEffects xmlns:a14="http://schemas.microsoft.com/office/drawing/2010/main">
+                <a:effectLst>
+                  <a:outerShdw dist="35921" dir="2700000" algn="ctr" rotWithShape="0">
+                    <a:schemeClr val="bg2"/>
+                  </a:outerShdw>
+                </a:effectLst>
+              </a14:hiddenEffects>
+            </a:ext>
+          </a:extLst>
+        </p:spPr>
+        <p:txBody>
+          <a:bodyPr vert="horz" wrap="none" lIns="91440" tIns="45720" rIns="91440" bIns="45720" numCol="1" anchor="ctr" anchorCtr="0" compatLnSpc="1">
+            <a:prstTxWarp prst="textNoShape">
+              <a:avLst/>
+            </a:prstTxWarp>
+            <a:spAutoFit/>
+          </a:bodyPr>
+          <a:lstStyle/>
+          <a:p>
+            <a:pPr marL="0" marR="0" lvl="0" indent="0" algn="l" defTabSz="914400" rtl="0" eaLnBrk="0" fontAlgn="base" latinLnBrk="0" hangingPunct="0">
+              <a:lnSpc>
+                <a:spcPct val="100000"/>
+              </a:lnSpc>
+              <a:spcBef>
+                <a:spcPct val="0"/>
+              </a:spcBef>
+              <a:spcAft>
+                <a:spcPct val="0"/>
+              </a:spcAft>
+              <a:buClrTx/>
+              <a:buSzTx/>
+              <a:buFontTx/>
+              <a:buNone/>
+              <a:tabLst/>
+            </a:pPr>
+            <a:r>
+              <a:rPr kumimoji="0" lang="en-US" altLang="en-US" sz="1800" b="0" i="0" u="none" strike="noStrike" cap="none" normalizeH="0" baseline="0">
+                <a:ln>
+                  <a:noFill/>
+                </a:ln>
+                <a:solidFill>
+                  <a:schemeClr val="tx1"/>
+                </a:solidFill>
+                <a:effectLst/>
+                <a:latin typeface="Arial" panose="020B0604020202020204" pitchFamily="34" charset="0"/>
+              </a:rPr>
+              <a:t>Send message</a:t>
+            </a:r>
+          </a:p>
+          <a:p>
+            <a:pPr marL="0" marR="0" lvl="0" indent="0" algn="l" defTabSz="914400" rtl="0" eaLnBrk="0" fontAlgn="base" latinLnBrk="0" hangingPunct="0">
+              <a:lnSpc>
+                <a:spcPct val="100000"/>
+              </a:lnSpc>
+              <a:spcBef>
+                <a:spcPct val="0"/>
+              </a:spcBef>
+              <a:spcAft>
+                <a:spcPct val="0"/>
+              </a:spcAft>
+              <a:buClrTx/>
+              <a:buSzTx/>
+              <a:buFontTx/>
+              <a:buNone/>
+              <a:tabLst/>
+            </a:pPr>
+            <a:r>
+              <a:rPr kumimoji="0" lang="en-US" altLang="en-US" sz="1800" b="0" i="0" u="none" strike="noStrike" cap="none" normalizeH="0" baseline="0">
+                <a:ln>
+                  <a:noFill/>
+                </a:ln>
+                <a:solidFill>
+                  <a:schemeClr val="tx1"/>
+                </a:solidFill>
+                <a:effectLst/>
+                <a:latin typeface="Arial" panose="020B0604020202020204" pitchFamily="34" charset="0"/>
+              </a:rPr>
+              <a:t>Checking who can access file</a:t>
+            </a:r>
+          </a:p>
+          <a:p>
+            <a:pPr marL="0" marR="0" lvl="0" indent="0" algn="l" defTabSz="914400" rtl="0" eaLnBrk="0" fontAlgn="base" latinLnBrk="0" hangingPunct="0">
+              <a:lnSpc>
+                <a:spcPct val="100000"/>
+              </a:lnSpc>
+              <a:spcBef>
+                <a:spcPct val="0"/>
+              </a:spcBef>
+              <a:spcAft>
+                <a:spcPct val="0"/>
+              </a:spcAft>
+              <a:buClrTx/>
+              <a:buSzTx/>
+              <a:buFontTx/>
+              <a:buNone/>
+              <a:tabLst/>
+            </a:pPr>
+            <a:endParaRPr kumimoji="0" lang="en-US" altLang="en-US" sz="1800" b="0" i="0" u="none" strike="noStrike" cap="none" normalizeH="0" baseline="0">
+              <a:ln>
+                <a:noFill/>
+              </a:ln>
+              <a:solidFill>
+                <a:schemeClr val="tx1"/>
+              </a:solidFill>
+              <a:effectLst/>
+              <a:latin typeface="Arial" panose="020B0604020202020204" pitchFamily="34" charset="0"/>
+            </a:endParaRPr>
+          </a:p>
+        </p:txBody>
+      </p:sp>
+      <p:sp>
+        <p:nvSpPr>
+          <p:cNvPr id="19" name="Rectangle 15">
+            <a:extLst>
+              <a:ext uri="{FF2B5EF4-FFF2-40B4-BE49-F238E27FC236}">
+                <a16:creationId xmlns:a16="http://schemas.microsoft.com/office/drawing/2014/main" id="{CB321EC1-485A-889D-4424-4CAB1BAC4B4F}"/>
+              </a:ext>
+            </a:extLst>
+          </p:cNvPr>
+          <p:cNvSpPr>
+            <a:spLocks noChangeArrowheads="1"/>
+          </p:cNvSpPr>
+          <p:nvPr/>
+        </p:nvSpPr>
+        <p:spPr bwMode="auto">
+          <a:xfrm>
+            <a:off x="220663" y="-832443"/>
+            <a:ext cx="1389062" cy="0"/>
+          </a:xfrm>
+          <a:prstGeom prst="rect">
+            <a:avLst/>
+          </a:prstGeom>
+          <a:noFill/>
+          <a:ln>
+            <a:noFill/>
+          </a:ln>
+          <a:effectLst/>
+          <a:extLst>
+            <a:ext uri="{909E8E84-426E-40DD-AFC4-6F175D3DCCD1}">
+              <a14:hiddenFill xmlns:a14="http://schemas.microsoft.com/office/drawing/2010/main">
+                <a:solidFill>
+                  <a:schemeClr val="accent1"/>
+                </a:solidFill>
+              </a14:hiddenFill>
+            </a:ext>
+            <a:ext uri="{91240B29-F687-4F45-9708-019B960494DF}">
+              <a14:hiddenLine xmlns:a14="http://schemas.microsoft.com/office/drawing/2010/main" w="9525">
+                <a:solidFill>
+                  <a:schemeClr val="tx1"/>
+                </a:solidFill>
+                <a:miter lim="800000"/>
+                <a:headEnd/>
+                <a:tailEnd/>
+              </a14:hiddenLine>
+            </a:ext>
+            <a:ext uri="{AF507438-7753-43E0-B8FC-AC1667EBCBE1}">
+              <a14:hiddenEffects xmlns:a14="http://schemas.microsoft.com/office/drawing/2010/main">
+                <a:effectLst>
+                  <a:outerShdw dist="35921" dir="2700000" algn="ctr" rotWithShape="0">
+                    <a:schemeClr val="bg2"/>
+                  </a:outerShdw>
+                </a:effectLst>
+              </a14:hiddenEffects>
+            </a:ext>
+          </a:extLst>
+        </p:spPr>
+        <p:txBody>
+          <a:bodyPr vert="horz" wrap="none" lIns="0" tIns="45720" rIns="0" bIns="45720" numCol="1" anchor="ctr" anchorCtr="0" compatLnSpc="1">
+            <a:prstTxWarp prst="textNoShape">
+              <a:avLst/>
+            </a:prstTxWarp>
+            <a:spAutoFit/>
+          </a:bodyPr>
+          <a:lstStyle/>
+          <a:p>
+            <a:endParaRPr lang="en-IN"/>
+          </a:p>
+        </p:txBody>
+      </p:sp>
+      <p:sp>
+        <p:nvSpPr>
+          <p:cNvPr id="20" name="Rectangle 16">
+            <a:extLst>
+              <a:ext uri="{FF2B5EF4-FFF2-40B4-BE49-F238E27FC236}">
+                <a16:creationId xmlns:a16="http://schemas.microsoft.com/office/drawing/2014/main" id="{1E1EDBC1-CE76-F29C-CDEC-4605C29F6E19}"/>
+              </a:ext>
+            </a:extLst>
+          </p:cNvPr>
+          <p:cNvSpPr>
+            <a:spLocks noChangeArrowheads="1"/>
+          </p:cNvSpPr>
+          <p:nvPr/>
+        </p:nvSpPr>
+        <p:spPr bwMode="auto">
+          <a:xfrm>
+            <a:off x="220663" y="-832443"/>
+            <a:ext cx="1389062" cy="0"/>
+          </a:xfrm>
+          <a:prstGeom prst="rect">
+            <a:avLst/>
+          </a:prstGeom>
+          <a:noFill/>
+          <a:ln>
+            <a:noFill/>
+          </a:ln>
+          <a:effectLst/>
+          <a:extLst>
+            <a:ext uri="{909E8E84-426E-40DD-AFC4-6F175D3DCCD1}">
+              <a14:hiddenFill xmlns:a14="http://schemas.microsoft.com/office/drawing/2010/main">
+                <a:solidFill>
+                  <a:schemeClr val="accent1"/>
+                </a:solidFill>
+              </a14:hiddenFill>
+            </a:ext>
+            <a:ext uri="{91240B29-F687-4F45-9708-019B960494DF}">
+              <a14:hiddenLine xmlns:a14="http://schemas.microsoft.com/office/drawing/2010/main" w="9525">
+                <a:solidFill>
+                  <a:schemeClr val="tx1"/>
+                </a:solidFill>
+                <a:miter lim="800000"/>
+                <a:headEnd/>
+                <a:tailEnd/>
+              </a14:hiddenLine>
+            </a:ext>
+            <a:ext uri="{AF507438-7753-43E0-B8FC-AC1667EBCBE1}">
+              <a14:hiddenEffects xmlns:a14="http://schemas.microsoft.com/office/drawing/2010/main">
+                <a:effectLst>
+                  <a:outerShdw dist="35921" dir="2700000" algn="ctr" rotWithShape="0">
+                    <a:schemeClr val="bg2"/>
+                  </a:outerShdw>
+                </a:effectLst>
+              </a14:hiddenEffects>
+            </a:ext>
+          </a:extLst>
+        </p:spPr>
+        <p:txBody>
+          <a:bodyPr vert="horz" wrap="none" lIns="0" tIns="45720" rIns="0" bIns="45720" numCol="1" anchor="ctr" anchorCtr="0" compatLnSpc="1">
+            <a:prstTxWarp prst="textNoShape">
+              <a:avLst/>
+            </a:prstTxWarp>
+            <a:spAutoFit/>
+          </a:bodyPr>
+          <a:lstStyle>
+            <a:lvl1pPr eaLnBrk="0" fontAlgn="base" hangingPunct="0">
+              <a:spcBef>
+                <a:spcPct val="0"/>
+              </a:spcBef>
+              <a:spcAft>
+                <a:spcPct val="0"/>
+              </a:spcAft>
+              <a:defRPr>
+                <a:solidFill>
+                  <a:schemeClr val="tx1"/>
+                </a:solidFill>
+                <a:latin typeface="Arial" panose="020B0604020202020204" pitchFamily="34" charset="0"/>
+              </a:defRPr>
+            </a:lvl1pPr>
+            <a:lvl2pPr eaLnBrk="0" fontAlgn="base" hangingPunct="0">
+              <a:spcBef>
+                <a:spcPct val="0"/>
+              </a:spcBef>
+              <a:spcAft>
+                <a:spcPct val="0"/>
+              </a:spcAft>
+              <a:defRPr>
+                <a:solidFill>
+                  <a:schemeClr val="tx1"/>
+                </a:solidFill>
+                <a:latin typeface="Arial" panose="020B0604020202020204" pitchFamily="34" charset="0"/>
+              </a:defRPr>
+            </a:lvl2pPr>
+            <a:lvl3pPr eaLnBrk="0" fontAlgn="base" hangingPunct="0">
+              <a:spcBef>
+                <a:spcPct val="0"/>
+              </a:spcBef>
+              <a:spcAft>
+                <a:spcPct val="0"/>
+              </a:spcAft>
+              <a:defRPr>
+                <a:solidFill>
+                  <a:schemeClr val="tx1"/>
+                </a:solidFill>
+                <a:latin typeface="Arial" panose="020B0604020202020204" pitchFamily="34" charset="0"/>
+              </a:defRPr>
+            </a:lvl3pPr>
+            <a:lvl4pPr eaLnBrk="0" fontAlgn="base" hangingPunct="0">
+              <a:spcBef>
+                <a:spcPct val="0"/>
+              </a:spcBef>
+              <a:spcAft>
+                <a:spcPct val="0"/>
+              </a:spcAft>
+              <a:defRPr>
+                <a:solidFill>
+                  <a:schemeClr val="tx1"/>
+                </a:solidFill>
+                <a:latin typeface="Arial" panose="020B0604020202020204" pitchFamily="34" charset="0"/>
+              </a:defRPr>
+            </a:lvl4pPr>
+            <a:lvl5pPr eaLnBrk="0" fontAlgn="base" hangingPunct="0">
+              <a:spcBef>
+                <a:spcPct val="0"/>
+              </a:spcBef>
+              <a:spcAft>
+                <a:spcPct val="0"/>
+              </a:spcAft>
+              <a:defRPr>
+                <a:solidFill>
+                  <a:schemeClr val="tx1"/>
+                </a:solidFill>
+                <a:latin typeface="Arial" panose="020B0604020202020204" pitchFamily="34" charset="0"/>
+              </a:defRPr>
+            </a:lvl5pPr>
+            <a:lvl6pPr eaLnBrk="0" fontAlgn="base" hangingPunct="0">
+              <a:spcBef>
+                <a:spcPct val="0"/>
+              </a:spcBef>
+              <a:spcAft>
+                <a:spcPct val="0"/>
+              </a:spcAft>
+              <a:defRPr>
+                <a:solidFill>
+                  <a:schemeClr val="tx1"/>
+                </a:solidFill>
+                <a:latin typeface="Arial" panose="020B0604020202020204" pitchFamily="34" charset="0"/>
+              </a:defRPr>
+            </a:lvl6pPr>
+            <a:lvl7pPr eaLnBrk="0" fontAlgn="base" hangingPunct="0">
+              <a:spcBef>
+                <a:spcPct val="0"/>
+              </a:spcBef>
+              <a:spcAft>
+                <a:spcPct val="0"/>
+              </a:spcAft>
+              <a:defRPr>
+                <a:solidFill>
+                  <a:schemeClr val="tx1"/>
+                </a:solidFill>
+                <a:latin typeface="Arial" panose="020B0604020202020204" pitchFamily="34" charset="0"/>
+              </a:defRPr>
+            </a:lvl7pPr>
+            <a:lvl8pPr eaLnBrk="0" fontAlgn="base" hangingPunct="0">
+              <a:spcBef>
+                <a:spcPct val="0"/>
+              </a:spcBef>
+              <a:spcAft>
+                <a:spcPct val="0"/>
+              </a:spcAft>
+              <a:defRPr>
+                <a:solidFill>
+                  <a:schemeClr val="tx1"/>
+                </a:solidFill>
+                <a:latin typeface="Arial" panose="020B0604020202020204" pitchFamily="34" charset="0"/>
+              </a:defRPr>
+            </a:lvl8pPr>
+            <a:lvl9pPr eaLnBrk="0" fontAlgn="base" hangingPunct="0">
+              <a:spcBef>
+                <a:spcPct val="0"/>
+              </a:spcBef>
+              <a:spcAft>
+                <a:spcPct val="0"/>
+              </a:spcAft>
+              <a:defRPr>
+                <a:solidFill>
+                  <a:schemeClr val="tx1"/>
+                </a:solidFill>
+                <a:latin typeface="Arial" panose="020B0604020202020204" pitchFamily="34" charset="0"/>
+              </a:defRPr>
+            </a:lvl9pPr>
+          </a:lstStyle>
+          <a:p>
+            <a:pPr marL="0" marR="0" lvl="0" indent="0" algn="ctr" defTabSz="914400" rtl="0" eaLnBrk="0" fontAlgn="base" latinLnBrk="0" hangingPunct="0">
+              <a:lnSpc>
+                <a:spcPct val="100000"/>
+              </a:lnSpc>
+              <a:spcBef>
+                <a:spcPct val="0"/>
+              </a:spcBef>
+              <a:spcAft>
+                <a:spcPct val="0"/>
+              </a:spcAft>
+              <a:buClrTx/>
+              <a:buSzTx/>
+              <a:buFontTx/>
+              <a:buNone/>
+              <a:tabLst/>
+            </a:pPr>
+            <a:r>
+              <a:rPr kumimoji="0" lang="en-US" altLang="en-US" sz="900" b="0" i="0" u="none" strike="noStrike" cap="none" normalizeH="0" baseline="0">
+                <a:ln>
+                  <a:noFill/>
+                </a:ln>
+                <a:solidFill>
+                  <a:srgbClr val="FFFFFF"/>
+                </a:solidFill>
+                <a:effectLst/>
+                <a:latin typeface="Google Sans"/>
+              </a:rPr>
+              <a:t>10:00PM</a:t>
+            </a:r>
+            <a:endParaRPr kumimoji="0" lang="en-US" altLang="en-US" sz="900" b="0" i="0" u="none" strike="noStrike" cap="none" normalizeH="0" baseline="0">
+              <a:ln>
+                <a:noFill/>
+              </a:ln>
+              <a:solidFill>
+                <a:srgbClr val="FFFFFF"/>
+              </a:solidFill>
+              <a:effectLst/>
+              <a:latin typeface="Roboto" panose="02000000000000000000" pitchFamily="2" charset="0"/>
+            </a:endParaRPr>
+          </a:p>
+          <a:p>
+            <a:pPr marL="0" marR="0" lvl="0" indent="0" algn="ctr" defTabSz="914400" rtl="0" eaLnBrk="0" fontAlgn="base" latinLnBrk="0" hangingPunct="0">
+              <a:lnSpc>
+                <a:spcPct val="100000"/>
+              </a:lnSpc>
+              <a:spcBef>
+                <a:spcPct val="0"/>
+              </a:spcBef>
+              <a:spcAft>
+                <a:spcPct val="0"/>
+              </a:spcAft>
+              <a:buClrTx/>
+              <a:buSzTx/>
+              <a:buFontTx/>
+              <a:buNone/>
+              <a:tabLst/>
+            </a:pPr>
+            <a:br>
+              <a:rPr kumimoji="0" lang="en-US" altLang="en-US" sz="900" b="0" i="0" u="none" strike="noStrike" cap="none" normalizeH="0" baseline="0">
+                <a:ln>
+                  <a:noFill/>
+                </a:ln>
+                <a:solidFill>
+                  <a:srgbClr val="FFFFFF"/>
+                </a:solidFill>
+                <a:effectLst/>
+                <a:latin typeface="Roboto" panose="02000000000000000000" pitchFamily="2" charset="0"/>
+              </a:rPr>
+            </a:br>
+            <a:endParaRPr kumimoji="0" lang="en-US" altLang="en-US" sz="1800" b="0" i="0" u="none" strike="noStrike" cap="none" normalizeH="0" baseline="0">
+              <a:ln>
+                <a:noFill/>
+              </a:ln>
+              <a:solidFill>
+                <a:schemeClr val="tx1"/>
+              </a:solidFill>
+              <a:effectLst/>
+              <a:latin typeface="Arial" panose="020B0604020202020204" pitchFamily="34" charset="0"/>
+            </a:endParaRPr>
+          </a:p>
+        </p:txBody>
+      </p:sp>
     </p:spTree>
     <p:extLst>
       <p:ext uri="{BB962C8B-B14F-4D97-AF65-F5344CB8AC3E}">
-        <p14:creationId xmlns:p14="http://schemas.microsoft.com/office/powerpoint/2010/main" val="2748959871"/>
+        <p14:creationId xmlns:p14="http://schemas.microsoft.com/office/powerpoint/2010/main" val="2431763611"/>
       </p:ext>
     </p:extLst>
   </p:cSld>
@@ -4885,17 +5735,28 @@
         </p:nvSpPr>
         <p:spPr>
           <a:xfrm>
-            <a:off x="1097280" y="191472"/>
+            <a:off x="1097280" y="664621"/>
             <a:ext cx="10058400" cy="748452"/>
           </a:xfrm>
         </p:spPr>
         <p:txBody>
-          <a:bodyPr/>
+          <a:bodyPr>
+            <a:normAutofit/>
+          </a:bodyPr>
           <a:lstStyle/>
           <a:p>
             <a:r>
-              <a:rPr lang="en-US" dirty="0"/>
-              <a:t>Insight 6</a:t>
+              <a:rPr lang="en-IN" b="0" i="0" dirty="0">
+                <a:solidFill>
+                  <a:srgbClr val="202124"/>
+                </a:solidFill>
+                <a:effectLst/>
+                <a:highlight>
+                  <a:srgbClr val="FFFFFF"/>
+                </a:highlight>
+                <a:latin typeface="Roboto" panose="02000000000000000000" pitchFamily="2" charset="0"/>
+              </a:rPr>
+              <a:t>Charged Off loans across states </a:t>
             </a:r>
             <a:endParaRPr lang="en-IN" dirty="0"/>
           </a:p>
@@ -4919,12 +5780,14 @@
         </p:nvSpPr>
         <p:spPr>
           <a:xfrm>
-            <a:off x="1097280" y="912331"/>
-            <a:ext cx="10058400" cy="4805836"/>
+            <a:off x="1097280" y="2004237"/>
+            <a:ext cx="4997503" cy="3864856"/>
           </a:xfrm>
         </p:spPr>
         <p:txBody>
-          <a:bodyPr/>
+          <a:bodyPr>
+            <a:normAutofit/>
+          </a:bodyPr>
           <a:lstStyle/>
           <a:p>
             <a:pPr>
@@ -4933,7 +5796,7 @@
             </a:pPr>
             <a:r>
               <a:rPr lang="en-US" dirty="0"/>
-              <a:t>In the F5 subgrade, almost 48% of the loans resulted in charged off loans. In these subgrades F5,G3,G2,F4,G5,G1 the charged off loans percentage is very high(more than 33%. At least One in every three loans got charged off)</a:t>
+              <a:t>In the state of DC, the percentage of charged off loans is only 7% when compared to national average of 15% </a:t>
             </a:r>
           </a:p>
           <a:p>
@@ -4941,6 +5804,61 @@
               <a:buFont typeface="Wingdings" panose="05000000000000000000" pitchFamily="2" charset="2"/>
               <a:buChar char="v"/>
             </a:pPr>
+            <a:r>
+              <a:rPr lang="en-US" dirty="0"/>
+              <a:t>In the state of NV, it is 22.5%,this is higher than the national average of 15%. </a:t>
+            </a:r>
+          </a:p>
+          <a:p>
+            <a:pPr>
+              <a:buFont typeface="Wingdings" panose="05000000000000000000" pitchFamily="2" charset="2"/>
+              <a:buChar char="v"/>
+            </a:pPr>
+            <a:r>
+              <a:rPr lang="en-US" dirty="0"/>
+              <a:t>In the state of NE, it is 60% way higher than the national average. </a:t>
+            </a:r>
+          </a:p>
+          <a:p>
+            <a:pPr>
+              <a:buFont typeface="Wingdings" panose="05000000000000000000" pitchFamily="2" charset="2"/>
+              <a:buChar char="v"/>
+            </a:pPr>
+            <a:r>
+              <a:rPr lang="en-US" b="1" dirty="0"/>
+              <a:t>Observation: </a:t>
+            </a:r>
+          </a:p>
+          <a:p>
+            <a:pPr lvl="1">
+              <a:buFont typeface="Wingdings" panose="05000000000000000000" pitchFamily="2" charset="2"/>
+              <a:buChar char="v"/>
+            </a:pPr>
+            <a:r>
+              <a:rPr lang="en-US" dirty="0"/>
+              <a:t>For the loans in the states of NE and </a:t>
+            </a:r>
+            <a:r>
+              <a:rPr lang="en-US" dirty="0" err="1"/>
+              <a:t>NV,the</a:t>
+            </a:r>
+            <a:r>
+              <a:rPr lang="en-US" dirty="0"/>
+              <a:t> chances of loan getting charged off is higher</a:t>
+            </a:r>
+            <a:r>
+              <a:rPr lang="en-US" b="0" i="0" dirty="0">
+                <a:solidFill>
+                  <a:srgbClr val="202124"/>
+                </a:solidFill>
+                <a:effectLst/>
+                <a:highlight>
+                  <a:srgbClr val="FFFFFF"/>
+                </a:highlight>
+                <a:latin typeface="Roboto" panose="02000000000000000000" pitchFamily="2" charset="0"/>
+              </a:rPr>
+              <a:t>.</a:t>
+            </a:r>
             <a:endParaRPr lang="en-US" dirty="0"/>
           </a:p>
           <a:p>
@@ -4975,10 +5893,10 @@
       </p:sp>
       <p:pic>
         <p:nvPicPr>
-          <p:cNvPr id="16" name="Picture 15">
+          <p:cNvPr id="5" name="Picture 4">
             <a:extLst>
               <a:ext uri="{FF2B5EF4-FFF2-40B4-BE49-F238E27FC236}">
-                <a16:creationId xmlns:a16="http://schemas.microsoft.com/office/drawing/2014/main" id="{96A09246-925E-6E93-BD06-CF0A40CF0F60}"/>
+                <a16:creationId xmlns:a16="http://schemas.microsoft.com/office/drawing/2014/main" id="{B6FBC7A8-19A5-F712-887A-BDFE73B5D61C}"/>
               </a:ext>
             </a:extLst>
           </p:cNvPr>
@@ -4995,8 +5913,8 @@
         </p:blipFill>
         <p:spPr>
           <a:xfrm>
-            <a:off x="3656152" y="1962198"/>
-            <a:ext cx="6017163" cy="4394214"/>
+            <a:off x="6220463" y="2051773"/>
+            <a:ext cx="4997503" cy="3700441"/>
           </a:xfrm>
           <a:prstGeom prst="rect">
             <a:avLst/>
@@ -5006,7 +5924,7 @@
     </p:spTree>
     <p:extLst>
       <p:ext uri="{BB962C8B-B14F-4D97-AF65-F5344CB8AC3E}">
-        <p14:creationId xmlns:p14="http://schemas.microsoft.com/office/powerpoint/2010/main" val="45402649"/>
+        <p14:creationId xmlns:p14="http://schemas.microsoft.com/office/powerpoint/2010/main" val="3394608202"/>
       </p:ext>
     </p:extLst>
   </p:cSld>
@@ -5051,17 +5969,28 @@
         </p:nvSpPr>
         <p:spPr>
           <a:xfrm>
-            <a:off x="1097280" y="191472"/>
+            <a:off x="1097280" y="840054"/>
             <a:ext cx="10058400" cy="748452"/>
           </a:xfrm>
         </p:spPr>
         <p:txBody>
-          <a:bodyPr/>
+          <a:bodyPr>
+            <a:normAutofit fontScale="90000"/>
+          </a:bodyPr>
           <a:lstStyle/>
           <a:p>
             <a:r>
-              <a:rPr lang="en-US" dirty="0"/>
-              <a:t>Insight 7</a:t>
+              <a:rPr lang="en-US" b="0" i="0" dirty="0">
+                <a:solidFill>
+                  <a:srgbClr val="202124"/>
+                </a:solidFill>
+                <a:effectLst/>
+                <a:highlight>
+                  <a:srgbClr val="FFFFFF"/>
+                </a:highlight>
+                <a:latin typeface="Roboto" panose="02000000000000000000" pitchFamily="2" charset="0"/>
+              </a:rPr>
+              <a:t>Charged Off loans when there are derogatory public records</a:t>
             </a:r>
             <a:endParaRPr lang="en-IN" dirty="0"/>
           </a:p>
@@ -5085,8 +6014,8 @@
         </p:nvSpPr>
         <p:spPr>
           <a:xfrm>
-            <a:off x="1097280" y="1063257"/>
-            <a:ext cx="10058400" cy="4805836"/>
+            <a:off x="1097280" y="1972339"/>
+            <a:ext cx="4436967" cy="3896753"/>
           </a:xfrm>
         </p:spPr>
         <p:txBody>
@@ -5099,29 +6028,8 @@
             </a:pPr>
             <a:r>
               <a:rPr lang="en-US" dirty="0"/>
-              <a:t>Lending for the purpose of small business turned out to be risky. More than 27% of the total loans resulted in charged off, this is way more than the average of 16%</a:t>
-            </a:r>
-          </a:p>
-          <a:p>
-            <a:pPr>
-              <a:buFont typeface="Wingdings" panose="05000000000000000000" pitchFamily="2" charset="2"/>
-              <a:buChar char="v"/>
-            </a:pPr>
-            <a:endParaRPr lang="en-US" dirty="0"/>
-          </a:p>
-          <a:p>
-            <a:pPr>
-              <a:buFont typeface="Wingdings" panose="05000000000000000000" pitchFamily="2" charset="2"/>
-              <a:buChar char="v"/>
-            </a:pPr>
-            <a:endParaRPr lang="en-US" dirty="0"/>
-          </a:p>
-          <a:p>
-            <a:pPr>
-              <a:buFont typeface="Wingdings" panose="05000000000000000000" pitchFamily="2" charset="2"/>
-              <a:buChar char="v"/>
-            </a:pPr>
-            <a:endParaRPr lang="en-US" dirty="0"/>
+              <a:t>When there are derogatory public records against a loan applicant, there is a higher chance of loan getting defaulted</a:t>
+            </a:r>
           </a:p>
           <a:p>
             <a:pPr lvl="1">
@@ -5134,10 +6042,10 @@
       </p:sp>
       <p:pic>
         <p:nvPicPr>
-          <p:cNvPr id="14" name="Picture 13">
+          <p:cNvPr id="7" name="Picture 6">
             <a:extLst>
               <a:ext uri="{FF2B5EF4-FFF2-40B4-BE49-F238E27FC236}">
-                <a16:creationId xmlns:a16="http://schemas.microsoft.com/office/drawing/2014/main" id="{0426207A-4F76-43F7-35E9-A234BAE456A2}"/>
+                <a16:creationId xmlns:a16="http://schemas.microsoft.com/office/drawing/2014/main" id="{4AC25735-36AD-4844-3A7A-890EA23F9CE4}"/>
               </a:ext>
             </a:extLst>
           </p:cNvPr>
@@ -5154,8 +6062,8 @@
         </p:blipFill>
         <p:spPr>
           <a:xfrm>
-            <a:off x="3335261" y="1965420"/>
-            <a:ext cx="4934321" cy="4213438"/>
+            <a:off x="5611325" y="2014537"/>
+            <a:ext cx="5491965" cy="3977889"/>
           </a:xfrm>
           <a:prstGeom prst="rect">
             <a:avLst/>
@@ -5165,7 +6073,7 @@
     </p:spTree>
     <p:extLst>
       <p:ext uri="{BB962C8B-B14F-4D97-AF65-F5344CB8AC3E}">
-        <p14:creationId xmlns:p14="http://schemas.microsoft.com/office/powerpoint/2010/main" val="2431763611"/>
+        <p14:creationId xmlns:p14="http://schemas.microsoft.com/office/powerpoint/2010/main" val="2891702152"/>
       </p:ext>
     </p:extLst>
   </p:cSld>
@@ -5210,17 +6118,28 @@
         </p:nvSpPr>
         <p:spPr>
           <a:xfrm>
-            <a:off x="1097280" y="191472"/>
+            <a:off x="1097280" y="919803"/>
             <a:ext cx="10058400" cy="748452"/>
           </a:xfrm>
         </p:spPr>
         <p:txBody>
-          <a:bodyPr/>
+          <a:bodyPr>
+            <a:normAutofit fontScale="90000"/>
+          </a:bodyPr>
           <a:lstStyle/>
           <a:p>
             <a:r>
-              <a:rPr lang="en-US" dirty="0"/>
-              <a:t>Insight 8</a:t>
+              <a:rPr lang="en-US" b="0" i="0" dirty="0">
+                <a:solidFill>
+                  <a:srgbClr val="202124"/>
+                </a:solidFill>
+                <a:effectLst/>
+                <a:highlight>
+                  <a:srgbClr val="FFFFFF"/>
+                </a:highlight>
+                <a:latin typeface="Roboto" panose="02000000000000000000" pitchFamily="2" charset="0"/>
+              </a:rPr>
+              <a:t>Charged Off loans when there are publicly recorded bankruptcies</a:t>
             </a:r>
             <a:endParaRPr lang="en-IN" dirty="0"/>
           </a:p>
@@ -5244,8 +6163,8 @@
         </p:nvSpPr>
         <p:spPr>
           <a:xfrm>
-            <a:off x="1097280" y="1063257"/>
-            <a:ext cx="10058400" cy="4805836"/>
+            <a:off x="1097280" y="2004237"/>
+            <a:ext cx="4804399" cy="3864856"/>
           </a:xfrm>
         </p:spPr>
         <p:txBody>
@@ -5258,29 +6177,8 @@
             </a:pPr>
             <a:r>
               <a:rPr lang="en-US" dirty="0"/>
-              <a:t>The percentage of charged off loans is around 15% in most cases except DC-7% and NV-22.5%</a:t>
-            </a:r>
-          </a:p>
-          <a:p>
-            <a:pPr>
-              <a:buFont typeface="Wingdings" panose="05000000000000000000" pitchFamily="2" charset="2"/>
-              <a:buChar char="v"/>
-            </a:pPr>
-            <a:endParaRPr lang="en-US" dirty="0"/>
-          </a:p>
-          <a:p>
-            <a:pPr>
-              <a:buFont typeface="Wingdings" panose="05000000000000000000" pitchFamily="2" charset="2"/>
-              <a:buChar char="v"/>
-            </a:pPr>
-            <a:endParaRPr lang="en-US" dirty="0"/>
-          </a:p>
-          <a:p>
-            <a:pPr>
-              <a:buFont typeface="Wingdings" panose="05000000000000000000" pitchFamily="2" charset="2"/>
-              <a:buChar char="v"/>
-            </a:pPr>
-            <a:endParaRPr lang="en-US" dirty="0"/>
+              <a:t>When there are publicly recorded bankruptcies against a loan applicant, there is a higher chance of loan getting defaulted</a:t>
+            </a:r>
           </a:p>
           <a:p>
             <a:pPr lvl="1">
@@ -5296,7 +6194,7 @@
           <p:cNvPr id="5" name="Picture 4">
             <a:extLst>
               <a:ext uri="{FF2B5EF4-FFF2-40B4-BE49-F238E27FC236}">
-                <a16:creationId xmlns:a16="http://schemas.microsoft.com/office/drawing/2014/main" id="{B6FBC7A8-19A5-F712-887A-BDFE73B5D61C}"/>
+                <a16:creationId xmlns:a16="http://schemas.microsoft.com/office/drawing/2014/main" id="{AC20BDD2-EAA3-76DE-EF46-7C03FA3C15AE}"/>
               </a:ext>
             </a:extLst>
           </p:cNvPr>
@@ -5313,299 +6211,7 @@
         </p:blipFill>
         <p:spPr>
           <a:xfrm>
-            <a:off x="2999204" y="1945448"/>
-            <a:ext cx="5789224" cy="4286677"/>
-          </a:xfrm>
-          <a:prstGeom prst="rect">
-            <a:avLst/>
-          </a:prstGeom>
-        </p:spPr>
-      </p:pic>
-    </p:spTree>
-    <p:extLst>
-      <p:ext uri="{BB962C8B-B14F-4D97-AF65-F5344CB8AC3E}">
-        <p14:creationId xmlns:p14="http://schemas.microsoft.com/office/powerpoint/2010/main" val="3394608202"/>
-      </p:ext>
-    </p:extLst>
-  </p:cSld>
-  <p:clrMapOvr>
-    <a:masterClrMapping/>
-  </p:clrMapOvr>
-</p:sld>
-</file>
-
-<file path=ppt/slides/slide18.xml><?xml version="1.0" encoding="utf-8"?>
-<p:sld xmlns:a="http://schemas.openxmlformats.org/drawingml/2006/main" xmlns:r="http://schemas.openxmlformats.org/officeDocument/2006/relationships" xmlns:p="http://schemas.openxmlformats.org/presentationml/2006/main">
-  <p:cSld>
-    <p:spTree>
-      <p:nvGrpSpPr>
-        <p:cNvPr id="1" name=""/>
-        <p:cNvGrpSpPr/>
-        <p:nvPr/>
-      </p:nvGrpSpPr>
-      <p:grpSpPr>
-        <a:xfrm>
-          <a:off x="0" y="0"/>
-          <a:ext cx="0" cy="0"/>
-          <a:chOff x="0" y="0"/>
-          <a:chExt cx="0" cy="0"/>
-        </a:xfrm>
-      </p:grpSpPr>
-      <p:sp>
-        <p:nvSpPr>
-          <p:cNvPr id="2" name="Title 1">
-            <a:extLst>
-              <a:ext uri="{FF2B5EF4-FFF2-40B4-BE49-F238E27FC236}">
-                <a16:creationId xmlns:a16="http://schemas.microsoft.com/office/drawing/2014/main" id="{52FDF0B9-B3AB-3A17-8FC7-F4892A7DB154}"/>
-              </a:ext>
-            </a:extLst>
-          </p:cNvPr>
-          <p:cNvSpPr>
-            <a:spLocks noGrp="1"/>
-          </p:cNvSpPr>
-          <p:nvPr>
-            <p:ph type="title"/>
-          </p:nvPr>
-        </p:nvSpPr>
-        <p:spPr>
-          <a:xfrm>
-            <a:off x="1097280" y="191472"/>
-            <a:ext cx="10058400" cy="748452"/>
-          </a:xfrm>
-        </p:spPr>
-        <p:txBody>
-          <a:bodyPr/>
-          <a:lstStyle/>
-          <a:p>
-            <a:r>
-              <a:rPr lang="en-US" dirty="0"/>
-              <a:t>Insight 9</a:t>
-            </a:r>
-            <a:endParaRPr lang="en-IN" dirty="0"/>
-          </a:p>
-        </p:txBody>
-      </p:sp>
-      <p:sp>
-        <p:nvSpPr>
-          <p:cNvPr id="3" name="Content Placeholder 2">
-            <a:extLst>
-              <a:ext uri="{FF2B5EF4-FFF2-40B4-BE49-F238E27FC236}">
-                <a16:creationId xmlns:a16="http://schemas.microsoft.com/office/drawing/2014/main" id="{D955C1A0-F490-B7A4-0AE9-871F3F7C9B5D}"/>
-              </a:ext>
-            </a:extLst>
-          </p:cNvPr>
-          <p:cNvSpPr>
-            <a:spLocks noGrp="1"/>
-          </p:cNvSpPr>
-          <p:nvPr>
-            <p:ph idx="1"/>
-          </p:nvPr>
-        </p:nvSpPr>
-        <p:spPr>
-          <a:xfrm>
-            <a:off x="1097280" y="1063257"/>
-            <a:ext cx="10058400" cy="4805836"/>
-          </a:xfrm>
-        </p:spPr>
-        <p:txBody>
-          <a:bodyPr/>
-          <a:lstStyle/>
-          <a:p>
-            <a:pPr>
-              <a:buFont typeface="Wingdings" panose="05000000000000000000" pitchFamily="2" charset="2"/>
-              <a:buChar char="v"/>
-            </a:pPr>
-            <a:r>
-              <a:rPr lang="en-US" dirty="0"/>
-              <a:t>When there is one </a:t>
-            </a:r>
-            <a:r>
-              <a:rPr lang="en-US" dirty="0" err="1"/>
-              <a:t>pubrec</a:t>
-            </a:r>
-            <a:r>
-              <a:rPr lang="en-US" dirty="0"/>
-              <a:t>, the percent of charged off loans is high when compared to average</a:t>
-            </a:r>
-          </a:p>
-          <a:p>
-            <a:pPr lvl="1">
-              <a:buFont typeface="Wingdings" panose="05000000000000000000" pitchFamily="2" charset="2"/>
-              <a:buChar char="v"/>
-            </a:pPr>
-            <a:endParaRPr lang="en-IN" sz="1400" dirty="0"/>
-          </a:p>
-        </p:txBody>
-      </p:sp>
-      <p:pic>
-        <p:nvPicPr>
-          <p:cNvPr id="7" name="Picture 6">
-            <a:extLst>
-              <a:ext uri="{FF2B5EF4-FFF2-40B4-BE49-F238E27FC236}">
-                <a16:creationId xmlns:a16="http://schemas.microsoft.com/office/drawing/2014/main" id="{4AC25735-36AD-4844-3A7A-890EA23F9CE4}"/>
-              </a:ext>
-            </a:extLst>
-          </p:cNvPr>
-          <p:cNvPicPr>
-            <a:picLocks noChangeAspect="1"/>
-          </p:cNvPicPr>
-          <p:nvPr/>
-        </p:nvPicPr>
-        <p:blipFill>
-          <a:blip r:embed="rId2"/>
-          <a:stretch>
-            <a:fillRect/>
-          </a:stretch>
-        </p:blipFill>
-        <p:spPr>
-          <a:xfrm>
-            <a:off x="2788373" y="2014537"/>
-            <a:ext cx="5491965" cy="3977889"/>
-          </a:xfrm>
-          <a:prstGeom prst="rect">
-            <a:avLst/>
-          </a:prstGeom>
-        </p:spPr>
-      </p:pic>
-    </p:spTree>
-    <p:extLst>
-      <p:ext uri="{BB962C8B-B14F-4D97-AF65-F5344CB8AC3E}">
-        <p14:creationId xmlns:p14="http://schemas.microsoft.com/office/powerpoint/2010/main" val="2891702152"/>
-      </p:ext>
-    </p:extLst>
-  </p:cSld>
-  <p:clrMapOvr>
-    <a:masterClrMapping/>
-  </p:clrMapOvr>
-</p:sld>
-</file>
-
-<file path=ppt/slides/slide19.xml><?xml version="1.0" encoding="utf-8"?>
-<p:sld xmlns:a="http://schemas.openxmlformats.org/drawingml/2006/main" xmlns:r="http://schemas.openxmlformats.org/officeDocument/2006/relationships" xmlns:p="http://schemas.openxmlformats.org/presentationml/2006/main">
-  <p:cSld>
-    <p:spTree>
-      <p:nvGrpSpPr>
-        <p:cNvPr id="1" name=""/>
-        <p:cNvGrpSpPr/>
-        <p:nvPr/>
-      </p:nvGrpSpPr>
-      <p:grpSpPr>
-        <a:xfrm>
-          <a:off x="0" y="0"/>
-          <a:ext cx="0" cy="0"/>
-          <a:chOff x="0" y="0"/>
-          <a:chExt cx="0" cy="0"/>
-        </a:xfrm>
-      </p:grpSpPr>
-      <p:sp>
-        <p:nvSpPr>
-          <p:cNvPr id="2" name="Title 1">
-            <a:extLst>
-              <a:ext uri="{FF2B5EF4-FFF2-40B4-BE49-F238E27FC236}">
-                <a16:creationId xmlns:a16="http://schemas.microsoft.com/office/drawing/2014/main" id="{52FDF0B9-B3AB-3A17-8FC7-F4892A7DB154}"/>
-              </a:ext>
-            </a:extLst>
-          </p:cNvPr>
-          <p:cNvSpPr>
-            <a:spLocks noGrp="1"/>
-          </p:cNvSpPr>
-          <p:nvPr>
-            <p:ph type="title"/>
-          </p:nvPr>
-        </p:nvSpPr>
-        <p:spPr>
-          <a:xfrm>
-            <a:off x="1097280" y="191472"/>
-            <a:ext cx="10058400" cy="748452"/>
-          </a:xfrm>
-        </p:spPr>
-        <p:txBody>
-          <a:bodyPr/>
-          <a:lstStyle/>
-          <a:p>
-            <a:r>
-              <a:rPr lang="en-US" dirty="0"/>
-              <a:t>Insight 10</a:t>
-            </a:r>
-            <a:endParaRPr lang="en-IN" dirty="0"/>
-          </a:p>
-        </p:txBody>
-      </p:sp>
-      <p:sp>
-        <p:nvSpPr>
-          <p:cNvPr id="3" name="Content Placeholder 2">
-            <a:extLst>
-              <a:ext uri="{FF2B5EF4-FFF2-40B4-BE49-F238E27FC236}">
-                <a16:creationId xmlns:a16="http://schemas.microsoft.com/office/drawing/2014/main" id="{D955C1A0-F490-B7A4-0AE9-871F3F7C9B5D}"/>
-              </a:ext>
-            </a:extLst>
-          </p:cNvPr>
-          <p:cNvSpPr>
-            <a:spLocks noGrp="1"/>
-          </p:cNvSpPr>
-          <p:nvPr>
-            <p:ph idx="1"/>
-          </p:nvPr>
-        </p:nvSpPr>
-        <p:spPr>
-          <a:xfrm>
-            <a:off x="1097280" y="1063257"/>
-            <a:ext cx="10058400" cy="4805836"/>
-          </a:xfrm>
-        </p:spPr>
-        <p:txBody>
-          <a:bodyPr/>
-          <a:lstStyle/>
-          <a:p>
-            <a:pPr>
-              <a:buFont typeface="Wingdings" panose="05000000000000000000" pitchFamily="2" charset="2"/>
-              <a:buChar char="v"/>
-            </a:pPr>
-            <a:r>
-              <a:rPr lang="en-US" dirty="0"/>
-              <a:t>When there is one </a:t>
-            </a:r>
-            <a:r>
-              <a:rPr lang="en-US" dirty="0" err="1"/>
-              <a:t>pub_rec</a:t>
-            </a:r>
-            <a:r>
-              <a:rPr lang="en-US" dirty="0"/>
-              <a:t>, bankruptcy, the percent of charged off loans is high when compared to average</a:t>
-            </a:r>
-          </a:p>
-          <a:p>
-            <a:pPr lvl="1">
-              <a:buFont typeface="Wingdings" panose="05000000000000000000" pitchFamily="2" charset="2"/>
-              <a:buChar char="v"/>
-            </a:pPr>
-            <a:endParaRPr lang="en-IN" sz="1400" dirty="0"/>
-          </a:p>
-        </p:txBody>
-      </p:sp>
-      <p:pic>
-        <p:nvPicPr>
-          <p:cNvPr id="5" name="Picture 4">
-            <a:extLst>
-              <a:ext uri="{FF2B5EF4-FFF2-40B4-BE49-F238E27FC236}">
-                <a16:creationId xmlns:a16="http://schemas.microsoft.com/office/drawing/2014/main" id="{AC20BDD2-EAA3-76DE-EF46-7C03FA3C15AE}"/>
-              </a:ext>
-            </a:extLst>
-          </p:cNvPr>
-          <p:cNvPicPr>
-            <a:picLocks noChangeAspect="1"/>
-          </p:cNvPicPr>
-          <p:nvPr/>
-        </p:nvPicPr>
-        <p:blipFill>
-          <a:blip r:embed="rId2"/>
-          <a:stretch>
-            <a:fillRect/>
-          </a:stretch>
-        </p:blipFill>
-        <p:spPr>
-          <a:xfrm>
-            <a:off x="3307334" y="2080277"/>
+            <a:off x="5901679" y="2069645"/>
             <a:ext cx="5481559" cy="3977889"/>
           </a:xfrm>
           <a:prstGeom prst="rect">
@@ -5666,7 +6272,7 @@
           <a:p>
             <a:r>
               <a:rPr lang="en-IN" dirty="0"/>
-              <a:t>TOC</a:t>
+              <a:t>Table of Contents</a:t>
             </a:r>
           </a:p>
         </p:txBody>
@@ -5926,14 +6532,15 @@
           <a:bodyPr/>
           <a:lstStyle/>
           <a:p>
-            <a:r>
-              <a:rPr lang="en-IN" dirty="0">
-                <a:solidFill>
-                  <a:srgbClr val="C00000"/>
-                </a:solidFill>
-              </a:rPr>
-              <a:t>&lt;need to add&gt;</a:t>
-            </a:r>
+            <a:pPr>
+              <a:buFont typeface="Wingdings" panose="05000000000000000000" pitchFamily="2" charset="2"/>
+              <a:buChar char="v"/>
+            </a:pPr>
+            <a:r>
+              <a:rPr lang="en-US" dirty="0"/>
+              <a:t>The analysis is done only for loan status that has values Fully Paid and Charged Off. The data that has loan status value "current" is removed from the dataset</a:t>
+            </a:r>
+            <a:endParaRPr lang="en-IN" dirty="0"/>
           </a:p>
           <a:p>
             <a:endParaRPr lang="en-IN" dirty="0"/>
@@ -6301,25 +6908,19 @@
             </a:pPr>
             <a:r>
               <a:rPr lang="en-US" sz="1600" dirty="0"/>
-              <a:t>Conclusion</a:t>
-            </a:r>
-          </a:p>
-          <a:p>
-            <a:pPr lvl="2">
-              <a:buFont typeface="Wingdings" panose="05000000000000000000" pitchFamily="2" charset="2"/>
-              <a:buChar char="v"/>
-            </a:pPr>
+              <a:t>Conclusion: </a:t>
+            </a:r>
             <a:r>
               <a:rPr lang="en-US" dirty="0">
                 <a:solidFill>
-                  <a:srgbClr val="C00000"/>
+                  <a:schemeClr val="tx1"/>
                 </a:solidFill>
               </a:rPr>
               <a:t>There are many columns with null values for all the rows. Hence we need data cleaning</a:t>
             </a:r>
             <a:endParaRPr lang="en-IN" dirty="0">
               <a:solidFill>
-                <a:srgbClr val="C00000"/>
+                <a:schemeClr val="tx1"/>
               </a:solidFill>
             </a:endParaRPr>
           </a:p>
@@ -6401,7 +7002,7 @@
         <p:spPr>
           <a:xfrm>
             <a:off x="1097280" y="2009555"/>
-            <a:ext cx="10058400" cy="4805836"/>
+            <a:ext cx="10058400" cy="4332766"/>
           </a:xfrm>
           <a:prstGeom prst="rect">
             <a:avLst/>
@@ -6750,33 +7351,8 @@
             </a:r>
           </a:p>
           <a:p>
-            <a:pPr lvl="1">
-              <a:buFont typeface="Wingdings" panose="05000000000000000000" pitchFamily="2" charset="2"/>
-              <a:buChar char="v"/>
-            </a:pPr>
-            <a:r>
-              <a:rPr lang="en-US" sz="1600" dirty="0"/>
-              <a:t>Conclusion</a:t>
-            </a:r>
-          </a:p>
-          <a:p>
-            <a:pPr lvl="2">
-              <a:buFont typeface="Wingdings" panose="05000000000000000000" pitchFamily="2" charset="2"/>
-              <a:buChar char="v"/>
-            </a:pPr>
-            <a:r>
-              <a:rPr lang="en-IN" dirty="0">
-                <a:solidFill>
-                  <a:srgbClr val="C00000"/>
-                </a:solidFill>
-              </a:rPr>
-              <a:t>&lt;need to add&gt;</a:t>
-            </a:r>
-          </a:p>
-          <a:p>
-            <a:pPr lvl="1">
-              <a:buFont typeface="Wingdings" panose="05000000000000000000" pitchFamily="2" charset="2"/>
-              <a:buChar char="v"/>
+            <a:pPr marL="201168" lvl="1" indent="0">
+              <a:buNone/>
             </a:pPr>
             <a:endParaRPr lang="en-IN" sz="1400" dirty="0"/>
           </a:p>
@@ -7123,6 +7699,16 @@
             </a:pPr>
             <a:r>
               <a:rPr lang="en-US" sz="1600" dirty="0"/>
+              <a:t>: For performing the analysis, the percentage of charged off loans in the overall dataset is taken as the baseline and data in various segments is compared against this baseline to find out the strong indicators of default</a:t>
+            </a:r>
+          </a:p>
+          <a:p>
+            <a:pPr lvl="1">
+              <a:buFont typeface="Wingdings" panose="05000000000000000000" pitchFamily="2" charset="2"/>
+              <a:buChar char="v"/>
+            </a:pPr>
+            <a:r>
+              <a:rPr lang="en-US" sz="1600" dirty="0"/>
               <a:t>Identify Categorical and Numeric variables</a:t>
             </a:r>
           </a:p>
@@ -7185,37 +7771,6 @@
               <a:rPr lang="en-US" sz="1200" dirty="0"/>
               <a:t>Numeric Columns</a:t>
             </a:r>
-          </a:p>
-          <a:p>
-            <a:pPr lvl="1">
-              <a:buFont typeface="Wingdings" panose="05000000000000000000" pitchFamily="2" charset="2"/>
-              <a:buChar char="v"/>
-            </a:pPr>
-            <a:r>
-              <a:rPr lang="en-US" sz="1600" dirty="0"/>
-              <a:t>Conclusion</a:t>
-            </a:r>
-          </a:p>
-          <a:p>
-            <a:pPr lvl="2">
-              <a:buFont typeface="Wingdings" panose="05000000000000000000" pitchFamily="2" charset="2"/>
-              <a:buChar char="v"/>
-            </a:pPr>
-            <a:r>
-              <a:rPr lang="en-IN" dirty="0">
-                <a:solidFill>
-                  <a:srgbClr val="C00000"/>
-                </a:solidFill>
-              </a:rPr>
-              <a:t>&lt;need to add&gt;</a:t>
-            </a:r>
-          </a:p>
-          <a:p>
-            <a:pPr lvl="1">
-              <a:buFont typeface="Wingdings" panose="05000000000000000000" pitchFamily="2" charset="2"/>
-              <a:buChar char="v"/>
-            </a:pPr>
-            <a:endParaRPr lang="en-IN" sz="1400" dirty="0"/>
           </a:p>
         </p:txBody>
       </p:sp>
@@ -7509,21 +8064,29 @@
         </p:nvSpPr>
         <p:spPr>
           <a:xfrm>
-            <a:off x="1097280" y="-33005"/>
-            <a:ext cx="10058400" cy="1450757"/>
+            <a:off x="1097280" y="834741"/>
+            <a:ext cx="10058400" cy="748452"/>
           </a:xfrm>
         </p:spPr>
         <p:txBody>
-          <a:bodyPr/>
+          <a:bodyPr>
+            <a:normAutofit fontScale="90000"/>
+          </a:bodyPr>
           <a:lstStyle/>
           <a:p>
             <a:r>
-              <a:rPr lang="en-US" dirty="0"/>
-              <a:t>Insights</a:t>
-            </a:r>
-            <a:br>
-              <a:rPr lang="en-US" dirty="0"/>
-            </a:br>
+              <a:rPr lang="en-US" b="0" i="0" dirty="0">
+                <a:solidFill>
+                  <a:srgbClr val="202124"/>
+                </a:solidFill>
+                <a:effectLst/>
+                <a:highlight>
+                  <a:srgbClr val="FFFFFF"/>
+                </a:highlight>
+                <a:latin typeface="Roboto" panose="02000000000000000000" pitchFamily="2" charset="0"/>
+              </a:rPr>
+              <a:t>Relationship between loan amount and charged off loans</a:t>
+            </a:r>
             <a:endParaRPr lang="en-IN" dirty="0"/>
           </a:p>
         </p:txBody>
@@ -7546,14 +8109,12 @@
         </p:nvSpPr>
         <p:spPr>
           <a:xfrm>
-            <a:off x="1097280" y="812759"/>
-            <a:ext cx="10058400" cy="4736725"/>
+            <a:off x="1097279" y="2163725"/>
+            <a:ext cx="10157283" cy="3554441"/>
           </a:xfrm>
         </p:spPr>
         <p:txBody>
-          <a:bodyPr>
-            <a:noAutofit/>
-          </a:bodyPr>
+          <a:bodyPr/>
           <a:lstStyle/>
           <a:p>
             <a:pPr>
@@ -7561,219 +8122,125 @@
               <a:buChar char="v"/>
             </a:pPr>
             <a:r>
-              <a:rPr lang="en-US" sz="1300" dirty="0">
-                <a:cs typeface="Arial" panose="020B0604020202020204" pitchFamily="34" charset="0"/>
+              <a:rPr lang="en-US" b="0" i="0" dirty="0">
+                <a:solidFill>
+                  <a:srgbClr val="202124"/>
+                </a:solidFill>
+                <a:effectLst/>
+                <a:highlight>
+                  <a:srgbClr val="FFFFFF"/>
+                </a:highlight>
+                <a:latin typeface="Roboto" panose="02000000000000000000" pitchFamily="2" charset="0"/>
               </a:rPr>
-              <a:t>Insight1: At </a:t>
-            </a:r>
-            <a:r>
-              <a:rPr lang="en-US" sz="1300" b="1" u="sng" dirty="0">
-                <a:cs typeface="Arial" panose="020B0604020202020204" pitchFamily="34" charset="0"/>
+              <a:t>The analysis is done for the data beyond 90th percentile of loan amount. </a:t>
+            </a:r>
+          </a:p>
+          <a:p>
+            <a:pPr>
+              <a:buFont typeface="Wingdings" panose="05000000000000000000" pitchFamily="2" charset="2"/>
+              <a:buChar char="v"/>
+            </a:pPr>
+            <a:r>
+              <a:rPr lang="en-US" b="0" i="0" dirty="0">
+                <a:solidFill>
+                  <a:srgbClr val="202124"/>
+                </a:solidFill>
+                <a:effectLst/>
+                <a:highlight>
+                  <a:srgbClr val="FFFFFF"/>
+                </a:highlight>
+                <a:latin typeface="Roboto" panose="02000000000000000000" pitchFamily="2" charset="0"/>
               </a:rPr>
-              <a:t>higher loan amounts</a:t>
-            </a:r>
-            <a:r>
-              <a:rPr lang="en-US" sz="1300" dirty="0">
-                <a:cs typeface="Arial" panose="020B0604020202020204" pitchFamily="34" charset="0"/>
+              <a:t>In this dataset, it is observed that the percentage of charged off loans increased by 5 percentage points. While the percentage of charged off loans in the overall dataset is 15%, the same in higher loan amount dataset is 20%</a:t>
+            </a:r>
+          </a:p>
+          <a:p>
+            <a:pPr>
+              <a:buFont typeface="Wingdings" panose="05000000000000000000" pitchFamily="2" charset="2"/>
+              <a:buChar char="v"/>
+            </a:pPr>
+            <a:r>
+              <a:rPr lang="en-US" b="1" i="0" dirty="0">
+                <a:solidFill>
+                  <a:srgbClr val="202124"/>
+                </a:solidFill>
+                <a:effectLst/>
+                <a:highlight>
+                  <a:srgbClr val="FFFFFF"/>
+                </a:highlight>
+                <a:latin typeface="Roboto" panose="02000000000000000000" pitchFamily="2" charset="0"/>
               </a:rPr>
-              <a:t> the percent of charged off loans over total loans increased by 5 percentage points i.e. one in every five loans charged off </a:t>
-            </a:r>
+              <a:t>Observation: </a:t>
+            </a:r>
+          </a:p>
+          <a:p>
+            <a:pPr lvl="1">
+              <a:buFont typeface="Wingdings" panose="05000000000000000000" pitchFamily="2" charset="2"/>
+              <a:buChar char="v"/>
+            </a:pPr>
+            <a:r>
+              <a:rPr lang="en-US" b="0" i="0" dirty="0">
+                <a:solidFill>
+                  <a:srgbClr val="202124"/>
+                </a:solidFill>
+                <a:effectLst/>
+                <a:highlight>
+                  <a:srgbClr val="FFFFFF"/>
+                </a:highlight>
+                <a:latin typeface="Roboto" panose="02000000000000000000" pitchFamily="2" charset="0"/>
+              </a:rPr>
+              <a:t>Higher the loan amount, higher are the chances for the loan getting charged off</a:t>
+            </a:r>
+            <a:endParaRPr lang="en-US" dirty="0"/>
           </a:p>
           <a:p>
             <a:pPr>
               <a:buFont typeface="Wingdings" panose="05000000000000000000" pitchFamily="2" charset="2"/>
               <a:buChar char="v"/>
             </a:pPr>
-            <a:r>
-              <a:rPr lang="en-US" sz="1300" dirty="0">
-                <a:cs typeface="Arial" panose="020B0604020202020204" pitchFamily="34" charset="0"/>
-              </a:rPr>
-              <a:t>Insight2: At </a:t>
-            </a:r>
-            <a:r>
-              <a:rPr lang="en-US" sz="1300" b="1" u="sng" dirty="0">
-                <a:cs typeface="Arial" panose="020B0604020202020204" pitchFamily="34" charset="0"/>
-              </a:rPr>
-              <a:t>higher interest rates</a:t>
-            </a:r>
-            <a:r>
-              <a:rPr lang="en-US" sz="1300" dirty="0">
-                <a:cs typeface="Arial" panose="020B0604020202020204" pitchFamily="34" charset="0"/>
-              </a:rPr>
-              <a:t>, charged off loans  as a percentage of total loans doubled when compared to overall range of data. Three loans in every ten loans charged off, meaning there is correlation between higher interest rate and loan getting charged off</a:t>
-            </a:r>
+            <a:endParaRPr lang="en-US" dirty="0"/>
           </a:p>
           <a:p>
             <a:pPr>
               <a:buFont typeface="Wingdings" panose="05000000000000000000" pitchFamily="2" charset="2"/>
               <a:buChar char="v"/>
             </a:pPr>
-            <a:r>
-              <a:rPr lang="en-US" sz="1300" dirty="0">
-                <a:cs typeface="Arial" panose="020B0604020202020204" pitchFamily="34" charset="0"/>
-              </a:rPr>
-              <a:t>Insight3: When the </a:t>
-            </a:r>
-            <a:r>
-              <a:rPr lang="en-US" sz="1300" b="1" u="sng" dirty="0">
-                <a:cs typeface="Arial" panose="020B0604020202020204" pitchFamily="34" charset="0"/>
-              </a:rPr>
-              <a:t>interest rate </a:t>
-            </a:r>
-            <a:r>
-              <a:rPr lang="en-US" sz="1300" dirty="0">
-                <a:cs typeface="Arial" panose="020B0604020202020204" pitchFamily="34" charset="0"/>
-              </a:rPr>
-              <a:t>is very low, the percent of charged off loans is way to less when compared to the overall range. This means when the interest rate is very low, very few loans gets charged off</a:t>
-            </a:r>
+            <a:endParaRPr lang="en-US" dirty="0"/>
           </a:p>
           <a:p>
             <a:pPr>
               <a:buFont typeface="Wingdings" panose="05000000000000000000" pitchFamily="2" charset="2"/>
               <a:buChar char="v"/>
             </a:pPr>
-            <a:r>
-              <a:rPr lang="en-US" sz="1300" dirty="0">
-                <a:cs typeface="Arial" panose="020B0604020202020204" pitchFamily="34" charset="0"/>
-              </a:rPr>
-              <a:t>Insight4: When the </a:t>
-            </a:r>
-            <a:r>
-              <a:rPr lang="en-US" sz="1300" b="1" u="sng" dirty="0">
-                <a:cs typeface="Arial" panose="020B0604020202020204" pitchFamily="34" charset="0"/>
-              </a:rPr>
-              <a:t>loan term </a:t>
-            </a:r>
-            <a:r>
-              <a:rPr lang="en-US" sz="1300" dirty="0">
-                <a:cs typeface="Arial" panose="020B0604020202020204" pitchFamily="34" charset="0"/>
-              </a:rPr>
-              <a:t>is 60 months, 25% of the total loans  got charged off</a:t>
-            </a:r>
+            <a:endParaRPr lang="en-US" dirty="0"/>
           </a:p>
           <a:p>
             <a:pPr>
               <a:buFont typeface="Wingdings" panose="05000000000000000000" pitchFamily="2" charset="2"/>
               <a:buChar char="v"/>
             </a:pPr>
-            <a:r>
-              <a:rPr lang="en-US" sz="1300" dirty="0">
-                <a:cs typeface="Arial" panose="020B0604020202020204" pitchFamily="34" charset="0"/>
-              </a:rPr>
-              <a:t>Insight5: As the grade of loan moves from A to G, the percentage of charged off loans keeps increasing. While only 6% of the grade A loans ended up in charged off, in grade G over 33% of the loans are charged off</a:t>
-            </a:r>
+            <a:endParaRPr lang="en-US" dirty="0"/>
           </a:p>
           <a:p>
             <a:pPr>
               <a:buFont typeface="Wingdings" panose="05000000000000000000" pitchFamily="2" charset="2"/>
               <a:buChar char="v"/>
             </a:pPr>
-            <a:r>
-              <a:rPr lang="en-US" sz="1300" dirty="0">
-                <a:cs typeface="Arial" panose="020B0604020202020204" pitchFamily="34" charset="0"/>
-              </a:rPr>
-              <a:t>Insight6: In the F5 </a:t>
-            </a:r>
-            <a:r>
-              <a:rPr lang="en-US" sz="1300" b="1" u="sng" dirty="0">
-                <a:cs typeface="Arial" panose="020B0604020202020204" pitchFamily="34" charset="0"/>
-              </a:rPr>
-              <a:t>subgrade, </a:t>
-            </a:r>
-            <a:r>
-              <a:rPr lang="en-US" sz="1300" dirty="0">
-                <a:cs typeface="Arial" panose="020B0604020202020204" pitchFamily="34" charset="0"/>
-              </a:rPr>
-              <a:t>almost 48% of the loans resulted in charged off loans. In these subgrades F5,G3,G2,F4,G5,G1 the charged off loans percentage is very high(more than 33%. At least One in every three loans got charged off)</a:t>
-            </a:r>
-          </a:p>
-          <a:p>
-            <a:pPr>
-              <a:buFont typeface="Wingdings" panose="05000000000000000000" pitchFamily="2" charset="2"/>
-              <a:buChar char="v"/>
-            </a:pPr>
-            <a:r>
-              <a:rPr lang="en-US" sz="1300" dirty="0">
-                <a:cs typeface="Arial" panose="020B0604020202020204" pitchFamily="34" charset="0"/>
-              </a:rPr>
-              <a:t>Insight7: Lending for the purpose of small business turned out to be risky. More than 27% of the total loans resulted in charged off, this is way more than the average of 16%</a:t>
-            </a:r>
-          </a:p>
-          <a:p>
-            <a:pPr>
-              <a:buFont typeface="Wingdings" panose="05000000000000000000" pitchFamily="2" charset="2"/>
-              <a:buChar char="v"/>
-            </a:pPr>
-            <a:r>
-              <a:rPr lang="en-US" sz="1300" dirty="0">
-                <a:cs typeface="Arial" panose="020B0604020202020204" pitchFamily="34" charset="0"/>
-              </a:rPr>
-              <a:t>Insight8: The percentage of charged off loans is around 15% in most cases except DC-7% and NV-22.5%</a:t>
-            </a:r>
-          </a:p>
-          <a:p>
-            <a:pPr>
-              <a:buFont typeface="Wingdings" panose="05000000000000000000" pitchFamily="2" charset="2"/>
-              <a:buChar char="v"/>
-            </a:pPr>
-            <a:r>
-              <a:rPr lang="en-US" sz="1300" dirty="0">
-                <a:cs typeface="Arial" panose="020B0604020202020204" pitchFamily="34" charset="0"/>
-              </a:rPr>
-              <a:t>Insight9: When there is one </a:t>
-            </a:r>
-            <a:r>
-              <a:rPr lang="en-US" sz="1300" b="1" u="sng" dirty="0" err="1">
-                <a:cs typeface="Arial" panose="020B0604020202020204" pitchFamily="34" charset="0"/>
-              </a:rPr>
-              <a:t>pubrec</a:t>
-            </a:r>
-            <a:r>
-              <a:rPr lang="en-US" sz="1300" dirty="0">
-                <a:cs typeface="Arial" panose="020B0604020202020204" pitchFamily="34" charset="0"/>
-              </a:rPr>
-              <a:t>, the percent of charged off loans is high when compared to average. The other sample sizes are very small, so not considering them.</a:t>
-            </a:r>
-          </a:p>
-          <a:p>
-            <a:pPr>
-              <a:buFont typeface="Wingdings" panose="05000000000000000000" pitchFamily="2" charset="2"/>
-              <a:buChar char="v"/>
-            </a:pPr>
-            <a:r>
-              <a:rPr lang="en-US" sz="1300" dirty="0">
-                <a:cs typeface="Arial" panose="020B0604020202020204" pitchFamily="34" charset="0"/>
-              </a:rPr>
-              <a:t>Insight10: When there is one </a:t>
-            </a:r>
-            <a:r>
-              <a:rPr lang="en-US" sz="1300" b="1" u="sng" dirty="0" err="1">
-                <a:cs typeface="Arial" panose="020B0604020202020204" pitchFamily="34" charset="0"/>
-              </a:rPr>
-              <a:t>pub_rec</a:t>
-            </a:r>
-            <a:r>
-              <a:rPr lang="en-US" sz="1300" b="1" u="sng" dirty="0">
-                <a:cs typeface="Arial" panose="020B0604020202020204" pitchFamily="34" charset="0"/>
-              </a:rPr>
-              <a:t>, bankruptcy</a:t>
-            </a:r>
-            <a:r>
-              <a:rPr lang="en-US" sz="1300" dirty="0">
-                <a:cs typeface="Arial" panose="020B0604020202020204" pitchFamily="34" charset="0"/>
-              </a:rPr>
-              <a:t>, the percent of charged off loans is high when compared to average. The other sample sizes are very small, so not considering them</a:t>
-            </a:r>
-            <a:endParaRPr lang="en-IN" sz="1300" dirty="0">
-              <a:cs typeface="Arial" panose="020B0604020202020204" pitchFamily="34" charset="0"/>
-            </a:endParaRPr>
+            <a:endParaRPr lang="en-US" dirty="0"/>
+          </a:p>
+          <a:p>
+            <a:pPr lvl="1">
+              <a:buFont typeface="Wingdings" panose="05000000000000000000" pitchFamily="2" charset="2"/>
+              <a:buChar char="v"/>
+            </a:pPr>
+            <a:endParaRPr lang="en-IN" sz="1400" dirty="0"/>
           </a:p>
         </p:txBody>
       </p:sp>
     </p:spTree>
     <p:extLst>
       <p:ext uri="{BB962C8B-B14F-4D97-AF65-F5344CB8AC3E}">
-        <p14:creationId xmlns:p14="http://schemas.microsoft.com/office/powerpoint/2010/main" val="2962964088"/>
+        <p14:creationId xmlns:p14="http://schemas.microsoft.com/office/powerpoint/2010/main" val="3011202115"/>
       </p:ext>
     </p:extLst>
   </p:cSld>
@@ -8067,35 +8534,6 @@
 </file>
 
 <file path=customXml/item1.xml><?xml version="1.0" encoding="utf-8"?>
-<p:properties xmlns:p="http://schemas.microsoft.com/office/2006/metadata/properties" xmlns:xsi="http://www.w3.org/2001/XMLSchema-instance" xmlns:pc="http://schemas.microsoft.com/office/infopath/2007/PartnerControls">
-  <documentManagement>
-    <_ip_UnifiedCompliancePolicyUIAction xmlns="http://schemas.microsoft.com/sharepoint/v3" xsi:nil="true"/>
-    <Image xmlns="71af3243-3dd4-4a8d-8c0d-dd76da1f02a5">
-      <Url xsi:nil="true"/>
-      <Description xsi:nil="true"/>
-    </Image>
-    <Status xmlns="71af3243-3dd4-4a8d-8c0d-dd76da1f02a5">Not started</Status>
-    <Background xmlns="71af3243-3dd4-4a8d-8c0d-dd76da1f02a5">false</Background>
-    <_ip_UnifiedCompliancePolicyProperties xmlns="http://schemas.microsoft.com/sharepoint/v3" xsi:nil="true"/>
-    <ImageTagsTaxHTField xmlns="71af3243-3dd4-4a8d-8c0d-dd76da1f02a5">
-      <Terms xmlns="http://schemas.microsoft.com/office/infopath/2007/PartnerControls"/>
-    </ImageTagsTaxHTField>
-    <TaxCatchAll xmlns="230e9df3-be65-4c73-a93b-d1236ebd677e" xsi:nil="true"/>
-    <MediaServiceKeyPoints xmlns="71af3243-3dd4-4a8d-8c0d-dd76da1f02a5" xsi:nil="true"/>
-  </documentManagement>
-</p:properties>
-</file>
-
-<file path=customXml/item2.xml><?xml version="1.0" encoding="utf-8"?>
-<?mso-contentType ?>
-<FormTemplates xmlns="http://schemas.microsoft.com/sharepoint/v3/contenttype/forms">
-  <Display>DocumentLibraryForm</Display>
-  <Edit>DocumentLibraryForm</Edit>
-  <New>DocumentLibraryForm</New>
-</FormTemplates>
-</file>
-
-<file path=customXml/item3.xml><?xml version="1.0" encoding="utf-8"?>
 <ct:contentTypeSchema xmlns:ct="http://schemas.microsoft.com/office/2006/metadata/contentType" xmlns:ma="http://schemas.microsoft.com/office/2006/metadata/properties/metaAttributes" ct:_="" ma:_="" ma:contentTypeName="Document" ma:contentTypeID="0x01010079F111ED35F8CC479449609E8A0923A6" ma:contentTypeVersion="27" ma:contentTypeDescription="Create a new document." ma:contentTypeScope="" ma:versionID="c6f9a84f66a9c8b9a21755b9ffafb945">
   <xsd:schema xmlns:xsd="http://www.w3.org/2001/XMLSchema" xmlns:xs="http://www.w3.org/2001/XMLSchema" xmlns:p="http://schemas.microsoft.com/office/2006/metadata/properties" xmlns:ns1="http://schemas.microsoft.com/sharepoint/v3" xmlns:ns2="71af3243-3dd4-4a8d-8c0d-dd76da1f02a5" xmlns:ns3="16c05727-aa75-4e4a-9b5f-8a80a1165891" xmlns:ns4="230e9df3-be65-4c73-a93b-d1236ebd677e" targetNamespace="http://schemas.microsoft.com/office/2006/metadata/properties" ma:root="true" ma:fieldsID="27df39e3e7036dff54f89ddd5805ce72" ns1:_="" ns2:_="" ns3:_="" ns4:_="">
     <xsd:import namespace="http://schemas.microsoft.com/sharepoint/v3"/>
@@ -8401,27 +8839,36 @@
 </ct:contentTypeSchema>
 </file>
 
-<file path=customXml/itemProps1.xml><?xml version="1.0" encoding="utf-8"?>
-<ds:datastoreItem xmlns:ds="http://schemas.openxmlformats.org/officeDocument/2006/customXml" ds:itemID="{6F4F4D41-822D-40F2-A7AC-E4E6CB36CA7A}">
-  <ds:schemaRefs>
-    <ds:schemaRef ds:uri="http://schemas.microsoft.com/office/2006/metadata/properties"/>
-    <ds:schemaRef ds:uri="http://schemas.microsoft.com/office/infopath/2007/PartnerControls"/>
-    <ds:schemaRef ds:uri="http://schemas.microsoft.com/sharepoint/v3"/>
-    <ds:schemaRef ds:uri="71af3243-3dd4-4a8d-8c0d-dd76da1f02a5"/>
-    <ds:schemaRef ds:uri="230e9df3-be65-4c73-a93b-d1236ebd677e"/>
-  </ds:schemaRefs>
-</ds:datastoreItem>
+<file path=customXml/item2.xml><?xml version="1.0" encoding="utf-8"?>
+<?mso-contentType ?>
+<FormTemplates xmlns="http://schemas.microsoft.com/sharepoint/v3/contenttype/forms">
+  <Display>DocumentLibraryForm</Display>
+  <Edit>DocumentLibraryForm</Edit>
+  <New>DocumentLibraryForm</New>
+</FormTemplates>
 </file>
 
-<file path=customXml/itemProps2.xml><?xml version="1.0" encoding="utf-8"?>
-<ds:datastoreItem xmlns:ds="http://schemas.openxmlformats.org/officeDocument/2006/customXml" ds:itemID="{19DAD249-BF80-48EF-9AFB-36A11BCDC2CE}">
-  <ds:schemaRefs>
-    <ds:schemaRef ds:uri="http://schemas.microsoft.com/sharepoint/v3/contenttype/forms"/>
-  </ds:schemaRefs>
-</ds:datastoreItem>
+<file path=customXml/item3.xml><?xml version="1.0" encoding="utf-8"?>
+<p:properties xmlns:p="http://schemas.microsoft.com/office/2006/metadata/properties" xmlns:xsi="http://www.w3.org/2001/XMLSchema-instance" xmlns:pc="http://schemas.microsoft.com/office/infopath/2007/PartnerControls">
+  <documentManagement>
+    <_ip_UnifiedCompliancePolicyUIAction xmlns="http://schemas.microsoft.com/sharepoint/v3" xsi:nil="true"/>
+    <Image xmlns="71af3243-3dd4-4a8d-8c0d-dd76da1f02a5">
+      <Url xsi:nil="true"/>
+      <Description xsi:nil="true"/>
+    </Image>
+    <Status xmlns="71af3243-3dd4-4a8d-8c0d-dd76da1f02a5">Not started</Status>
+    <Background xmlns="71af3243-3dd4-4a8d-8c0d-dd76da1f02a5">false</Background>
+    <_ip_UnifiedCompliancePolicyProperties xmlns="http://schemas.microsoft.com/sharepoint/v3" xsi:nil="true"/>
+    <ImageTagsTaxHTField xmlns="71af3243-3dd4-4a8d-8c0d-dd76da1f02a5">
+      <Terms xmlns="http://schemas.microsoft.com/office/infopath/2007/PartnerControls"/>
+    </ImageTagsTaxHTField>
+    <TaxCatchAll xmlns="230e9df3-be65-4c73-a93b-d1236ebd677e" xsi:nil="true"/>
+    <MediaServiceKeyPoints xmlns="71af3243-3dd4-4a8d-8c0d-dd76da1f02a5" xsi:nil="true"/>
+  </documentManagement>
+</p:properties>
 </file>
 
-<file path=customXml/itemProps3.xml><?xml version="1.0" encoding="utf-8"?>
+<file path=customXml/itemProps1.xml><?xml version="1.0" encoding="utf-8"?>
 <ds:datastoreItem xmlns:ds="http://schemas.openxmlformats.org/officeDocument/2006/customXml" ds:itemID="{C5A59D56-2157-4202-9D02-F44E447A241D}">
   <ds:schemaRefs>
     <ds:schemaRef ds:uri="http://schemas.microsoft.com/office/2006/metadata/contentType"/>
@@ -8440,4 +8887,24 @@
     <ds:schemaRef ds:uri="http://schemas.microsoft.com/internal/obd"/>
   </ds:schemaRefs>
 </ds:datastoreItem>
+</file>
+
+<file path=customXml/itemProps2.xml><?xml version="1.0" encoding="utf-8"?>
+<ds:datastoreItem xmlns:ds="http://schemas.openxmlformats.org/officeDocument/2006/customXml" ds:itemID="{19DAD249-BF80-48EF-9AFB-36A11BCDC2CE}">
+  <ds:schemaRefs>
+    <ds:schemaRef ds:uri="http://schemas.microsoft.com/sharepoint/v3/contenttype/forms"/>
+  </ds:schemaRefs>
+</ds:datastoreItem>
+</file>
+
+<file path=customXml/itemProps3.xml><?xml version="1.0" encoding="utf-8"?>
+<ds:datastoreItem xmlns:ds="http://schemas.openxmlformats.org/officeDocument/2006/customXml" ds:itemID="{6F4F4D41-822D-40F2-A7AC-E4E6CB36CA7A}">
+  <ds:schemaRefs>
+    <ds:schemaRef ds:uri="http://schemas.microsoft.com/office/2006/metadata/properties"/>
+    <ds:schemaRef ds:uri="http://schemas.microsoft.com/office/infopath/2007/PartnerControls"/>
+    <ds:schemaRef ds:uri="http://schemas.microsoft.com/sharepoint/v3"/>
+    <ds:schemaRef ds:uri="71af3243-3dd4-4a8d-8c0d-dd76da1f02a5"/>
+    <ds:schemaRef ds:uri="230e9df3-be65-4c73-a93b-d1236ebd677e"/>
+  </ds:schemaRefs>
+</ds:datastoreItem>
 </file>
</xml_diff>